<commit_message>
virtual updates - remove conditionals
</commit_message>
<xml_diff>
--- a/ProgrammingWithPythonVirtual.pptx
+++ b/ProgrammingWithPythonVirtual.pptx
@@ -5,7 +5,7 @@
     <p:sldMasterId id="2147483648" r:id="rId1"/>
   </p:sldMasterIdLst>
   <p:notesMasterIdLst>
-    <p:notesMasterId r:id="rId31"/>
+    <p:notesMasterId r:id="rId23"/>
   </p:notesMasterIdLst>
   <p:sldIdLst>
     <p:sldId id="259" r:id="rId2"/>
@@ -23,20 +23,12 @@
     <p:sldId id="291" r:id="rId14"/>
     <p:sldId id="307" r:id="rId15"/>
     <p:sldId id="290" r:id="rId16"/>
-    <p:sldId id="293" r:id="rId17"/>
-    <p:sldId id="294" r:id="rId18"/>
-    <p:sldId id="308" r:id="rId19"/>
-    <p:sldId id="296" r:id="rId20"/>
-    <p:sldId id="297" r:id="rId21"/>
-    <p:sldId id="295" r:id="rId22"/>
-    <p:sldId id="299" r:id="rId23"/>
-    <p:sldId id="300" r:id="rId24"/>
-    <p:sldId id="309" r:id="rId25"/>
-    <p:sldId id="301" r:id="rId26"/>
-    <p:sldId id="302" r:id="rId27"/>
-    <p:sldId id="276" r:id="rId28"/>
-    <p:sldId id="305" r:id="rId29"/>
-    <p:sldId id="304" r:id="rId30"/>
+    <p:sldId id="299" r:id="rId17"/>
+    <p:sldId id="300" r:id="rId18"/>
+    <p:sldId id="309" r:id="rId19"/>
+    <p:sldId id="301" r:id="rId20"/>
+    <p:sldId id="302" r:id="rId21"/>
+    <p:sldId id="276" r:id="rId22"/>
   </p:sldIdLst>
   <p:sldSz cx="12192000" cy="6858000"/>
   <p:notesSz cx="6858000" cy="9144000"/>
@@ -236,7 +228,7 @@
           <a:p>
             <a:fld id="{19104133-B5B0-4351-8158-4F0E5EB1E2BF}" type="datetimeFigureOut">
               <a:rPr lang="en-US" smtClean="0"/>
-              <a:t>4/6/2020</a:t>
+              <a:t>4/21/2020</a:t>
             </a:fld>
             <a:endParaRPr lang="en-US"/>
           </a:p>
@@ -934,11 +926,20 @@
           <a:p>
             <a:r>
               <a:rPr lang="en-US" dirty="0" smtClean="0"/>
-              <a:t>In</a:t>
+              <a:t>This slide is</a:t>
             </a:r>
             <a:r>
               <a:rPr lang="en-US" baseline="0" dirty="0" smtClean="0"/>
-              <a:t> a real conversation, one person would respond differently based on what the other person says. A computer also has to respond to user input! Like when searching for something on Google, the results will change based on what the user enters.</a:t>
+              <a:t> mostly for informational purposes, and the students will likely be distracted by the looping gif, so it is not necessary to stay very long on this slide.</a:t>
+            </a:r>
+          </a:p>
+          <a:p>
+            <a:endParaRPr lang="en-US" baseline="0" dirty="0" smtClean="0"/>
+          </a:p>
+          <a:p>
+            <a:r>
+              <a:rPr lang="en-US" baseline="0" dirty="0" smtClean="0"/>
+              <a:t>Explain loops in the context of the image; rather than having to hand-animate every single repeated frame, the gif will loop forever, which is much easier!</a:t>
             </a:r>
             <a:endParaRPr lang="en-US" dirty="0"/>
           </a:p>
@@ -970,7 +971,7 @@
     </p:spTree>
     <p:extLst>
       <p:ext uri="{BB962C8B-B14F-4D97-AF65-F5344CB8AC3E}">
-        <p14:creationId xmlns:p14="http://schemas.microsoft.com/office/powerpoint/2010/main" val="1865151885"/>
+        <p14:creationId xmlns:p14="http://schemas.microsoft.com/office/powerpoint/2010/main" val="2995987653"/>
       </p:ext>
     </p:extLst>
   </p:cSld>
@@ -1026,34 +1027,21 @@
           <a:p>
             <a:r>
               <a:rPr lang="en-US" dirty="0" smtClean="0"/>
-              <a:t>What will happen if the user enters blue? What will happen if the user</a:t>
+              <a:t>See</a:t>
             </a:r>
             <a:r>
               <a:rPr lang="en-US" baseline="0" dirty="0" smtClean="0"/>
-              <a:t> enters something other than blue? Explain that this is the same as the example from a real-life conversation.</a:t>
+              <a:t> if the students can figure out what this code does. The </a:t>
             </a:r>
-          </a:p>
-          <a:p>
-            <a:endParaRPr lang="en-US" baseline="0" dirty="0" smtClean="0"/>
-          </a:p>
-          <a:p>
             <a:r>
               <a:rPr lang="en-US" b="1" baseline="0" dirty="0" smtClean="0"/>
-              <a:t>Indentation</a:t>
+              <a:t>for</a:t>
             </a:r>
             <a:r>
-              <a:rPr lang="en-US" b="0" i="0" baseline="0" dirty="0" smtClean="0"/>
-              <a:t> tells the program what to do </a:t>
+              <a:rPr lang="en-US" b="0" baseline="0" dirty="0" smtClean="0"/>
+              <a:t> loop syntax is not incredibly important, as it will be the same every time (other than the number of iterations). Allow the students to type this code into trinket to see what it does.</a:t>
             </a:r>
-            <a:r>
-              <a:rPr lang="en-US" b="0" i="1" baseline="0" dirty="0" smtClean="0"/>
-              <a:t>if</a:t>
-            </a:r>
-            <a:r>
-              <a:rPr lang="en-US" b="0" i="0" baseline="0" dirty="0" smtClean="0"/>
-              <a:t> the condition is met. </a:t>
-            </a:r>
-            <a:endParaRPr lang="en-US" b="1" dirty="0"/>
+            <a:endParaRPr lang="en-US" dirty="0"/>
           </a:p>
         </p:txBody>
       </p:sp>
@@ -1083,7 +1071,7 @@
     </p:spTree>
     <p:extLst>
       <p:ext uri="{BB962C8B-B14F-4D97-AF65-F5344CB8AC3E}">
-        <p14:creationId xmlns:p14="http://schemas.microsoft.com/office/powerpoint/2010/main" val="2337393084"/>
+        <p14:creationId xmlns:p14="http://schemas.microsoft.com/office/powerpoint/2010/main" val="3921428091"/>
       </p:ext>
     </p:extLst>
   </p:cSld>
@@ -1139,21 +1127,55 @@
           <a:p>
             <a:r>
               <a:rPr lang="en-US" dirty="0" smtClean="0"/>
-              <a:t>Walk through the example</a:t>
+              <a:t>Explain what the</a:t>
             </a:r>
             <a:r>
               <a:rPr lang="en-US" baseline="0" dirty="0" smtClean="0"/>
-              <a:t> line by line. Emphasize the need for indentation under the </a:t>
+              <a:t> example code does. Emphasize the need for indentation.</a:t>
+            </a:r>
+          </a:p>
+          <a:p>
+            <a:endParaRPr lang="en-US" baseline="0" dirty="0" smtClean="0"/>
+          </a:p>
+          <a:p>
+            <a:r>
+              <a:rPr lang="en-US" baseline="0" dirty="0" smtClean="0"/>
+              <a:t>Printing a message is simple enough; it just prints the message to the screen.</a:t>
+            </a:r>
+          </a:p>
+          <a:p>
+            <a:endParaRPr lang="en-US" baseline="0" dirty="0" smtClean="0"/>
+          </a:p>
+          <a:p>
+            <a:r>
+              <a:rPr lang="en-US" baseline="0" dirty="0" smtClean="0"/>
+              <a:t>The </a:t>
             </a:r>
             <a:r>
               <a:rPr lang="en-US" b="1" baseline="0" dirty="0" smtClean="0"/>
-              <a:t>if</a:t>
+              <a:t>print</a:t>
             </a:r>
             <a:r>
               <a:rPr lang="en-US" b="0" baseline="0" dirty="0" smtClean="0"/>
-              <a:t>.</a:t>
+              <a:t> code is within the </a:t>
             </a:r>
-            <a:endParaRPr lang="en-US" b="0" dirty="0"/>
+            <a:r>
+              <a:rPr lang="en-US" b="1" baseline="0" dirty="0" smtClean="0"/>
+              <a:t>for</a:t>
+            </a:r>
+            <a:r>
+              <a:rPr lang="en-US" b="0" baseline="0" dirty="0" smtClean="0"/>
+              <a:t> code (under it, and indented). The </a:t>
+            </a:r>
+            <a:r>
+              <a:rPr lang="en-US" b="1" baseline="0" dirty="0" smtClean="0"/>
+              <a:t>for x in range():</a:t>
+            </a:r>
+            <a:r>
+              <a:rPr lang="en-US" b="0" baseline="0" dirty="0" smtClean="0"/>
+              <a:t> will always be the same for them, the only thing they’ll change is the number.</a:t>
+            </a:r>
+            <a:endParaRPr lang="en-US" dirty="0"/>
           </a:p>
         </p:txBody>
       </p:sp>
@@ -1183,7 +1205,7 @@
     </p:spTree>
     <p:extLst>
       <p:ext uri="{BB962C8B-B14F-4D97-AF65-F5344CB8AC3E}">
-        <p14:creationId xmlns:p14="http://schemas.microsoft.com/office/powerpoint/2010/main" val="874223267"/>
+        <p14:creationId xmlns:p14="http://schemas.microsoft.com/office/powerpoint/2010/main" val="3310518321"/>
       </p:ext>
     </p:extLst>
   </p:cSld>
@@ -1239,35 +1261,27 @@
           <a:p>
             <a:r>
               <a:rPr lang="en-US" dirty="0" smtClean="0"/>
-              <a:t>Explain</a:t>
+              <a:t>Give students the opportunity</a:t>
             </a:r>
             <a:r>
               <a:rPr lang="en-US" baseline="0" dirty="0" smtClean="0"/>
-              <a:t> the distinction between single equals and double equals. This syntax can sometimes trip students up. They should remember, if they are using an </a:t>
+              <a:t> to try and change the code so it prints more messages. All they have to do is change </a:t>
             </a:r>
             <a:r>
               <a:rPr lang="en-US" b="1" baseline="0" dirty="0" smtClean="0"/>
-              <a:t>if</a:t>
+              <a:t>10</a:t>
             </a:r>
             <a:r>
               <a:rPr lang="en-US" b="0" baseline="0" dirty="0" smtClean="0"/>
-              <a:t>, they should use </a:t>
+              <a:t> to </a:t>
             </a:r>
             <a:r>
-              <a:rPr lang="en-US" b="0" i="1" baseline="0" dirty="0" smtClean="0"/>
-              <a:t>two</a:t>
+              <a:rPr lang="en-US" b="1" baseline="0" dirty="0" smtClean="0"/>
+              <a:t>20</a:t>
             </a:r>
             <a:r>
               <a:rPr lang="en-US" b="0" baseline="0" dirty="0" smtClean="0"/>
-              <a:t> equals signs. If they are setting a variable or looking for user input, they should use </a:t>
-            </a:r>
-            <a:r>
-              <a:rPr lang="en-US" b="0" i="1" baseline="0" dirty="0" smtClean="0"/>
-              <a:t>one</a:t>
-            </a:r>
-            <a:r>
-              <a:rPr lang="en-US" b="0" baseline="0" dirty="0" smtClean="0"/>
-              <a:t> equals sign.</a:t>
+              <a:t> (or another number higher than 10) so it prints more.</a:t>
             </a:r>
             <a:endParaRPr lang="en-US" dirty="0"/>
           </a:p>
@@ -1299,7 +1313,7 @@
     </p:spTree>
     <p:extLst>
       <p:ext uri="{BB962C8B-B14F-4D97-AF65-F5344CB8AC3E}">
-        <p14:creationId xmlns:p14="http://schemas.microsoft.com/office/powerpoint/2010/main" val="1652787256"/>
+        <p14:creationId xmlns:p14="http://schemas.microsoft.com/office/powerpoint/2010/main" val="1593956060"/>
       </p:ext>
     </p:extLst>
   </p:cSld>
@@ -1355,19 +1369,11 @@
           <a:p>
             <a:r>
               <a:rPr lang="en-US" dirty="0" smtClean="0"/>
-              <a:t>See if the students can guess what this code</a:t>
+              <a:t>Click the</a:t>
             </a:r>
             <a:r>
               <a:rPr lang="en-US" baseline="0" dirty="0" smtClean="0"/>
-              <a:t> will do. </a:t>
-            </a:r>
-            <a:r>
-              <a:rPr lang="en-US" b="1" baseline="0" dirty="0" smtClean="0"/>
-              <a:t>else</a:t>
-            </a:r>
-            <a:r>
-              <a:rPr lang="en-US" b="0" baseline="0" dirty="0" smtClean="0"/>
-              <a:t> allows different code to execute if a condition is not true.</a:t>
+              <a:t> link to start the Kahoot quiz</a:t>
             </a:r>
             <a:endParaRPr lang="en-US" dirty="0"/>
           </a:p>
@@ -1399,208 +1405,7 @@
     </p:spTree>
     <p:extLst>
       <p:ext uri="{BB962C8B-B14F-4D97-AF65-F5344CB8AC3E}">
-        <p14:creationId xmlns:p14="http://schemas.microsoft.com/office/powerpoint/2010/main" val="3521182454"/>
-      </p:ext>
-    </p:extLst>
-  </p:cSld>
-  <p:clrMapOvr>
-    <a:masterClrMapping/>
-  </p:clrMapOvr>
-</p:notes>
-</file>
-
-<file path=ppt/notesSlides/notesSlide18.xml><?xml version="1.0" encoding="utf-8"?>
-<p:notes xmlns:a="http://schemas.openxmlformats.org/drawingml/2006/main" xmlns:r="http://schemas.openxmlformats.org/officeDocument/2006/relationships" xmlns:p="http://schemas.openxmlformats.org/presentationml/2006/main">
-  <p:cSld>
-    <p:spTree>
-      <p:nvGrpSpPr>
-        <p:cNvPr id="1" name=""/>
-        <p:cNvGrpSpPr/>
-        <p:nvPr/>
-      </p:nvGrpSpPr>
-      <p:grpSpPr>
-        <a:xfrm>
-          <a:off x="0" y="0"/>
-          <a:ext cx="0" cy="0"/>
-          <a:chOff x="0" y="0"/>
-          <a:chExt cx="0" cy="0"/>
-        </a:xfrm>
-      </p:grpSpPr>
-      <p:sp>
-        <p:nvSpPr>
-          <p:cNvPr id="2" name="Slide Image Placeholder 1"/>
-          <p:cNvSpPr>
-            <a:spLocks noGrp="1" noRot="1" noChangeAspect="1"/>
-          </p:cNvSpPr>
-          <p:nvPr>
-            <p:ph type="sldImg"/>
-          </p:nvPr>
-        </p:nvSpPr>
-        <p:spPr/>
-      </p:sp>
-      <p:sp>
-        <p:nvSpPr>
-          <p:cNvPr id="3" name="Notes Placeholder 2"/>
-          <p:cNvSpPr>
-            <a:spLocks noGrp="1"/>
-          </p:cNvSpPr>
-          <p:nvPr>
-            <p:ph type="body" idx="1"/>
-          </p:nvPr>
-        </p:nvSpPr>
-        <p:spPr/>
-        <p:txBody>
-          <a:bodyPr/>
-          <a:lstStyle/>
-          <a:p>
-            <a:r>
-              <a:rPr lang="en-US" dirty="0" smtClean="0"/>
-              <a:t>This slide is</a:t>
-            </a:r>
-            <a:r>
-              <a:rPr lang="en-US" baseline="0" dirty="0" smtClean="0"/>
-              <a:t> mostly for informational purposes, and the students will likely be distracted by the looping gif, so it is not necessary to stay very long on this slide.</a:t>
-            </a:r>
-          </a:p>
-          <a:p>
-            <a:endParaRPr lang="en-US" baseline="0" dirty="0" smtClean="0"/>
-          </a:p>
-          <a:p>
-            <a:r>
-              <a:rPr lang="en-US" baseline="0" dirty="0" smtClean="0"/>
-              <a:t>Explain loops in the context of the image; rather than having to hand-animate every single repeated frame, the gif will loop forever, which is much easier!</a:t>
-            </a:r>
-            <a:endParaRPr lang="en-US" dirty="0"/>
-          </a:p>
-        </p:txBody>
-      </p:sp>
-      <p:sp>
-        <p:nvSpPr>
-          <p:cNvPr id="4" name="Slide Number Placeholder 3"/>
-          <p:cNvSpPr>
-            <a:spLocks noGrp="1"/>
-          </p:cNvSpPr>
-          <p:nvPr>
-            <p:ph type="sldNum" sz="quarter" idx="10"/>
-          </p:nvPr>
-        </p:nvSpPr>
-        <p:spPr/>
-        <p:txBody>
-          <a:bodyPr/>
-          <a:lstStyle/>
-          <a:p>
-            <a:fld id="{DEC8F7F9-57EC-49CF-9FCD-2B781E4B449F}" type="slidenum">
-              <a:rPr lang="en-US" smtClean="0"/>
-              <a:t>22</a:t>
-            </a:fld>
-            <a:endParaRPr lang="en-US"/>
-          </a:p>
-        </p:txBody>
-      </p:sp>
-    </p:spTree>
-    <p:extLst>
-      <p:ext uri="{BB962C8B-B14F-4D97-AF65-F5344CB8AC3E}">
-        <p14:creationId xmlns:p14="http://schemas.microsoft.com/office/powerpoint/2010/main" val="2995987653"/>
-      </p:ext>
-    </p:extLst>
-  </p:cSld>
-  <p:clrMapOvr>
-    <a:masterClrMapping/>
-  </p:clrMapOvr>
-</p:notes>
-</file>
-
-<file path=ppt/notesSlides/notesSlide19.xml><?xml version="1.0" encoding="utf-8"?>
-<p:notes xmlns:a="http://schemas.openxmlformats.org/drawingml/2006/main" xmlns:r="http://schemas.openxmlformats.org/officeDocument/2006/relationships" xmlns:p="http://schemas.openxmlformats.org/presentationml/2006/main">
-  <p:cSld>
-    <p:spTree>
-      <p:nvGrpSpPr>
-        <p:cNvPr id="1" name=""/>
-        <p:cNvGrpSpPr/>
-        <p:nvPr/>
-      </p:nvGrpSpPr>
-      <p:grpSpPr>
-        <a:xfrm>
-          <a:off x="0" y="0"/>
-          <a:ext cx="0" cy="0"/>
-          <a:chOff x="0" y="0"/>
-          <a:chExt cx="0" cy="0"/>
-        </a:xfrm>
-      </p:grpSpPr>
-      <p:sp>
-        <p:nvSpPr>
-          <p:cNvPr id="2" name="Slide Image Placeholder 1"/>
-          <p:cNvSpPr>
-            <a:spLocks noGrp="1" noRot="1" noChangeAspect="1"/>
-          </p:cNvSpPr>
-          <p:nvPr>
-            <p:ph type="sldImg"/>
-          </p:nvPr>
-        </p:nvSpPr>
-        <p:spPr/>
-      </p:sp>
-      <p:sp>
-        <p:nvSpPr>
-          <p:cNvPr id="3" name="Notes Placeholder 2"/>
-          <p:cNvSpPr>
-            <a:spLocks noGrp="1"/>
-          </p:cNvSpPr>
-          <p:nvPr>
-            <p:ph type="body" idx="1"/>
-          </p:nvPr>
-        </p:nvSpPr>
-        <p:spPr/>
-        <p:txBody>
-          <a:bodyPr/>
-          <a:lstStyle/>
-          <a:p>
-            <a:r>
-              <a:rPr lang="en-US" dirty="0" smtClean="0"/>
-              <a:t>See</a:t>
-            </a:r>
-            <a:r>
-              <a:rPr lang="en-US" baseline="0" dirty="0" smtClean="0"/>
-              <a:t> if the students can figure out what this code does. The </a:t>
-            </a:r>
-            <a:r>
-              <a:rPr lang="en-US" b="1" baseline="0" dirty="0" smtClean="0"/>
-              <a:t>for</a:t>
-            </a:r>
-            <a:r>
-              <a:rPr lang="en-US" b="0" baseline="0" dirty="0" smtClean="0"/>
-              <a:t> loop syntax is not incredibly important, as it will be the same every time (other than the number of iterations). Allow the students to type this code into trinket to see what it does.</a:t>
-            </a:r>
-            <a:endParaRPr lang="en-US" dirty="0"/>
-          </a:p>
-        </p:txBody>
-      </p:sp>
-      <p:sp>
-        <p:nvSpPr>
-          <p:cNvPr id="4" name="Slide Number Placeholder 3"/>
-          <p:cNvSpPr>
-            <a:spLocks noGrp="1"/>
-          </p:cNvSpPr>
-          <p:nvPr>
-            <p:ph type="sldNum" sz="quarter" idx="10"/>
-          </p:nvPr>
-        </p:nvSpPr>
-        <p:spPr/>
-        <p:txBody>
-          <a:bodyPr/>
-          <a:lstStyle/>
-          <a:p>
-            <a:fld id="{DEC8F7F9-57EC-49CF-9FCD-2B781E4B449F}" type="slidenum">
-              <a:rPr lang="en-US" smtClean="0"/>
-              <a:t>23</a:t>
-            </a:fld>
-            <a:endParaRPr lang="en-US"/>
-          </a:p>
-        </p:txBody>
-      </p:sp>
-    </p:spTree>
-    <p:extLst>
-      <p:ext uri="{BB962C8B-B14F-4D97-AF65-F5344CB8AC3E}">
-        <p14:creationId xmlns:p14="http://schemas.microsoft.com/office/powerpoint/2010/main" val="3921428091"/>
+        <p14:creationId xmlns:p14="http://schemas.microsoft.com/office/powerpoint/2010/main" val="3866903638"/>
       </p:ext>
     </p:extLst>
   </p:cSld>
@@ -1693,432 +1498,6 @@
     <p:extLst>
       <p:ext uri="{BB962C8B-B14F-4D97-AF65-F5344CB8AC3E}">
         <p14:creationId xmlns:p14="http://schemas.microsoft.com/office/powerpoint/2010/main" val="442973681"/>
-      </p:ext>
-    </p:extLst>
-  </p:cSld>
-  <p:clrMapOvr>
-    <a:masterClrMapping/>
-  </p:clrMapOvr>
-</p:notes>
-</file>
-
-<file path=ppt/notesSlides/notesSlide20.xml><?xml version="1.0" encoding="utf-8"?>
-<p:notes xmlns:a="http://schemas.openxmlformats.org/drawingml/2006/main" xmlns:r="http://schemas.openxmlformats.org/officeDocument/2006/relationships" xmlns:p="http://schemas.openxmlformats.org/presentationml/2006/main">
-  <p:cSld>
-    <p:spTree>
-      <p:nvGrpSpPr>
-        <p:cNvPr id="1" name=""/>
-        <p:cNvGrpSpPr/>
-        <p:nvPr/>
-      </p:nvGrpSpPr>
-      <p:grpSpPr>
-        <a:xfrm>
-          <a:off x="0" y="0"/>
-          <a:ext cx="0" cy="0"/>
-          <a:chOff x="0" y="0"/>
-          <a:chExt cx="0" cy="0"/>
-        </a:xfrm>
-      </p:grpSpPr>
-      <p:sp>
-        <p:nvSpPr>
-          <p:cNvPr id="2" name="Slide Image Placeholder 1"/>
-          <p:cNvSpPr>
-            <a:spLocks noGrp="1" noRot="1" noChangeAspect="1"/>
-          </p:cNvSpPr>
-          <p:nvPr>
-            <p:ph type="sldImg"/>
-          </p:nvPr>
-        </p:nvSpPr>
-        <p:spPr/>
-      </p:sp>
-      <p:sp>
-        <p:nvSpPr>
-          <p:cNvPr id="3" name="Notes Placeholder 2"/>
-          <p:cNvSpPr>
-            <a:spLocks noGrp="1"/>
-          </p:cNvSpPr>
-          <p:nvPr>
-            <p:ph type="body" idx="1"/>
-          </p:nvPr>
-        </p:nvSpPr>
-        <p:spPr/>
-        <p:txBody>
-          <a:bodyPr/>
-          <a:lstStyle/>
-          <a:p>
-            <a:r>
-              <a:rPr lang="en-US" dirty="0" smtClean="0"/>
-              <a:t>Explain what the</a:t>
-            </a:r>
-            <a:r>
-              <a:rPr lang="en-US" baseline="0" dirty="0" smtClean="0"/>
-              <a:t> example code does. Emphasize the need for indentation.</a:t>
-            </a:r>
-          </a:p>
-          <a:p>
-            <a:endParaRPr lang="en-US" baseline="0" dirty="0" smtClean="0"/>
-          </a:p>
-          <a:p>
-            <a:r>
-              <a:rPr lang="en-US" baseline="0" dirty="0" smtClean="0"/>
-              <a:t>Printing a message is simple enough; it just prints the message to the screen.</a:t>
-            </a:r>
-          </a:p>
-          <a:p>
-            <a:endParaRPr lang="en-US" baseline="0" dirty="0" smtClean="0"/>
-          </a:p>
-          <a:p>
-            <a:r>
-              <a:rPr lang="en-US" baseline="0" dirty="0" smtClean="0"/>
-              <a:t>The </a:t>
-            </a:r>
-            <a:r>
-              <a:rPr lang="en-US" b="1" baseline="0" dirty="0" smtClean="0"/>
-              <a:t>print</a:t>
-            </a:r>
-            <a:r>
-              <a:rPr lang="en-US" b="0" baseline="0" dirty="0" smtClean="0"/>
-              <a:t> code is within the </a:t>
-            </a:r>
-            <a:r>
-              <a:rPr lang="en-US" b="1" baseline="0" dirty="0" smtClean="0"/>
-              <a:t>for</a:t>
-            </a:r>
-            <a:r>
-              <a:rPr lang="en-US" b="0" baseline="0" dirty="0" smtClean="0"/>
-              <a:t> code (under it, and indented). The </a:t>
-            </a:r>
-            <a:r>
-              <a:rPr lang="en-US" b="1" baseline="0" dirty="0" smtClean="0"/>
-              <a:t>for x in range():</a:t>
-            </a:r>
-            <a:r>
-              <a:rPr lang="en-US" b="0" baseline="0" dirty="0" smtClean="0"/>
-              <a:t> will always be the same for them, the only thing they’ll change is the number.</a:t>
-            </a:r>
-            <a:endParaRPr lang="en-US" dirty="0"/>
-          </a:p>
-        </p:txBody>
-      </p:sp>
-      <p:sp>
-        <p:nvSpPr>
-          <p:cNvPr id="4" name="Slide Number Placeholder 3"/>
-          <p:cNvSpPr>
-            <a:spLocks noGrp="1"/>
-          </p:cNvSpPr>
-          <p:nvPr>
-            <p:ph type="sldNum" sz="quarter" idx="10"/>
-          </p:nvPr>
-        </p:nvSpPr>
-        <p:spPr/>
-        <p:txBody>
-          <a:bodyPr/>
-          <a:lstStyle/>
-          <a:p>
-            <a:fld id="{DEC8F7F9-57EC-49CF-9FCD-2B781E4B449F}" type="slidenum">
-              <a:rPr lang="en-US" smtClean="0"/>
-              <a:t>25</a:t>
-            </a:fld>
-            <a:endParaRPr lang="en-US"/>
-          </a:p>
-        </p:txBody>
-      </p:sp>
-    </p:spTree>
-    <p:extLst>
-      <p:ext uri="{BB962C8B-B14F-4D97-AF65-F5344CB8AC3E}">
-        <p14:creationId xmlns:p14="http://schemas.microsoft.com/office/powerpoint/2010/main" val="3310518321"/>
-      </p:ext>
-    </p:extLst>
-  </p:cSld>
-  <p:clrMapOvr>
-    <a:masterClrMapping/>
-  </p:clrMapOvr>
-</p:notes>
-</file>
-
-<file path=ppt/notesSlides/notesSlide21.xml><?xml version="1.0" encoding="utf-8"?>
-<p:notes xmlns:a="http://schemas.openxmlformats.org/drawingml/2006/main" xmlns:r="http://schemas.openxmlformats.org/officeDocument/2006/relationships" xmlns:p="http://schemas.openxmlformats.org/presentationml/2006/main">
-  <p:cSld>
-    <p:spTree>
-      <p:nvGrpSpPr>
-        <p:cNvPr id="1" name=""/>
-        <p:cNvGrpSpPr/>
-        <p:nvPr/>
-      </p:nvGrpSpPr>
-      <p:grpSpPr>
-        <a:xfrm>
-          <a:off x="0" y="0"/>
-          <a:ext cx="0" cy="0"/>
-          <a:chOff x="0" y="0"/>
-          <a:chExt cx="0" cy="0"/>
-        </a:xfrm>
-      </p:grpSpPr>
-      <p:sp>
-        <p:nvSpPr>
-          <p:cNvPr id="2" name="Slide Image Placeholder 1"/>
-          <p:cNvSpPr>
-            <a:spLocks noGrp="1" noRot="1" noChangeAspect="1"/>
-          </p:cNvSpPr>
-          <p:nvPr>
-            <p:ph type="sldImg"/>
-          </p:nvPr>
-        </p:nvSpPr>
-        <p:spPr/>
-      </p:sp>
-      <p:sp>
-        <p:nvSpPr>
-          <p:cNvPr id="3" name="Notes Placeholder 2"/>
-          <p:cNvSpPr>
-            <a:spLocks noGrp="1"/>
-          </p:cNvSpPr>
-          <p:nvPr>
-            <p:ph type="body" idx="1"/>
-          </p:nvPr>
-        </p:nvSpPr>
-        <p:spPr/>
-        <p:txBody>
-          <a:bodyPr/>
-          <a:lstStyle/>
-          <a:p>
-            <a:r>
-              <a:rPr lang="en-US" dirty="0" smtClean="0"/>
-              <a:t>Give students the opportunity</a:t>
-            </a:r>
-            <a:r>
-              <a:rPr lang="en-US" baseline="0" dirty="0" smtClean="0"/>
-              <a:t> to try and change the code so it prints more messages. All they have to do is change </a:t>
-            </a:r>
-            <a:r>
-              <a:rPr lang="en-US" b="1" baseline="0" dirty="0" smtClean="0"/>
-              <a:t>10</a:t>
-            </a:r>
-            <a:r>
-              <a:rPr lang="en-US" b="0" baseline="0" dirty="0" smtClean="0"/>
-              <a:t> to </a:t>
-            </a:r>
-            <a:r>
-              <a:rPr lang="en-US" b="1" baseline="0" dirty="0" smtClean="0"/>
-              <a:t>20</a:t>
-            </a:r>
-            <a:r>
-              <a:rPr lang="en-US" b="0" baseline="0" dirty="0" smtClean="0"/>
-              <a:t> (or another number higher than 10) so it prints more.</a:t>
-            </a:r>
-            <a:endParaRPr lang="en-US" dirty="0"/>
-          </a:p>
-        </p:txBody>
-      </p:sp>
-      <p:sp>
-        <p:nvSpPr>
-          <p:cNvPr id="4" name="Slide Number Placeholder 3"/>
-          <p:cNvSpPr>
-            <a:spLocks noGrp="1"/>
-          </p:cNvSpPr>
-          <p:nvPr>
-            <p:ph type="sldNum" sz="quarter" idx="10"/>
-          </p:nvPr>
-        </p:nvSpPr>
-        <p:spPr/>
-        <p:txBody>
-          <a:bodyPr/>
-          <a:lstStyle/>
-          <a:p>
-            <a:fld id="{DEC8F7F9-57EC-49CF-9FCD-2B781E4B449F}" type="slidenum">
-              <a:rPr lang="en-US" smtClean="0"/>
-              <a:t>26</a:t>
-            </a:fld>
-            <a:endParaRPr lang="en-US"/>
-          </a:p>
-        </p:txBody>
-      </p:sp>
-    </p:spTree>
-    <p:extLst>
-      <p:ext uri="{BB962C8B-B14F-4D97-AF65-F5344CB8AC3E}">
-        <p14:creationId xmlns:p14="http://schemas.microsoft.com/office/powerpoint/2010/main" val="1593956060"/>
-      </p:ext>
-    </p:extLst>
-  </p:cSld>
-  <p:clrMapOvr>
-    <a:masterClrMapping/>
-  </p:clrMapOvr>
-</p:notes>
-</file>
-
-<file path=ppt/notesSlides/notesSlide22.xml><?xml version="1.0" encoding="utf-8"?>
-<p:notes xmlns:a="http://schemas.openxmlformats.org/drawingml/2006/main" xmlns:r="http://schemas.openxmlformats.org/officeDocument/2006/relationships" xmlns:p="http://schemas.openxmlformats.org/presentationml/2006/main">
-  <p:cSld>
-    <p:spTree>
-      <p:nvGrpSpPr>
-        <p:cNvPr id="1" name=""/>
-        <p:cNvGrpSpPr/>
-        <p:nvPr/>
-      </p:nvGrpSpPr>
-      <p:grpSpPr>
-        <a:xfrm>
-          <a:off x="0" y="0"/>
-          <a:ext cx="0" cy="0"/>
-          <a:chOff x="0" y="0"/>
-          <a:chExt cx="0" cy="0"/>
-        </a:xfrm>
-      </p:grpSpPr>
-      <p:sp>
-        <p:nvSpPr>
-          <p:cNvPr id="2" name="Slide Image Placeholder 1"/>
-          <p:cNvSpPr>
-            <a:spLocks noGrp="1" noRot="1" noChangeAspect="1"/>
-          </p:cNvSpPr>
-          <p:nvPr>
-            <p:ph type="sldImg"/>
-          </p:nvPr>
-        </p:nvSpPr>
-        <p:spPr/>
-      </p:sp>
-      <p:sp>
-        <p:nvSpPr>
-          <p:cNvPr id="3" name="Notes Placeholder 2"/>
-          <p:cNvSpPr>
-            <a:spLocks noGrp="1"/>
-          </p:cNvSpPr>
-          <p:nvPr>
-            <p:ph type="body" idx="1"/>
-          </p:nvPr>
-        </p:nvSpPr>
-        <p:spPr/>
-        <p:txBody>
-          <a:bodyPr/>
-          <a:lstStyle/>
-          <a:p>
-            <a:r>
-              <a:rPr lang="en-US" dirty="0" smtClean="0"/>
-              <a:t>Click the</a:t>
-            </a:r>
-            <a:r>
-              <a:rPr lang="en-US" baseline="0" dirty="0" smtClean="0"/>
-              <a:t> link to start the Kahoot quiz</a:t>
-            </a:r>
-            <a:endParaRPr lang="en-US" dirty="0"/>
-          </a:p>
-        </p:txBody>
-      </p:sp>
-      <p:sp>
-        <p:nvSpPr>
-          <p:cNvPr id="4" name="Slide Number Placeholder 3"/>
-          <p:cNvSpPr>
-            <a:spLocks noGrp="1"/>
-          </p:cNvSpPr>
-          <p:nvPr>
-            <p:ph type="sldNum" sz="quarter" idx="10"/>
-          </p:nvPr>
-        </p:nvSpPr>
-        <p:spPr/>
-        <p:txBody>
-          <a:bodyPr/>
-          <a:lstStyle/>
-          <a:p>
-            <a:fld id="{DEC8F7F9-57EC-49CF-9FCD-2B781E4B449F}" type="slidenum">
-              <a:rPr lang="en-US" smtClean="0"/>
-              <a:t>27</a:t>
-            </a:fld>
-            <a:endParaRPr lang="en-US"/>
-          </a:p>
-        </p:txBody>
-      </p:sp>
-    </p:spTree>
-    <p:extLst>
-      <p:ext uri="{BB962C8B-B14F-4D97-AF65-F5344CB8AC3E}">
-        <p14:creationId xmlns:p14="http://schemas.microsoft.com/office/powerpoint/2010/main" val="3866903638"/>
-      </p:ext>
-    </p:extLst>
-  </p:cSld>
-  <p:clrMapOvr>
-    <a:masterClrMapping/>
-  </p:clrMapOvr>
-</p:notes>
-</file>
-
-<file path=ppt/notesSlides/notesSlide23.xml><?xml version="1.0" encoding="utf-8"?>
-<p:notes xmlns:a="http://schemas.openxmlformats.org/drawingml/2006/main" xmlns:r="http://schemas.openxmlformats.org/officeDocument/2006/relationships" xmlns:p="http://schemas.openxmlformats.org/presentationml/2006/main">
-  <p:cSld>
-    <p:spTree>
-      <p:nvGrpSpPr>
-        <p:cNvPr id="1" name=""/>
-        <p:cNvGrpSpPr/>
-        <p:nvPr/>
-      </p:nvGrpSpPr>
-      <p:grpSpPr>
-        <a:xfrm>
-          <a:off x="0" y="0"/>
-          <a:ext cx="0" cy="0"/>
-          <a:chOff x="0" y="0"/>
-          <a:chExt cx="0" cy="0"/>
-        </a:xfrm>
-      </p:grpSpPr>
-      <p:sp>
-        <p:nvSpPr>
-          <p:cNvPr id="2" name="Slide Image Placeholder 1"/>
-          <p:cNvSpPr>
-            <a:spLocks noGrp="1" noRot="1" noChangeAspect="1"/>
-          </p:cNvSpPr>
-          <p:nvPr>
-            <p:ph type="sldImg"/>
-          </p:nvPr>
-        </p:nvSpPr>
-        <p:spPr/>
-      </p:sp>
-      <p:sp>
-        <p:nvSpPr>
-          <p:cNvPr id="3" name="Notes Placeholder 2"/>
-          <p:cNvSpPr>
-            <a:spLocks noGrp="1"/>
-          </p:cNvSpPr>
-          <p:nvPr>
-            <p:ph type="body" idx="1"/>
-          </p:nvPr>
-        </p:nvSpPr>
-        <p:spPr/>
-        <p:txBody>
-          <a:bodyPr/>
-          <a:lstStyle/>
-          <a:p>
-            <a:r>
-              <a:rPr lang="en-US" dirty="0" smtClean="0"/>
-              <a:t>Direct the students to visit the</a:t>
-            </a:r>
-            <a:r>
-              <a:rPr lang="en-US" baseline="0" dirty="0" smtClean="0"/>
-              <a:t> URL. This will contain the instructions for the challenge activities.</a:t>
-            </a:r>
-            <a:endParaRPr lang="en-US" dirty="0"/>
-          </a:p>
-        </p:txBody>
-      </p:sp>
-      <p:sp>
-        <p:nvSpPr>
-          <p:cNvPr id="4" name="Slide Number Placeholder 3"/>
-          <p:cNvSpPr>
-            <a:spLocks noGrp="1"/>
-          </p:cNvSpPr>
-          <p:nvPr>
-            <p:ph type="sldNum" sz="quarter" idx="10"/>
-          </p:nvPr>
-        </p:nvSpPr>
-        <p:spPr/>
-        <p:txBody>
-          <a:bodyPr/>
-          <a:lstStyle/>
-          <a:p>
-            <a:fld id="{DEC8F7F9-57EC-49CF-9FCD-2B781E4B449F}" type="slidenum">
-              <a:rPr lang="en-US" smtClean="0"/>
-              <a:t>29</a:t>
-            </a:fld>
-            <a:endParaRPr lang="en-US"/>
-          </a:p>
-        </p:txBody>
-      </p:sp>
-    </p:spTree>
-    <p:extLst>
-      <p:ext uri="{BB962C8B-B14F-4D97-AF65-F5344CB8AC3E}">
-        <p14:creationId xmlns:p14="http://schemas.microsoft.com/office/powerpoint/2010/main" val="1162618150"/>
       </p:ext>
     </p:extLst>
   </p:cSld>
@@ -2569,15 +1948,7 @@
             </a:r>
             <a:r>
               <a:rPr lang="en-US" baseline="0" dirty="0" smtClean="0"/>
-              <a:t> if they can guess what this does. </a:t>
-            </a:r>
-            <a:r>
-              <a:rPr lang="en-US" baseline="0" dirty="0" smtClean="0"/>
-              <a:t>Then reveal </a:t>
-            </a:r>
-            <a:r>
-              <a:rPr lang="en-US" baseline="0" dirty="0" smtClean="0"/>
-              <a:t>the answer.</a:t>
+              <a:t> if they can guess what this does. Then reveal the answer.</a:t>
             </a:r>
           </a:p>
           <a:p>
@@ -3056,7 +2427,7 @@
             <a:fld id="{1C2D31DE-C454-491C-B5C3-F097855E3DF7}" type="datetime4">
               <a:rPr lang="en-US" smtClean="0"/>
               <a:pPr/>
-              <a:t>April 6, 2020</a:t>
+              <a:t>April 21, 2020</a:t>
             </a:fld>
             <a:endParaRPr lang="en-US" dirty="0"/>
           </a:p>
@@ -6456,7 +5827,7 @@
           <a:p>
             <a:fld id="{5958763E-B898-436D-883D-03711491D54A}" type="datetimeFigureOut">
               <a:rPr lang="en-US" smtClean="0"/>
-              <a:t>4/6/2020</a:t>
+              <a:t>4/21/2020</a:t>
             </a:fld>
             <a:endParaRPr lang="en-US"/>
           </a:p>
@@ -6657,7 +6028,7 @@
           <a:p>
             <a:fld id="{5958763E-B898-436D-883D-03711491D54A}" type="datetimeFigureOut">
               <a:rPr lang="en-US" smtClean="0"/>
-              <a:t>4/6/2020</a:t>
+              <a:t>4/21/2020</a:t>
             </a:fld>
             <a:endParaRPr lang="en-US"/>
           </a:p>
@@ -6914,7 +6285,7 @@
           <a:p>
             <a:fld id="{5958763E-B898-436D-883D-03711491D54A}" type="datetimeFigureOut">
               <a:rPr lang="en-US" smtClean="0"/>
-              <a:t>4/6/2020</a:t>
+              <a:t>4/21/2020</a:t>
             </a:fld>
             <a:endParaRPr lang="en-US"/>
           </a:p>
@@ -7269,7 +6640,7 @@
           <a:p>
             <a:fld id="{5958763E-B898-436D-883D-03711491D54A}" type="datetimeFigureOut">
               <a:rPr lang="en-US" smtClean="0"/>
-              <a:t>4/6/2020</a:t>
+              <a:t>4/21/2020</a:t>
             </a:fld>
             <a:endParaRPr lang="en-US"/>
           </a:p>
@@ -7692,7 +7063,7 @@
           <a:p>
             <a:fld id="{5958763E-B898-436D-883D-03711491D54A}" type="datetimeFigureOut">
               <a:rPr lang="en-US" smtClean="0"/>
-              <a:t>4/6/2020</a:t>
+              <a:t>4/21/2020</a:t>
             </a:fld>
             <a:endParaRPr lang="en-US"/>
           </a:p>
@@ -8200,7 +7571,7 @@
           <a:p>
             <a:fld id="{5958763E-B898-436D-883D-03711491D54A}" type="datetimeFigureOut">
               <a:rPr lang="en-US" smtClean="0"/>
-              <a:t>4/6/2020</a:t>
+              <a:t>4/21/2020</a:t>
             </a:fld>
             <a:endParaRPr lang="en-US"/>
           </a:p>
@@ -8658,7 +8029,7 @@
           <a:p>
             <a:fld id="{5958763E-B898-436D-883D-03711491D54A}" type="datetimeFigureOut">
               <a:rPr lang="en-US" smtClean="0"/>
-              <a:t>4/6/2020</a:t>
+              <a:t>4/21/2020</a:t>
             </a:fld>
             <a:endParaRPr lang="en-US"/>
           </a:p>
@@ -9276,7 +8647,7 @@
           <a:p>
             <a:fld id="{5958763E-B898-436D-883D-03711491D54A}" type="datetimeFigureOut">
               <a:rPr lang="en-US" smtClean="0"/>
-              <a:t>4/6/2020</a:t>
+              <a:t>4/21/2020</a:t>
             </a:fld>
             <a:endParaRPr lang="en-US"/>
           </a:p>
@@ -10054,7 +9425,7 @@
           <a:p>
             <a:fld id="{5958763E-B898-436D-883D-03711491D54A}" type="datetimeFigureOut">
               <a:rPr lang="en-US" smtClean="0"/>
-              <a:t>4/6/2020</a:t>
+              <a:t>4/21/2020</a:t>
             </a:fld>
             <a:endParaRPr lang="en-US"/>
           </a:p>
@@ -10165,7 +9536,7 @@
           <a:p>
             <a:fld id="{5958763E-B898-436D-883D-03711491D54A}" type="datetimeFigureOut">
               <a:rPr lang="en-US" smtClean="0"/>
-              <a:t>4/6/2020</a:t>
+              <a:t>4/21/2020</a:t>
             </a:fld>
             <a:endParaRPr lang="en-US"/>
           </a:p>
@@ -10507,7 +9878,7 @@
             <a:fld id="{1C2D31DE-C454-491C-B5C3-F097855E3DF7}" type="datetime4">
               <a:rPr lang="en-US" smtClean="0"/>
               <a:pPr/>
-              <a:t>April 6, 2020</a:t>
+              <a:t>April 21, 2020</a:t>
             </a:fld>
             <a:endParaRPr lang="en-US" dirty="0"/>
           </a:p>
@@ -13667,7 +13038,7 @@
           <a:p>
             <a:fld id="{5958763E-B898-436D-883D-03711491D54A}" type="datetimeFigureOut">
               <a:rPr lang="en-US" smtClean="0"/>
-              <a:t>4/6/2020</a:t>
+              <a:t>4/21/2020</a:t>
             </a:fld>
             <a:endParaRPr lang="en-US"/>
           </a:p>
@@ -13798,7 +13169,7 @@
           <a:p>
             <a:fld id="{5958763E-B898-436D-883D-03711491D54A}" type="datetimeFigureOut">
               <a:rPr lang="en-US" smtClean="0"/>
-              <a:t>4/6/2020</a:t>
+              <a:t>4/21/2020</a:t>
             </a:fld>
             <a:endParaRPr lang="en-US"/>
           </a:p>
@@ -13929,7 +13300,7 @@
           <a:p>
             <a:fld id="{5958763E-B898-436D-883D-03711491D54A}" type="datetimeFigureOut">
               <a:rPr lang="en-US" smtClean="0"/>
-              <a:t>4/6/2020</a:t>
+              <a:t>4/21/2020</a:t>
             </a:fld>
             <a:endParaRPr lang="en-US"/>
           </a:p>
@@ -14060,7 +13431,7 @@
           <a:p>
             <a:fld id="{5958763E-B898-436D-883D-03711491D54A}" type="datetimeFigureOut">
               <a:rPr lang="en-US" smtClean="0"/>
-              <a:t>4/6/2020</a:t>
+              <a:t>4/21/2020</a:t>
             </a:fld>
             <a:endParaRPr lang="en-US"/>
           </a:p>
@@ -14191,7 +13562,7 @@
           <a:p>
             <a:fld id="{5958763E-B898-436D-883D-03711491D54A}" type="datetimeFigureOut">
               <a:rPr lang="en-US" smtClean="0"/>
-              <a:t>4/6/2020</a:t>
+              <a:t>4/21/2020</a:t>
             </a:fld>
             <a:endParaRPr lang="en-US"/>
           </a:p>
@@ -14322,7 +13693,7 @@
           <a:p>
             <a:fld id="{5958763E-B898-436D-883D-03711491D54A}" type="datetimeFigureOut">
               <a:rPr lang="en-US" smtClean="0"/>
-              <a:t>4/6/2020</a:t>
+              <a:t>4/21/2020</a:t>
             </a:fld>
             <a:endParaRPr lang="en-US"/>
           </a:p>
@@ -14453,7 +13824,7 @@
           <a:p>
             <a:fld id="{5958763E-B898-436D-883D-03711491D54A}" type="datetimeFigureOut">
               <a:rPr lang="en-US" smtClean="0"/>
-              <a:t>4/6/2020</a:t>
+              <a:t>4/21/2020</a:t>
             </a:fld>
             <a:endParaRPr lang="en-US"/>
           </a:p>
@@ -14584,7 +13955,7 @@
           <a:p>
             <a:fld id="{5958763E-B898-436D-883D-03711491D54A}" type="datetimeFigureOut">
               <a:rPr lang="en-US" smtClean="0"/>
-              <a:t>4/6/2020</a:t>
+              <a:t>4/21/2020</a:t>
             </a:fld>
             <a:endParaRPr lang="en-US"/>
           </a:p>
@@ -14724,7 +14095,7 @@
           <a:p>
             <a:fld id="{5958763E-B898-436D-883D-03711491D54A}" type="datetimeFigureOut">
               <a:rPr lang="en-US" smtClean="0"/>
-              <a:t>4/6/2020</a:t>
+              <a:t>4/21/2020</a:t>
             </a:fld>
             <a:endParaRPr lang="en-US"/>
           </a:p>
@@ -18085,7 +17456,7 @@
             <a:fld id="{1C2D31DE-C454-491C-B5C3-F097855E3DF7}" type="datetime4">
               <a:rPr lang="en-US" smtClean="0"/>
               <a:pPr/>
-              <a:t>April 6, 2020</a:t>
+              <a:t>April 21, 2020</a:t>
             </a:fld>
             <a:endParaRPr lang="en-US" dirty="0"/>
           </a:p>
@@ -30330,7 +29701,7 @@
           <a:p>
             <a:fld id="{5958763E-B898-436D-883D-03711491D54A}" type="datetimeFigureOut">
               <a:rPr lang="en-US" smtClean="0"/>
-              <a:t>4/6/2020</a:t>
+              <a:t>4/21/2020</a:t>
             </a:fld>
             <a:endParaRPr lang="en-US"/>
           </a:p>
@@ -30739,7 +30110,7 @@
           <a:p>
             <a:fld id="{5958763E-B898-436D-883D-03711491D54A}" type="datetimeFigureOut">
               <a:rPr lang="en-US" smtClean="0"/>
-              <a:t>4/6/2020</a:t>
+              <a:t>4/21/2020</a:t>
             </a:fld>
             <a:endParaRPr lang="en-US"/>
           </a:p>
@@ -31040,7 +30411,7 @@
           <a:p>
             <a:fld id="{5958763E-B898-436D-883D-03711491D54A}" type="datetimeFigureOut">
               <a:rPr lang="en-US" smtClean="0"/>
-              <a:t>4/6/2020</a:t>
+              <a:t>4/21/2020</a:t>
             </a:fld>
             <a:endParaRPr lang="en-US"/>
           </a:p>
@@ -31248,7 +30619,7 @@
           <a:p>
             <a:fld id="{5958763E-B898-436D-883D-03711491D54A}" type="datetimeFigureOut">
               <a:rPr lang="en-US" smtClean="0"/>
-              <a:t>4/6/2020</a:t>
+              <a:t>4/21/2020</a:t>
             </a:fld>
             <a:endParaRPr lang="en-US"/>
           </a:p>
@@ -31516,7 +30887,7 @@
           <a:p>
             <a:fld id="{5958763E-B898-436D-883D-03711491D54A}" type="datetimeFigureOut">
               <a:rPr lang="en-US" smtClean="0"/>
-              <a:t>4/6/2020</a:t>
+              <a:t>4/21/2020</a:t>
             </a:fld>
             <a:endParaRPr lang="en-US"/>
           </a:p>
@@ -32033,7 +31404,7 @@
           <a:p>
             <a:fld id="{5958763E-B898-436D-883D-03711491D54A}" type="datetimeFigureOut">
               <a:rPr lang="en-US" smtClean="0"/>
-              <a:t>4/6/2020</a:t>
+              <a:t>4/21/2020</a:t>
             </a:fld>
             <a:endParaRPr lang="en-US"/>
           </a:p>
@@ -32521,7 +31892,7 @@
           <a:p>
             <a:fld id="{5958763E-B898-436D-883D-03711491D54A}" type="datetimeFigureOut">
               <a:rPr lang="en-US" smtClean="0"/>
-              <a:t>4/6/2020</a:t>
+              <a:t>4/21/2020</a:t>
             </a:fld>
             <a:endParaRPr lang="en-US"/>
           </a:p>
@@ -33347,7 +32718,7 @@
           <a:p>
             <a:fld id="{5958763E-B898-436D-883D-03711491D54A}" type="datetimeFigureOut">
               <a:rPr lang="en-US" smtClean="0"/>
-              <a:t>4/6/2020</a:t>
+              <a:t>4/21/2020</a:t>
             </a:fld>
             <a:endParaRPr lang="en-US"/>
           </a:p>
@@ -33555,7 +32926,7 @@
           <a:p>
             <a:fld id="{5958763E-B898-436D-883D-03711491D54A}" type="datetimeFigureOut">
               <a:rPr lang="en-US" smtClean="0"/>
-              <a:t>4/6/2020</a:t>
+              <a:t>4/21/2020</a:t>
             </a:fld>
             <a:endParaRPr lang="en-US"/>
           </a:p>
@@ -33897,7 +33268,7 @@
           <a:p>
             <a:fld id="{5958763E-B898-436D-883D-03711491D54A}" type="datetimeFigureOut">
               <a:rPr lang="en-US" smtClean="0"/>
-              <a:t>4/6/2020</a:t>
+              <a:t>4/21/2020</a:t>
             </a:fld>
             <a:endParaRPr lang="en-US"/>
           </a:p>
@@ -34134,7 +33505,7 @@
           <a:p>
             <a:fld id="{5958763E-B898-436D-883D-03711491D54A}" type="datetimeFigureOut">
               <a:rPr lang="en-US" smtClean="0"/>
-              <a:t>4/6/2020</a:t>
+              <a:t>4/21/2020</a:t>
             </a:fld>
             <a:endParaRPr lang="en-US"/>
           </a:p>
@@ -34385,7 +33756,7 @@
           <a:p>
             <a:fld id="{5958763E-B898-436D-883D-03711491D54A}" type="datetimeFigureOut">
               <a:rPr lang="en-US" smtClean="0"/>
-              <a:t>4/6/2020</a:t>
+              <a:t>4/21/2020</a:t>
             </a:fld>
             <a:endParaRPr lang="en-US"/>
           </a:p>
@@ -34943,11 +34314,7 @@
           <a:p>
             <a:r>
               <a:rPr lang="en-US" dirty="0" smtClean="0"/>
-              <a:t>Virtual Hy-Tech </a:t>
-            </a:r>
-            <a:r>
-              <a:rPr lang="en-US" dirty="0" smtClean="0"/>
-              <a:t>Camp</a:t>
+              <a:t>Virtual Hy-Tech Camp</a:t>
             </a:r>
             <a:endParaRPr lang="en-US" dirty="0"/>
           </a:p>
@@ -40349,2873 +39716,6 @@
           <a:p>
             <a:r>
               <a:rPr lang="en-US" dirty="0" smtClean="0"/>
-              <a:t>More User interactions – if/else</a:t>
-            </a:r>
-            <a:endParaRPr lang="en-US" dirty="0"/>
-          </a:p>
-        </p:txBody>
-      </p:sp>
-      <p:sp>
-        <p:nvSpPr>
-          <p:cNvPr id="7" name="Content Placeholder 6"/>
-          <p:cNvSpPr>
-            <a:spLocks noGrp="1"/>
-          </p:cNvSpPr>
-          <p:nvPr>
-            <p:ph idx="1"/>
-          </p:nvPr>
-        </p:nvSpPr>
-        <p:spPr>
-          <a:xfrm>
-            <a:off x="6435724" y="1192976"/>
-            <a:ext cx="5375275" cy="5322124"/>
-          </a:xfrm>
-        </p:spPr>
-        <p:txBody>
-          <a:bodyPr>
-            <a:normAutofit/>
-          </a:bodyPr>
-          <a:lstStyle/>
-          <a:p>
-            <a:r>
-              <a:rPr lang="en-US" dirty="0" smtClean="0"/>
-              <a:t>Real life conversation: Responses change based on what the other party says</a:t>
-            </a:r>
-          </a:p>
-          <a:p>
-            <a:pPr marL="57150" indent="0">
-              <a:buNone/>
-            </a:pPr>
-            <a:endParaRPr lang="en-US" dirty="0"/>
-          </a:p>
-          <a:p>
-            <a:r>
-              <a:rPr lang="en-US" b="1" dirty="0" smtClean="0"/>
-              <a:t>If</a:t>
-            </a:r>
-            <a:r>
-              <a:rPr lang="en-US" dirty="0" smtClean="0"/>
-              <a:t> someone says their favorite color is </a:t>
-            </a:r>
-            <a:r>
-              <a:rPr lang="en-US" dirty="0" smtClean="0">
-                <a:solidFill>
-                  <a:schemeClr val="accent1"/>
-                </a:solidFill>
-              </a:rPr>
-              <a:t>blue</a:t>
-            </a:r>
-            <a:r>
-              <a:rPr lang="en-US" dirty="0" smtClean="0"/>
-              <a:t>, you might say “That’s my favorite too!”</a:t>
-            </a:r>
-            <a:endParaRPr lang="en-US" dirty="0"/>
-          </a:p>
-          <a:p>
-            <a:r>
-              <a:rPr lang="en-US" dirty="0" smtClean="0"/>
-              <a:t>If they say something </a:t>
-            </a:r>
-            <a:r>
-              <a:rPr lang="en-US" b="1" dirty="0" smtClean="0"/>
-              <a:t>else</a:t>
-            </a:r>
-            <a:r>
-              <a:rPr lang="en-US" dirty="0" smtClean="0"/>
-              <a:t>, you might say “That’s not my favorite”</a:t>
-            </a:r>
-          </a:p>
-        </p:txBody>
-      </p:sp>
-      <p:pic>
-        <p:nvPicPr>
-          <p:cNvPr id="2050" name="Picture 2" descr="Image result for what's your favorite color comic"/>
-          <p:cNvPicPr>
-            <a:picLocks noChangeAspect="1" noChangeArrowheads="1"/>
-          </p:cNvPicPr>
-          <p:nvPr/>
-        </p:nvPicPr>
-        <p:blipFill>
-          <a:blip r:embed="rId3">
-            <a:extLst>
-              <a:ext uri="{28A0092B-C50C-407E-A947-70E740481C1C}">
-                <a14:useLocalDpi xmlns:a14="http://schemas.microsoft.com/office/drawing/2010/main" val="0"/>
-              </a:ext>
-            </a:extLst>
-          </a:blip>
-          <a:srcRect/>
-          <a:stretch>
-            <a:fillRect/>
-          </a:stretch>
-        </p:blipFill>
-        <p:spPr bwMode="auto">
-          <a:xfrm>
-            <a:off x="381000" y="1192976"/>
-            <a:ext cx="6054725" cy="4357747"/>
-          </a:xfrm>
-          <a:prstGeom prst="rect">
-            <a:avLst/>
-          </a:prstGeom>
-          <a:noFill/>
-          <a:extLst>
-            <a:ext uri="{909E8E84-426E-40DD-AFC4-6F175D3DCCD1}">
-              <a14:hiddenFill xmlns:a14="http://schemas.microsoft.com/office/drawing/2010/main">
-                <a:solidFill>
-                  <a:srgbClr val="FFFFFF"/>
-                </a:solidFill>
-              </a14:hiddenFill>
-            </a:ext>
-          </a:extLst>
-        </p:spPr>
-      </p:pic>
-    </p:spTree>
-    <p:extLst>
-      <p:ext uri="{BB962C8B-B14F-4D97-AF65-F5344CB8AC3E}">
-        <p14:creationId xmlns:p14="http://schemas.microsoft.com/office/powerpoint/2010/main" val="3927346277"/>
-      </p:ext>
-    </p:extLst>
-  </p:cSld>
-  <p:clrMapOvr>
-    <a:masterClrMapping/>
-  </p:clrMapOvr>
-  <p:transition spd="med">
-    <p:pull/>
-  </p:transition>
-  <p:timing>
-    <p:tnLst>
-      <p:par>
-        <p:cTn id="1" dur="indefinite" restart="never" nodeType="tmRoot">
-          <p:childTnLst>
-            <p:seq concurrent="1" nextAc="seek">
-              <p:cTn id="2" dur="indefinite" nodeType="mainSeq">
-                <p:childTnLst>
-                  <p:par>
-                    <p:cTn id="3" fill="hold">
-                      <p:stCondLst>
-                        <p:cond delay="indefinite"/>
-                      </p:stCondLst>
-                      <p:childTnLst>
-                        <p:par>
-                          <p:cTn id="4" fill="hold">
-                            <p:stCondLst>
-                              <p:cond delay="0"/>
-                            </p:stCondLst>
-                            <p:childTnLst>
-                              <p:par>
-                                <p:cTn id="5" presetID="2" presetClass="entr" presetSubtype="4" fill="hold" grpId="0" nodeType="clickEffect">
-                                  <p:stCondLst>
-                                    <p:cond delay="0"/>
-                                  </p:stCondLst>
-                                  <p:childTnLst>
-                                    <p:set>
-                                      <p:cBhvr>
-                                        <p:cTn id="6" dur="1" fill="hold">
-                                          <p:stCondLst>
-                                            <p:cond delay="0"/>
-                                          </p:stCondLst>
-                                        </p:cTn>
-                                        <p:tgtEl>
-                                          <p:spTgt spid="7">
-                                            <p:txEl>
-                                              <p:pRg st="0" end="0"/>
-                                            </p:txEl>
-                                          </p:spTgt>
-                                        </p:tgtEl>
-                                        <p:attrNameLst>
-                                          <p:attrName>style.visibility</p:attrName>
-                                        </p:attrNameLst>
-                                      </p:cBhvr>
-                                      <p:to>
-                                        <p:strVal val="visible"/>
-                                      </p:to>
-                                    </p:set>
-                                    <p:anim calcmode="lin" valueType="num">
-                                      <p:cBhvr additive="base">
-                                        <p:cTn id="7" dur="500" fill="hold"/>
-                                        <p:tgtEl>
-                                          <p:spTgt spid="7">
-                                            <p:txEl>
-                                              <p:pRg st="0" end="0"/>
-                                            </p:txEl>
-                                          </p:spTgt>
-                                        </p:tgtEl>
-                                        <p:attrNameLst>
-                                          <p:attrName>ppt_x</p:attrName>
-                                        </p:attrNameLst>
-                                      </p:cBhvr>
-                                      <p:tavLst>
-                                        <p:tav tm="0">
-                                          <p:val>
-                                            <p:strVal val="#ppt_x"/>
-                                          </p:val>
-                                        </p:tav>
-                                        <p:tav tm="100000">
-                                          <p:val>
-                                            <p:strVal val="#ppt_x"/>
-                                          </p:val>
-                                        </p:tav>
-                                      </p:tavLst>
-                                    </p:anim>
-                                    <p:anim calcmode="lin" valueType="num">
-                                      <p:cBhvr additive="base">
-                                        <p:cTn id="8" dur="500" fill="hold"/>
-                                        <p:tgtEl>
-                                          <p:spTgt spid="7">
-                                            <p:txEl>
-                                              <p:pRg st="0" end="0"/>
-                                            </p:txEl>
-                                          </p:spTgt>
-                                        </p:tgtEl>
-                                        <p:attrNameLst>
-                                          <p:attrName>ppt_y</p:attrName>
-                                        </p:attrNameLst>
-                                      </p:cBhvr>
-                                      <p:tavLst>
-                                        <p:tav tm="0">
-                                          <p:val>
-                                            <p:strVal val="1+#ppt_h/2"/>
-                                          </p:val>
-                                        </p:tav>
-                                        <p:tav tm="100000">
-                                          <p:val>
-                                            <p:strVal val="#ppt_y"/>
-                                          </p:val>
-                                        </p:tav>
-                                      </p:tavLst>
-                                    </p:anim>
-                                  </p:childTnLst>
-                                </p:cTn>
-                              </p:par>
-                            </p:childTnLst>
-                          </p:cTn>
-                        </p:par>
-                      </p:childTnLst>
-                    </p:cTn>
-                  </p:par>
-                  <p:par>
-                    <p:cTn id="9" fill="hold">
-                      <p:stCondLst>
-                        <p:cond delay="indefinite"/>
-                      </p:stCondLst>
-                      <p:childTnLst>
-                        <p:par>
-                          <p:cTn id="10" fill="hold">
-                            <p:stCondLst>
-                              <p:cond delay="0"/>
-                            </p:stCondLst>
-                            <p:childTnLst>
-                              <p:par>
-                                <p:cTn id="11" presetID="2" presetClass="entr" presetSubtype="4" fill="hold" grpId="0" nodeType="clickEffect">
-                                  <p:stCondLst>
-                                    <p:cond delay="0"/>
-                                  </p:stCondLst>
-                                  <p:childTnLst>
-                                    <p:set>
-                                      <p:cBhvr>
-                                        <p:cTn id="12" dur="1" fill="hold">
-                                          <p:stCondLst>
-                                            <p:cond delay="0"/>
-                                          </p:stCondLst>
-                                        </p:cTn>
-                                        <p:tgtEl>
-                                          <p:spTgt spid="7">
-                                            <p:txEl>
-                                              <p:pRg st="2" end="2"/>
-                                            </p:txEl>
-                                          </p:spTgt>
-                                        </p:tgtEl>
-                                        <p:attrNameLst>
-                                          <p:attrName>style.visibility</p:attrName>
-                                        </p:attrNameLst>
-                                      </p:cBhvr>
-                                      <p:to>
-                                        <p:strVal val="visible"/>
-                                      </p:to>
-                                    </p:set>
-                                    <p:anim calcmode="lin" valueType="num">
-                                      <p:cBhvr additive="base">
-                                        <p:cTn id="13" dur="500" fill="hold"/>
-                                        <p:tgtEl>
-                                          <p:spTgt spid="7">
-                                            <p:txEl>
-                                              <p:pRg st="2" end="2"/>
-                                            </p:txEl>
-                                          </p:spTgt>
-                                        </p:tgtEl>
-                                        <p:attrNameLst>
-                                          <p:attrName>ppt_x</p:attrName>
-                                        </p:attrNameLst>
-                                      </p:cBhvr>
-                                      <p:tavLst>
-                                        <p:tav tm="0">
-                                          <p:val>
-                                            <p:strVal val="#ppt_x"/>
-                                          </p:val>
-                                        </p:tav>
-                                        <p:tav tm="100000">
-                                          <p:val>
-                                            <p:strVal val="#ppt_x"/>
-                                          </p:val>
-                                        </p:tav>
-                                      </p:tavLst>
-                                    </p:anim>
-                                    <p:anim calcmode="lin" valueType="num">
-                                      <p:cBhvr additive="base">
-                                        <p:cTn id="14" dur="500" fill="hold"/>
-                                        <p:tgtEl>
-                                          <p:spTgt spid="7">
-                                            <p:txEl>
-                                              <p:pRg st="2" end="2"/>
-                                            </p:txEl>
-                                          </p:spTgt>
-                                        </p:tgtEl>
-                                        <p:attrNameLst>
-                                          <p:attrName>ppt_y</p:attrName>
-                                        </p:attrNameLst>
-                                      </p:cBhvr>
-                                      <p:tavLst>
-                                        <p:tav tm="0">
-                                          <p:val>
-                                            <p:strVal val="1+#ppt_h/2"/>
-                                          </p:val>
-                                        </p:tav>
-                                        <p:tav tm="100000">
-                                          <p:val>
-                                            <p:strVal val="#ppt_y"/>
-                                          </p:val>
-                                        </p:tav>
-                                      </p:tavLst>
-                                    </p:anim>
-                                  </p:childTnLst>
-                                </p:cTn>
-                              </p:par>
-                            </p:childTnLst>
-                          </p:cTn>
-                        </p:par>
-                      </p:childTnLst>
-                    </p:cTn>
-                  </p:par>
-                  <p:par>
-                    <p:cTn id="15" fill="hold">
-                      <p:stCondLst>
-                        <p:cond delay="indefinite"/>
-                      </p:stCondLst>
-                      <p:childTnLst>
-                        <p:par>
-                          <p:cTn id="16" fill="hold">
-                            <p:stCondLst>
-                              <p:cond delay="0"/>
-                            </p:stCondLst>
-                            <p:childTnLst>
-                              <p:par>
-                                <p:cTn id="17" presetID="2" presetClass="entr" presetSubtype="4" fill="hold" grpId="0" nodeType="clickEffect">
-                                  <p:stCondLst>
-                                    <p:cond delay="0"/>
-                                  </p:stCondLst>
-                                  <p:childTnLst>
-                                    <p:set>
-                                      <p:cBhvr>
-                                        <p:cTn id="18" dur="1" fill="hold">
-                                          <p:stCondLst>
-                                            <p:cond delay="0"/>
-                                          </p:stCondLst>
-                                        </p:cTn>
-                                        <p:tgtEl>
-                                          <p:spTgt spid="7">
-                                            <p:txEl>
-                                              <p:pRg st="3" end="3"/>
-                                            </p:txEl>
-                                          </p:spTgt>
-                                        </p:tgtEl>
-                                        <p:attrNameLst>
-                                          <p:attrName>style.visibility</p:attrName>
-                                        </p:attrNameLst>
-                                      </p:cBhvr>
-                                      <p:to>
-                                        <p:strVal val="visible"/>
-                                      </p:to>
-                                    </p:set>
-                                    <p:anim calcmode="lin" valueType="num">
-                                      <p:cBhvr additive="base">
-                                        <p:cTn id="19" dur="500" fill="hold"/>
-                                        <p:tgtEl>
-                                          <p:spTgt spid="7">
-                                            <p:txEl>
-                                              <p:pRg st="3" end="3"/>
-                                            </p:txEl>
-                                          </p:spTgt>
-                                        </p:tgtEl>
-                                        <p:attrNameLst>
-                                          <p:attrName>ppt_x</p:attrName>
-                                        </p:attrNameLst>
-                                      </p:cBhvr>
-                                      <p:tavLst>
-                                        <p:tav tm="0">
-                                          <p:val>
-                                            <p:strVal val="#ppt_x"/>
-                                          </p:val>
-                                        </p:tav>
-                                        <p:tav tm="100000">
-                                          <p:val>
-                                            <p:strVal val="#ppt_x"/>
-                                          </p:val>
-                                        </p:tav>
-                                      </p:tavLst>
-                                    </p:anim>
-                                    <p:anim calcmode="lin" valueType="num">
-                                      <p:cBhvr additive="base">
-                                        <p:cTn id="20" dur="500" fill="hold"/>
-                                        <p:tgtEl>
-                                          <p:spTgt spid="7">
-                                            <p:txEl>
-                                              <p:pRg st="3" end="3"/>
-                                            </p:txEl>
-                                          </p:spTgt>
-                                        </p:tgtEl>
-                                        <p:attrNameLst>
-                                          <p:attrName>ppt_y</p:attrName>
-                                        </p:attrNameLst>
-                                      </p:cBhvr>
-                                      <p:tavLst>
-                                        <p:tav tm="0">
-                                          <p:val>
-                                            <p:strVal val="1+#ppt_h/2"/>
-                                          </p:val>
-                                        </p:tav>
-                                        <p:tav tm="100000">
-                                          <p:val>
-                                            <p:strVal val="#ppt_y"/>
-                                          </p:val>
-                                        </p:tav>
-                                      </p:tavLst>
-                                    </p:anim>
-                                  </p:childTnLst>
-                                </p:cTn>
-                              </p:par>
-                            </p:childTnLst>
-                          </p:cTn>
-                        </p:par>
-                      </p:childTnLst>
-                    </p:cTn>
-                  </p:par>
-                </p:childTnLst>
-              </p:cTn>
-              <p:prevCondLst>
-                <p:cond evt="onPrev" delay="0">
-                  <p:tgtEl>
-                    <p:sldTgt/>
-                  </p:tgtEl>
-                </p:cond>
-              </p:prevCondLst>
-              <p:nextCondLst>
-                <p:cond evt="onNext" delay="0">
-                  <p:tgtEl>
-                    <p:sldTgt/>
-                  </p:tgtEl>
-                </p:cond>
-              </p:nextCondLst>
-            </p:seq>
-          </p:childTnLst>
-        </p:cTn>
-      </p:par>
-    </p:tnLst>
-    <p:bldLst>
-      <p:bldP spid="7" grpId="0" build="p"/>
-    </p:bldLst>
-  </p:timing>
-</p:sld>
-</file>
-
-<file path=ppt/slides/slide17.xml><?xml version="1.0" encoding="utf-8"?>
-<p:sld xmlns:a="http://schemas.openxmlformats.org/drawingml/2006/main" xmlns:r="http://schemas.openxmlformats.org/officeDocument/2006/relationships" xmlns:p="http://schemas.openxmlformats.org/presentationml/2006/main">
-  <p:cSld>
-    <p:spTree>
-      <p:nvGrpSpPr>
-        <p:cNvPr id="1" name=""/>
-        <p:cNvGrpSpPr/>
-        <p:nvPr/>
-      </p:nvGrpSpPr>
-      <p:grpSpPr>
-        <a:xfrm>
-          <a:off x="0" y="0"/>
-          <a:ext cx="0" cy="0"/>
-          <a:chOff x="0" y="0"/>
-          <a:chExt cx="0" cy="0"/>
-        </a:xfrm>
-      </p:grpSpPr>
-      <p:sp>
-        <p:nvSpPr>
-          <p:cNvPr id="6" name="Title 5"/>
-          <p:cNvSpPr>
-            <a:spLocks noGrp="1"/>
-          </p:cNvSpPr>
-          <p:nvPr>
-            <p:ph type="title"/>
-          </p:nvPr>
-        </p:nvSpPr>
-        <p:spPr/>
-        <p:txBody>
-          <a:bodyPr/>
-          <a:lstStyle/>
-          <a:p>
-            <a:r>
-              <a:rPr lang="en-US" dirty="0" smtClean="0"/>
-              <a:t>if – Python Example</a:t>
-            </a:r>
-            <a:endParaRPr lang="en-US" dirty="0"/>
-          </a:p>
-        </p:txBody>
-      </p:sp>
-      <p:sp>
-        <p:nvSpPr>
-          <p:cNvPr id="7" name="Content Placeholder 6"/>
-          <p:cNvSpPr>
-            <a:spLocks noGrp="1"/>
-          </p:cNvSpPr>
-          <p:nvPr>
-            <p:ph idx="1"/>
-          </p:nvPr>
-        </p:nvSpPr>
-        <p:spPr/>
-        <p:txBody>
-          <a:bodyPr>
-            <a:normAutofit/>
-          </a:bodyPr>
-          <a:lstStyle/>
-          <a:p>
-            <a:pPr marL="57150" indent="0">
-              <a:buNone/>
-            </a:pPr>
-            <a:r>
-              <a:rPr lang="en-US" sz="3600" dirty="0" smtClean="0">
-                <a:solidFill>
-                  <a:srgbClr val="000000"/>
-                </a:solidFill>
-                <a:latin typeface="Consolas" panose="020B0609020204030204" pitchFamily="49" charset="0"/>
-              </a:rPr>
-              <a:t>color </a:t>
-            </a:r>
-            <a:r>
-              <a:rPr lang="en-US" sz="3600" dirty="0">
-                <a:solidFill>
-                  <a:srgbClr val="000000"/>
-                </a:solidFill>
-                <a:latin typeface="Consolas" panose="020B0609020204030204" pitchFamily="49" charset="0"/>
-              </a:rPr>
-              <a:t>= input(</a:t>
-            </a:r>
-            <a:r>
-              <a:rPr lang="en-US" sz="3600" dirty="0">
-                <a:solidFill>
-                  <a:srgbClr val="A31515"/>
-                </a:solidFill>
-                <a:latin typeface="Consolas" panose="020B0609020204030204" pitchFamily="49" charset="0"/>
-              </a:rPr>
-              <a:t>"What is your </a:t>
-            </a:r>
-            <a:r>
-              <a:rPr lang="en-US" sz="3600" dirty="0" smtClean="0">
-                <a:solidFill>
-                  <a:srgbClr val="A31515"/>
-                </a:solidFill>
-                <a:latin typeface="Consolas" panose="020B0609020204030204" pitchFamily="49" charset="0"/>
-              </a:rPr>
-              <a:t>favorite color?"</a:t>
-            </a:r>
-            <a:r>
-              <a:rPr lang="en-US" sz="3600" dirty="0" smtClean="0">
-                <a:solidFill>
-                  <a:srgbClr val="000000"/>
-                </a:solidFill>
-                <a:latin typeface="Consolas" panose="020B0609020204030204" pitchFamily="49" charset="0"/>
-              </a:rPr>
-              <a:t>)</a:t>
-            </a:r>
-            <a:endParaRPr lang="en-US" sz="3600" dirty="0" smtClean="0">
-              <a:solidFill>
-                <a:srgbClr val="0000FF"/>
-              </a:solidFill>
-              <a:latin typeface="Consolas" panose="020B0609020204030204" pitchFamily="49" charset="0"/>
-            </a:endParaRPr>
-          </a:p>
-          <a:p>
-            <a:pPr marL="57150" indent="0">
-              <a:buNone/>
-            </a:pPr>
-            <a:endParaRPr lang="en-US" sz="3600" dirty="0" smtClean="0">
-              <a:solidFill>
-                <a:srgbClr val="0000FF"/>
-              </a:solidFill>
-              <a:latin typeface="Consolas" panose="020B0609020204030204" pitchFamily="49" charset="0"/>
-            </a:endParaRPr>
-          </a:p>
-          <a:p>
-            <a:pPr marL="57150" indent="0">
-              <a:buNone/>
-            </a:pPr>
-            <a:r>
-              <a:rPr lang="en-US" sz="3600" dirty="0" smtClean="0">
-                <a:solidFill>
-                  <a:srgbClr val="0000FF"/>
-                </a:solidFill>
-                <a:latin typeface="Consolas" panose="020B0609020204030204" pitchFamily="49" charset="0"/>
-              </a:rPr>
-              <a:t>if</a:t>
-            </a:r>
-            <a:r>
-              <a:rPr lang="en-US" sz="3600" dirty="0" smtClean="0">
-                <a:solidFill>
-                  <a:srgbClr val="000000"/>
-                </a:solidFill>
-                <a:latin typeface="Consolas" panose="020B0609020204030204" pitchFamily="49" charset="0"/>
-              </a:rPr>
-              <a:t> </a:t>
-            </a:r>
-            <a:r>
-              <a:rPr lang="en-US" sz="3600" dirty="0">
-                <a:solidFill>
-                  <a:srgbClr val="000000"/>
-                </a:solidFill>
-                <a:latin typeface="Consolas" panose="020B0609020204030204" pitchFamily="49" charset="0"/>
-              </a:rPr>
-              <a:t>color == </a:t>
-            </a:r>
-            <a:r>
-              <a:rPr lang="en-US" sz="3600" dirty="0">
-                <a:solidFill>
-                  <a:srgbClr val="A31515"/>
-                </a:solidFill>
-                <a:latin typeface="Consolas" panose="020B0609020204030204" pitchFamily="49" charset="0"/>
-              </a:rPr>
-              <a:t>"blue"</a:t>
-            </a:r>
-            <a:r>
-              <a:rPr lang="en-US" sz="3600" dirty="0">
-                <a:solidFill>
-                  <a:srgbClr val="000000"/>
-                </a:solidFill>
-                <a:latin typeface="Consolas" panose="020B0609020204030204" pitchFamily="49" charset="0"/>
-              </a:rPr>
-              <a:t>:</a:t>
-            </a:r>
-          </a:p>
-          <a:p>
-            <a:pPr marL="57150" indent="0">
-              <a:buNone/>
-            </a:pPr>
-            <a:r>
-              <a:rPr lang="en-US" sz="3600" dirty="0" smtClean="0">
-                <a:solidFill>
-                  <a:srgbClr val="000000"/>
-                </a:solidFill>
-                <a:latin typeface="Consolas" panose="020B0609020204030204" pitchFamily="49" charset="0"/>
-              </a:rPr>
-              <a:t>	print</a:t>
-            </a:r>
-            <a:r>
-              <a:rPr lang="en-US" sz="3600" dirty="0">
-                <a:solidFill>
-                  <a:srgbClr val="000000"/>
-                </a:solidFill>
-                <a:latin typeface="Consolas" panose="020B0609020204030204" pitchFamily="49" charset="0"/>
-              </a:rPr>
-              <a:t>(</a:t>
-            </a:r>
-            <a:r>
-              <a:rPr lang="en-US" sz="3600" dirty="0">
-                <a:solidFill>
-                  <a:srgbClr val="A31515"/>
-                </a:solidFill>
-                <a:latin typeface="Consolas" panose="020B0609020204030204" pitchFamily="49" charset="0"/>
-              </a:rPr>
-              <a:t>"That's my favorite too!"</a:t>
-            </a:r>
-            <a:r>
-              <a:rPr lang="en-US" sz="3600" dirty="0">
-                <a:solidFill>
-                  <a:srgbClr val="000000"/>
-                </a:solidFill>
-                <a:latin typeface="Consolas" panose="020B0609020204030204" pitchFamily="49" charset="0"/>
-              </a:rPr>
-              <a:t>)</a:t>
-            </a:r>
-          </a:p>
-          <a:p>
-            <a:pPr marL="57150" indent="0">
-              <a:buNone/>
-            </a:pPr>
-            <a:endParaRPr lang="en-US" sz="3600" dirty="0" smtClean="0"/>
-          </a:p>
-          <a:p>
-            <a:pPr marL="57150" indent="0">
-              <a:buNone/>
-            </a:pPr>
-            <a:endParaRPr lang="en-US" sz="3600" dirty="0"/>
-          </a:p>
-          <a:p>
-            <a:pPr marL="57150" indent="0" algn="ctr">
-              <a:buNone/>
-            </a:pPr>
-            <a:r>
-              <a:rPr lang="en-US" sz="4000" dirty="0" smtClean="0"/>
-              <a:t>What will this code do?</a:t>
-            </a:r>
-          </a:p>
-        </p:txBody>
-      </p:sp>
-    </p:spTree>
-    <p:extLst>
-      <p:ext uri="{BB962C8B-B14F-4D97-AF65-F5344CB8AC3E}">
-        <p14:creationId xmlns:p14="http://schemas.microsoft.com/office/powerpoint/2010/main" val="124400724"/>
-      </p:ext>
-    </p:extLst>
-  </p:cSld>
-  <p:clrMapOvr>
-    <a:masterClrMapping/>
-  </p:clrMapOvr>
-  <p:transition spd="med">
-    <p:pull/>
-  </p:transition>
-  <p:timing>
-    <p:tnLst>
-      <p:par>
-        <p:cTn id="1" dur="indefinite" restart="never" nodeType="tmRoot"/>
-      </p:par>
-    </p:tnLst>
-  </p:timing>
-</p:sld>
-</file>
-
-<file path=ppt/slides/slide18.xml><?xml version="1.0" encoding="utf-8"?>
-<p:sld xmlns:a="http://schemas.openxmlformats.org/drawingml/2006/main" xmlns:r="http://schemas.openxmlformats.org/officeDocument/2006/relationships" xmlns:p="http://schemas.openxmlformats.org/presentationml/2006/main">
-  <p:cSld>
-    <p:spTree>
-      <p:nvGrpSpPr>
-        <p:cNvPr id="1" name=""/>
-        <p:cNvGrpSpPr/>
-        <p:nvPr/>
-      </p:nvGrpSpPr>
-      <p:grpSpPr>
-        <a:xfrm>
-          <a:off x="0" y="0"/>
-          <a:ext cx="0" cy="0"/>
-          <a:chOff x="0" y="0"/>
-          <a:chExt cx="0" cy="0"/>
-        </a:xfrm>
-      </p:grpSpPr>
-      <p:pic>
-        <p:nvPicPr>
-          <p:cNvPr id="3" name="zoom_0">
-            <a:hlinkClick r:id="" action="ppaction://media"/>
-          </p:cNvPr>
-          <p:cNvPicPr>
-            <a:picLocks noChangeAspect="1"/>
-          </p:cNvPicPr>
-          <p:nvPr>
-            <a:videoFile r:link="rId1"/>
-            <p:extLst>
-              <p:ext uri="{DAA4B4D4-6D71-4841-9C94-3DE7FCFB9230}">
-                <p14:media xmlns:p14="http://schemas.microsoft.com/office/powerpoint/2010/main" r:embed="rId2">
-                  <p14:trim st="7461" end="5492"/>
-                </p14:media>
-              </p:ext>
-            </p:extLst>
-          </p:nvPr>
-        </p:nvPicPr>
-        <p:blipFill>
-          <a:blip r:embed="rId4"/>
-          <a:stretch>
-            <a:fillRect/>
-          </a:stretch>
-        </p:blipFill>
-        <p:spPr>
-          <a:xfrm>
-            <a:off x="0" y="0"/>
-            <a:ext cx="12192000" cy="6858000"/>
-          </a:xfrm>
-          <a:prstGeom prst="rect">
-            <a:avLst/>
-          </a:prstGeom>
-        </p:spPr>
-      </p:pic>
-    </p:spTree>
-    <p:extLst>
-      <p:ext uri="{BB962C8B-B14F-4D97-AF65-F5344CB8AC3E}">
-        <p14:creationId xmlns:p14="http://schemas.microsoft.com/office/powerpoint/2010/main" val="3820579153"/>
-      </p:ext>
-    </p:extLst>
-  </p:cSld>
-  <p:clrMapOvr>
-    <a:masterClrMapping/>
-  </p:clrMapOvr>
-  <p:transition>
-    <p:fade/>
-  </p:transition>
-  <p:timing>
-    <p:tnLst>
-      <p:par>
-        <p:cTn id="1" dur="indefinite" restart="never" nodeType="tmRoot">
-          <p:childTnLst>
-            <p:seq concurrent="1" nextAc="seek">
-              <p:cTn id="2" dur="indefinite" nodeType="mainSeq">
-                <p:childTnLst>
-                  <p:par>
-                    <p:cTn id="3" fill="hold">
-                      <p:stCondLst>
-                        <p:cond delay="indefinite"/>
-                        <p:cond evt="onBegin" delay="0">
-                          <p:tn val="2"/>
-                        </p:cond>
-                      </p:stCondLst>
-                      <p:childTnLst>
-                        <p:par>
-                          <p:cTn id="4" fill="hold">
-                            <p:stCondLst>
-                              <p:cond delay="0"/>
-                            </p:stCondLst>
-                            <p:childTnLst>
-                              <p:par>
-                                <p:cTn id="5" presetID="1" presetClass="mediacall" presetSubtype="0" fill="hold" nodeType="afterEffect">
-                                  <p:stCondLst>
-                                    <p:cond delay="0"/>
-                                  </p:stCondLst>
-                                  <p:childTnLst>
-                                    <p:cmd type="call" cmd="playFrom(0.0)">
-                                      <p:cBhvr>
-                                        <p:cTn id="6" dur="19607" fill="hold"/>
-                                        <p:tgtEl>
-                                          <p:spTgt spid="3"/>
-                                        </p:tgtEl>
-                                      </p:cBhvr>
-                                    </p:cmd>
-                                  </p:childTnLst>
-                                </p:cTn>
-                              </p:par>
-                            </p:childTnLst>
-                          </p:cTn>
-                        </p:par>
-                      </p:childTnLst>
-                    </p:cTn>
-                  </p:par>
-                </p:childTnLst>
-              </p:cTn>
-              <p:prevCondLst>
-                <p:cond evt="onPrev" delay="0">
-                  <p:tgtEl>
-                    <p:sldTgt/>
-                  </p:tgtEl>
-                </p:cond>
-              </p:prevCondLst>
-              <p:nextCondLst>
-                <p:cond evt="onNext" delay="0">
-                  <p:tgtEl>
-                    <p:sldTgt/>
-                  </p:tgtEl>
-                </p:cond>
-              </p:nextCondLst>
-            </p:seq>
-            <p:video fullScrn="1">
-              <p:cMediaNode vol="80000">
-                <p:cTn id="7" fill="hold" display="0">
-                  <p:stCondLst>
-                    <p:cond delay="indefinite"/>
-                  </p:stCondLst>
-                </p:cTn>
-                <p:tgtEl>
-                  <p:spTgt spid="3"/>
-                </p:tgtEl>
-              </p:cMediaNode>
-            </p:video>
-            <p:seq concurrent="1" nextAc="seek">
-              <p:cTn id="8" restart="whenNotActive" fill="hold" evtFilter="cancelBubble" nodeType="interactiveSeq">
-                <p:stCondLst>
-                  <p:cond evt="onClick" delay="0">
-                    <p:tgtEl>
-                      <p:spTgt spid="3"/>
-                    </p:tgtEl>
-                  </p:cond>
-                </p:stCondLst>
-                <p:endSync evt="end" delay="0">
-                  <p:rtn val="all"/>
-                </p:endSync>
-                <p:childTnLst>
-                  <p:par>
-                    <p:cTn id="9" fill="hold">
-                      <p:stCondLst>
-                        <p:cond delay="0"/>
-                      </p:stCondLst>
-                      <p:childTnLst>
-                        <p:par>
-                          <p:cTn id="10" fill="hold">
-                            <p:stCondLst>
-                              <p:cond delay="0"/>
-                            </p:stCondLst>
-                            <p:childTnLst>
-                              <p:par>
-                                <p:cTn id="11" presetID="2" presetClass="mediacall" presetSubtype="0" fill="hold" nodeType="clickEffect">
-                                  <p:stCondLst>
-                                    <p:cond delay="0"/>
-                                  </p:stCondLst>
-                                  <p:childTnLst>
-                                    <p:cmd type="call" cmd="togglePause">
-                                      <p:cBhvr>
-                                        <p:cTn id="12" dur="1" fill="hold"/>
-                                        <p:tgtEl>
-                                          <p:spTgt spid="3"/>
-                                        </p:tgtEl>
-                                      </p:cBhvr>
-                                    </p:cmd>
-                                  </p:childTnLst>
-                                </p:cTn>
-                              </p:par>
-                            </p:childTnLst>
-                          </p:cTn>
-                        </p:par>
-                      </p:childTnLst>
-                    </p:cTn>
-                  </p:par>
-                </p:childTnLst>
-              </p:cTn>
-              <p:nextCondLst>
-                <p:cond evt="onClick" delay="0">
-                  <p:tgtEl>
-                    <p:spTgt spid="3"/>
-                  </p:tgtEl>
-                </p:cond>
-              </p:nextCondLst>
-            </p:seq>
-          </p:childTnLst>
-        </p:cTn>
-      </p:par>
-    </p:tnLst>
-  </p:timing>
-</p:sld>
-</file>
-
-<file path=ppt/slides/slide19.xml><?xml version="1.0" encoding="utf-8"?>
-<p:sld xmlns:a="http://schemas.openxmlformats.org/drawingml/2006/main" xmlns:r="http://schemas.openxmlformats.org/officeDocument/2006/relationships" xmlns:p="http://schemas.openxmlformats.org/presentationml/2006/main">
-  <p:cSld>
-    <p:spTree>
-      <p:nvGrpSpPr>
-        <p:cNvPr id="1" name=""/>
-        <p:cNvGrpSpPr/>
-        <p:nvPr/>
-      </p:nvGrpSpPr>
-      <p:grpSpPr>
-        <a:xfrm>
-          <a:off x="0" y="0"/>
-          <a:ext cx="0" cy="0"/>
-          <a:chOff x="0" y="0"/>
-          <a:chExt cx="0" cy="0"/>
-        </a:xfrm>
-      </p:grpSpPr>
-      <p:sp>
-        <p:nvSpPr>
-          <p:cNvPr id="6" name="Title 5"/>
-          <p:cNvSpPr>
-            <a:spLocks noGrp="1"/>
-          </p:cNvSpPr>
-          <p:nvPr>
-            <p:ph type="title"/>
-          </p:nvPr>
-        </p:nvSpPr>
-        <p:spPr/>
-        <p:txBody>
-          <a:bodyPr/>
-          <a:lstStyle/>
-          <a:p>
-            <a:r>
-              <a:rPr lang="en-US" dirty="0" smtClean="0"/>
-              <a:t>if – Python Example</a:t>
-            </a:r>
-            <a:endParaRPr lang="en-US" dirty="0"/>
-          </a:p>
-        </p:txBody>
-      </p:sp>
-      <p:sp>
-        <p:nvSpPr>
-          <p:cNvPr id="7" name="Content Placeholder 6"/>
-          <p:cNvSpPr>
-            <a:spLocks noGrp="1"/>
-          </p:cNvSpPr>
-          <p:nvPr>
-            <p:ph idx="1"/>
-          </p:nvPr>
-        </p:nvSpPr>
-        <p:spPr/>
-        <p:txBody>
-          <a:bodyPr>
-            <a:normAutofit lnSpcReduction="10000"/>
-          </a:bodyPr>
-          <a:lstStyle/>
-          <a:p>
-            <a:pPr marL="57150" indent="0">
-              <a:buNone/>
-            </a:pPr>
-            <a:r>
-              <a:rPr lang="en-US" sz="3600" dirty="0">
-                <a:solidFill>
-                  <a:srgbClr val="000000"/>
-                </a:solidFill>
-                <a:latin typeface="Consolas" panose="020B0609020204030204" pitchFamily="49" charset="0"/>
-              </a:rPr>
-              <a:t>color = input(</a:t>
-            </a:r>
-            <a:r>
-              <a:rPr lang="en-US" sz="3600" dirty="0">
-                <a:solidFill>
-                  <a:srgbClr val="A31515"/>
-                </a:solidFill>
-                <a:latin typeface="Consolas" panose="020B0609020204030204" pitchFamily="49" charset="0"/>
-              </a:rPr>
-              <a:t>"What is your favorite color</a:t>
-            </a:r>
-            <a:r>
-              <a:rPr lang="en-US" sz="3600" dirty="0" smtClean="0">
-                <a:solidFill>
-                  <a:srgbClr val="A31515"/>
-                </a:solidFill>
-                <a:latin typeface="Consolas" panose="020B0609020204030204" pitchFamily="49" charset="0"/>
-              </a:rPr>
-              <a:t>?"</a:t>
-            </a:r>
-            <a:r>
-              <a:rPr lang="en-US" sz="3600" dirty="0" smtClean="0">
-                <a:solidFill>
-                  <a:srgbClr val="000000"/>
-                </a:solidFill>
-                <a:latin typeface="Consolas" panose="020B0609020204030204" pitchFamily="49" charset="0"/>
-              </a:rPr>
-              <a:t>)</a:t>
-            </a:r>
-            <a:endParaRPr lang="en-US" sz="3600" dirty="0" smtClean="0">
-              <a:solidFill>
-                <a:srgbClr val="0000FF"/>
-              </a:solidFill>
-              <a:latin typeface="Consolas" panose="020B0609020204030204" pitchFamily="49" charset="0"/>
-            </a:endParaRPr>
-          </a:p>
-          <a:p>
-            <a:r>
-              <a:rPr lang="en-US" sz="3600" dirty="0" smtClean="0"/>
-              <a:t>The color the user enters </a:t>
-            </a:r>
-            <a:r>
-              <a:rPr lang="en-US" sz="3600" dirty="0"/>
-              <a:t>is stored in </a:t>
-            </a:r>
-            <a:r>
-              <a:rPr lang="en-US" sz="3600" dirty="0" smtClean="0">
-                <a:solidFill>
-                  <a:srgbClr val="000000"/>
-                </a:solidFill>
-                <a:latin typeface="Consolas" panose="020B0609020204030204" pitchFamily="49" charset="0"/>
-              </a:rPr>
-              <a:t>color</a:t>
-            </a:r>
-            <a:endParaRPr lang="en-US" sz="3600" dirty="0" smtClean="0">
-              <a:solidFill>
-                <a:srgbClr val="0000FF"/>
-              </a:solidFill>
-              <a:latin typeface="Consolas" panose="020B0609020204030204" pitchFamily="49" charset="0"/>
-            </a:endParaRPr>
-          </a:p>
-          <a:p>
-            <a:pPr marL="57150" indent="0">
-              <a:buNone/>
-            </a:pPr>
-            <a:endParaRPr lang="en-US" sz="3600" dirty="0" smtClean="0">
-              <a:solidFill>
-                <a:srgbClr val="0000FF"/>
-              </a:solidFill>
-              <a:latin typeface="Consolas" panose="020B0609020204030204" pitchFamily="49" charset="0"/>
-            </a:endParaRPr>
-          </a:p>
-          <a:p>
-            <a:pPr marL="57150" indent="0">
-              <a:buNone/>
-            </a:pPr>
-            <a:r>
-              <a:rPr lang="en-US" sz="3600" dirty="0" smtClean="0">
-                <a:solidFill>
-                  <a:srgbClr val="0000FF"/>
-                </a:solidFill>
-                <a:latin typeface="Consolas" panose="020B0609020204030204" pitchFamily="49" charset="0"/>
-              </a:rPr>
-              <a:t>if</a:t>
-            </a:r>
-            <a:r>
-              <a:rPr lang="en-US" sz="3600" dirty="0" smtClean="0">
-                <a:solidFill>
-                  <a:srgbClr val="000000"/>
-                </a:solidFill>
-                <a:latin typeface="Consolas" panose="020B0609020204030204" pitchFamily="49" charset="0"/>
-              </a:rPr>
-              <a:t> </a:t>
-            </a:r>
-            <a:r>
-              <a:rPr lang="en-US" sz="3600" dirty="0">
-                <a:solidFill>
-                  <a:srgbClr val="000000"/>
-                </a:solidFill>
-                <a:latin typeface="Consolas" panose="020B0609020204030204" pitchFamily="49" charset="0"/>
-              </a:rPr>
-              <a:t>color == </a:t>
-            </a:r>
-            <a:r>
-              <a:rPr lang="en-US" sz="3600" dirty="0">
-                <a:solidFill>
-                  <a:srgbClr val="A31515"/>
-                </a:solidFill>
-                <a:latin typeface="Consolas" panose="020B0609020204030204" pitchFamily="49" charset="0"/>
-              </a:rPr>
-              <a:t>"blue</a:t>
-            </a:r>
-            <a:r>
-              <a:rPr lang="en-US" sz="3600" dirty="0" smtClean="0">
-                <a:solidFill>
-                  <a:srgbClr val="A31515"/>
-                </a:solidFill>
-                <a:latin typeface="Consolas" panose="020B0609020204030204" pitchFamily="49" charset="0"/>
-              </a:rPr>
-              <a:t>"</a:t>
-            </a:r>
-            <a:r>
-              <a:rPr lang="en-US" sz="3600" dirty="0" smtClean="0">
-                <a:solidFill>
-                  <a:srgbClr val="000000"/>
-                </a:solidFill>
-                <a:latin typeface="Consolas" panose="020B0609020204030204" pitchFamily="49" charset="0"/>
-              </a:rPr>
-              <a:t>:</a:t>
-            </a:r>
-          </a:p>
-          <a:p>
-            <a:r>
-              <a:rPr lang="en-US" sz="3600" dirty="0" smtClean="0"/>
-              <a:t>The program checks </a:t>
-            </a:r>
-            <a:r>
-              <a:rPr lang="en-US" sz="3600" i="1" dirty="0" smtClean="0"/>
-              <a:t>if</a:t>
-            </a:r>
-            <a:r>
-              <a:rPr lang="en-US" sz="3600" dirty="0" smtClean="0"/>
-              <a:t> the color is </a:t>
-            </a:r>
-            <a:r>
-              <a:rPr lang="en-US" sz="3600" dirty="0" smtClean="0">
-                <a:solidFill>
-                  <a:schemeClr val="accent1"/>
-                </a:solidFill>
-              </a:rPr>
-              <a:t>blue</a:t>
-            </a:r>
-          </a:p>
-          <a:p>
-            <a:endParaRPr lang="en-US" sz="3600" dirty="0">
-              <a:solidFill>
-                <a:srgbClr val="000000"/>
-              </a:solidFill>
-              <a:latin typeface="Consolas" panose="020B0609020204030204" pitchFamily="49" charset="0"/>
-            </a:endParaRPr>
-          </a:p>
-          <a:p>
-            <a:pPr marL="57150" indent="0">
-              <a:buNone/>
-            </a:pPr>
-            <a:r>
-              <a:rPr lang="en-US" sz="3600" dirty="0" smtClean="0">
-                <a:solidFill>
-                  <a:srgbClr val="000000"/>
-                </a:solidFill>
-                <a:latin typeface="Consolas" panose="020B0609020204030204" pitchFamily="49" charset="0"/>
-              </a:rPr>
-              <a:t>	print</a:t>
-            </a:r>
-            <a:r>
-              <a:rPr lang="en-US" sz="3600" dirty="0">
-                <a:solidFill>
-                  <a:srgbClr val="000000"/>
-                </a:solidFill>
-                <a:latin typeface="Consolas" panose="020B0609020204030204" pitchFamily="49" charset="0"/>
-              </a:rPr>
-              <a:t>(</a:t>
-            </a:r>
-            <a:r>
-              <a:rPr lang="en-US" sz="3600" dirty="0">
-                <a:solidFill>
-                  <a:srgbClr val="A31515"/>
-                </a:solidFill>
-                <a:latin typeface="Consolas" panose="020B0609020204030204" pitchFamily="49" charset="0"/>
-              </a:rPr>
-              <a:t>"That's my favorite too</a:t>
-            </a:r>
-            <a:r>
-              <a:rPr lang="en-US" sz="3600" dirty="0" smtClean="0">
-                <a:solidFill>
-                  <a:srgbClr val="A31515"/>
-                </a:solidFill>
-                <a:latin typeface="Consolas" panose="020B0609020204030204" pitchFamily="49" charset="0"/>
-              </a:rPr>
-              <a:t>!"</a:t>
-            </a:r>
-            <a:r>
-              <a:rPr lang="en-US" sz="3600" dirty="0" smtClean="0">
-                <a:solidFill>
-                  <a:srgbClr val="000000"/>
-                </a:solidFill>
-                <a:latin typeface="Consolas" panose="020B0609020204030204" pitchFamily="49" charset="0"/>
-              </a:rPr>
-              <a:t>)</a:t>
-            </a:r>
-          </a:p>
-          <a:p>
-            <a:pPr lvl="3"/>
-            <a:r>
-              <a:rPr lang="en-US" sz="2600" dirty="0" smtClean="0"/>
-              <a:t>If it is, the program prints out the message</a:t>
-            </a:r>
-            <a:endParaRPr lang="en-US" sz="2600" dirty="0">
-              <a:solidFill>
-                <a:srgbClr val="000000"/>
-              </a:solidFill>
-              <a:latin typeface="Consolas" panose="020B0609020204030204" pitchFamily="49" charset="0"/>
-            </a:endParaRPr>
-          </a:p>
-          <a:p>
-            <a:pPr marL="57150" indent="0">
-              <a:buNone/>
-            </a:pPr>
-            <a:endParaRPr lang="en-US" sz="3600" dirty="0">
-              <a:solidFill>
-                <a:srgbClr val="000000"/>
-              </a:solidFill>
-              <a:latin typeface="Consolas" panose="020B0609020204030204" pitchFamily="49" charset="0"/>
-            </a:endParaRPr>
-          </a:p>
-        </p:txBody>
-      </p:sp>
-    </p:spTree>
-    <p:extLst>
-      <p:ext uri="{BB962C8B-B14F-4D97-AF65-F5344CB8AC3E}">
-        <p14:creationId xmlns:p14="http://schemas.microsoft.com/office/powerpoint/2010/main" val="1670044888"/>
-      </p:ext>
-    </p:extLst>
-  </p:cSld>
-  <p:clrMapOvr>
-    <a:masterClrMapping/>
-  </p:clrMapOvr>
-  <p:transition spd="med">
-    <p:pull/>
-  </p:transition>
-  <p:timing>
-    <p:tnLst>
-      <p:par>
-        <p:cTn id="1" dur="indefinite" restart="never" nodeType="tmRoot">
-          <p:childTnLst>
-            <p:seq concurrent="1" nextAc="seek">
-              <p:cTn id="2" dur="indefinite" nodeType="mainSeq">
-                <p:childTnLst>
-                  <p:par>
-                    <p:cTn id="3" fill="hold">
-                      <p:stCondLst>
-                        <p:cond delay="indefinite"/>
-                      </p:stCondLst>
-                      <p:childTnLst>
-                        <p:par>
-                          <p:cTn id="4" fill="hold">
-                            <p:stCondLst>
-                              <p:cond delay="0"/>
-                            </p:stCondLst>
-                            <p:childTnLst>
-                              <p:par>
-                                <p:cTn id="5" presetID="42" presetClass="entr" presetSubtype="0" fill="hold" grpId="0" nodeType="clickEffect">
-                                  <p:stCondLst>
-                                    <p:cond delay="0"/>
-                                  </p:stCondLst>
-                                  <p:childTnLst>
-                                    <p:set>
-                                      <p:cBhvr>
-                                        <p:cTn id="6" dur="1" fill="hold">
-                                          <p:stCondLst>
-                                            <p:cond delay="0"/>
-                                          </p:stCondLst>
-                                        </p:cTn>
-                                        <p:tgtEl>
-                                          <p:spTgt spid="7">
-                                            <p:txEl>
-                                              <p:pRg st="0" end="0"/>
-                                            </p:txEl>
-                                          </p:spTgt>
-                                        </p:tgtEl>
-                                        <p:attrNameLst>
-                                          <p:attrName>style.visibility</p:attrName>
-                                        </p:attrNameLst>
-                                      </p:cBhvr>
-                                      <p:to>
-                                        <p:strVal val="visible"/>
-                                      </p:to>
-                                    </p:set>
-                                    <p:animEffect transition="in" filter="fade">
-                                      <p:cBhvr>
-                                        <p:cTn id="7" dur="500"/>
-                                        <p:tgtEl>
-                                          <p:spTgt spid="7">
-                                            <p:txEl>
-                                              <p:pRg st="0" end="0"/>
-                                            </p:txEl>
-                                          </p:spTgt>
-                                        </p:tgtEl>
-                                      </p:cBhvr>
-                                    </p:animEffect>
-                                    <p:anim calcmode="lin" valueType="num">
-                                      <p:cBhvr>
-                                        <p:cTn id="8" dur="500" fill="hold"/>
-                                        <p:tgtEl>
-                                          <p:spTgt spid="7">
-                                            <p:txEl>
-                                              <p:pRg st="0" end="0"/>
-                                            </p:txEl>
-                                          </p:spTgt>
-                                        </p:tgtEl>
-                                        <p:attrNameLst>
-                                          <p:attrName>ppt_x</p:attrName>
-                                        </p:attrNameLst>
-                                      </p:cBhvr>
-                                      <p:tavLst>
-                                        <p:tav tm="0">
-                                          <p:val>
-                                            <p:strVal val="#ppt_x"/>
-                                          </p:val>
-                                        </p:tav>
-                                        <p:tav tm="100000">
-                                          <p:val>
-                                            <p:strVal val="#ppt_x"/>
-                                          </p:val>
-                                        </p:tav>
-                                      </p:tavLst>
-                                    </p:anim>
-                                    <p:anim calcmode="lin" valueType="num">
-                                      <p:cBhvr>
-                                        <p:cTn id="9" dur="500" fill="hold"/>
-                                        <p:tgtEl>
-                                          <p:spTgt spid="7">
-                                            <p:txEl>
-                                              <p:pRg st="0" end="0"/>
-                                            </p:txEl>
-                                          </p:spTgt>
-                                        </p:tgtEl>
-                                        <p:attrNameLst>
-                                          <p:attrName>ppt_y</p:attrName>
-                                        </p:attrNameLst>
-                                      </p:cBhvr>
-                                      <p:tavLst>
-                                        <p:tav tm="0">
-                                          <p:val>
-                                            <p:strVal val="#ppt_y+.1"/>
-                                          </p:val>
-                                        </p:tav>
-                                        <p:tav tm="100000">
-                                          <p:val>
-                                            <p:strVal val="#ppt_y"/>
-                                          </p:val>
-                                        </p:tav>
-                                      </p:tavLst>
-                                    </p:anim>
-                                  </p:childTnLst>
-                                </p:cTn>
-                              </p:par>
-                            </p:childTnLst>
-                          </p:cTn>
-                        </p:par>
-                      </p:childTnLst>
-                    </p:cTn>
-                  </p:par>
-                  <p:par>
-                    <p:cTn id="10" fill="hold">
-                      <p:stCondLst>
-                        <p:cond delay="indefinite"/>
-                      </p:stCondLst>
-                      <p:childTnLst>
-                        <p:par>
-                          <p:cTn id="11" fill="hold">
-                            <p:stCondLst>
-                              <p:cond delay="0"/>
-                            </p:stCondLst>
-                            <p:childTnLst>
-                              <p:par>
-                                <p:cTn id="12" presetID="42" presetClass="entr" presetSubtype="0" fill="hold" grpId="0" nodeType="clickEffect">
-                                  <p:stCondLst>
-                                    <p:cond delay="0"/>
-                                  </p:stCondLst>
-                                  <p:childTnLst>
-                                    <p:set>
-                                      <p:cBhvr>
-                                        <p:cTn id="13" dur="1" fill="hold">
-                                          <p:stCondLst>
-                                            <p:cond delay="0"/>
-                                          </p:stCondLst>
-                                        </p:cTn>
-                                        <p:tgtEl>
-                                          <p:spTgt spid="7">
-                                            <p:txEl>
-                                              <p:pRg st="1" end="1"/>
-                                            </p:txEl>
-                                          </p:spTgt>
-                                        </p:tgtEl>
-                                        <p:attrNameLst>
-                                          <p:attrName>style.visibility</p:attrName>
-                                        </p:attrNameLst>
-                                      </p:cBhvr>
-                                      <p:to>
-                                        <p:strVal val="visible"/>
-                                      </p:to>
-                                    </p:set>
-                                    <p:animEffect transition="in" filter="fade">
-                                      <p:cBhvr>
-                                        <p:cTn id="14" dur="500"/>
-                                        <p:tgtEl>
-                                          <p:spTgt spid="7">
-                                            <p:txEl>
-                                              <p:pRg st="1" end="1"/>
-                                            </p:txEl>
-                                          </p:spTgt>
-                                        </p:tgtEl>
-                                      </p:cBhvr>
-                                    </p:animEffect>
-                                    <p:anim calcmode="lin" valueType="num">
-                                      <p:cBhvr>
-                                        <p:cTn id="15" dur="500" fill="hold"/>
-                                        <p:tgtEl>
-                                          <p:spTgt spid="7">
-                                            <p:txEl>
-                                              <p:pRg st="1" end="1"/>
-                                            </p:txEl>
-                                          </p:spTgt>
-                                        </p:tgtEl>
-                                        <p:attrNameLst>
-                                          <p:attrName>ppt_x</p:attrName>
-                                        </p:attrNameLst>
-                                      </p:cBhvr>
-                                      <p:tavLst>
-                                        <p:tav tm="0">
-                                          <p:val>
-                                            <p:strVal val="#ppt_x"/>
-                                          </p:val>
-                                        </p:tav>
-                                        <p:tav tm="100000">
-                                          <p:val>
-                                            <p:strVal val="#ppt_x"/>
-                                          </p:val>
-                                        </p:tav>
-                                      </p:tavLst>
-                                    </p:anim>
-                                    <p:anim calcmode="lin" valueType="num">
-                                      <p:cBhvr>
-                                        <p:cTn id="16" dur="500" fill="hold"/>
-                                        <p:tgtEl>
-                                          <p:spTgt spid="7">
-                                            <p:txEl>
-                                              <p:pRg st="1" end="1"/>
-                                            </p:txEl>
-                                          </p:spTgt>
-                                        </p:tgtEl>
-                                        <p:attrNameLst>
-                                          <p:attrName>ppt_y</p:attrName>
-                                        </p:attrNameLst>
-                                      </p:cBhvr>
-                                      <p:tavLst>
-                                        <p:tav tm="0">
-                                          <p:val>
-                                            <p:strVal val="#ppt_y+.1"/>
-                                          </p:val>
-                                        </p:tav>
-                                        <p:tav tm="100000">
-                                          <p:val>
-                                            <p:strVal val="#ppt_y"/>
-                                          </p:val>
-                                        </p:tav>
-                                      </p:tavLst>
-                                    </p:anim>
-                                  </p:childTnLst>
-                                </p:cTn>
-                              </p:par>
-                            </p:childTnLst>
-                          </p:cTn>
-                        </p:par>
-                      </p:childTnLst>
-                    </p:cTn>
-                  </p:par>
-                  <p:par>
-                    <p:cTn id="17" fill="hold">
-                      <p:stCondLst>
-                        <p:cond delay="indefinite"/>
-                      </p:stCondLst>
-                      <p:childTnLst>
-                        <p:par>
-                          <p:cTn id="18" fill="hold">
-                            <p:stCondLst>
-                              <p:cond delay="0"/>
-                            </p:stCondLst>
-                            <p:childTnLst>
-                              <p:par>
-                                <p:cTn id="19" presetID="42" presetClass="entr" presetSubtype="0" fill="hold" grpId="0" nodeType="clickEffect">
-                                  <p:stCondLst>
-                                    <p:cond delay="0"/>
-                                  </p:stCondLst>
-                                  <p:childTnLst>
-                                    <p:set>
-                                      <p:cBhvr>
-                                        <p:cTn id="20" dur="1" fill="hold">
-                                          <p:stCondLst>
-                                            <p:cond delay="0"/>
-                                          </p:stCondLst>
-                                        </p:cTn>
-                                        <p:tgtEl>
-                                          <p:spTgt spid="7">
-                                            <p:txEl>
-                                              <p:pRg st="3" end="3"/>
-                                            </p:txEl>
-                                          </p:spTgt>
-                                        </p:tgtEl>
-                                        <p:attrNameLst>
-                                          <p:attrName>style.visibility</p:attrName>
-                                        </p:attrNameLst>
-                                      </p:cBhvr>
-                                      <p:to>
-                                        <p:strVal val="visible"/>
-                                      </p:to>
-                                    </p:set>
-                                    <p:animEffect transition="in" filter="fade">
-                                      <p:cBhvr>
-                                        <p:cTn id="21" dur="500"/>
-                                        <p:tgtEl>
-                                          <p:spTgt spid="7">
-                                            <p:txEl>
-                                              <p:pRg st="3" end="3"/>
-                                            </p:txEl>
-                                          </p:spTgt>
-                                        </p:tgtEl>
-                                      </p:cBhvr>
-                                    </p:animEffect>
-                                    <p:anim calcmode="lin" valueType="num">
-                                      <p:cBhvr>
-                                        <p:cTn id="22" dur="500" fill="hold"/>
-                                        <p:tgtEl>
-                                          <p:spTgt spid="7">
-                                            <p:txEl>
-                                              <p:pRg st="3" end="3"/>
-                                            </p:txEl>
-                                          </p:spTgt>
-                                        </p:tgtEl>
-                                        <p:attrNameLst>
-                                          <p:attrName>ppt_x</p:attrName>
-                                        </p:attrNameLst>
-                                      </p:cBhvr>
-                                      <p:tavLst>
-                                        <p:tav tm="0">
-                                          <p:val>
-                                            <p:strVal val="#ppt_x"/>
-                                          </p:val>
-                                        </p:tav>
-                                        <p:tav tm="100000">
-                                          <p:val>
-                                            <p:strVal val="#ppt_x"/>
-                                          </p:val>
-                                        </p:tav>
-                                      </p:tavLst>
-                                    </p:anim>
-                                    <p:anim calcmode="lin" valueType="num">
-                                      <p:cBhvr>
-                                        <p:cTn id="23" dur="500" fill="hold"/>
-                                        <p:tgtEl>
-                                          <p:spTgt spid="7">
-                                            <p:txEl>
-                                              <p:pRg st="3" end="3"/>
-                                            </p:txEl>
-                                          </p:spTgt>
-                                        </p:tgtEl>
-                                        <p:attrNameLst>
-                                          <p:attrName>ppt_y</p:attrName>
-                                        </p:attrNameLst>
-                                      </p:cBhvr>
-                                      <p:tavLst>
-                                        <p:tav tm="0">
-                                          <p:val>
-                                            <p:strVal val="#ppt_y+.1"/>
-                                          </p:val>
-                                        </p:tav>
-                                        <p:tav tm="100000">
-                                          <p:val>
-                                            <p:strVal val="#ppt_y"/>
-                                          </p:val>
-                                        </p:tav>
-                                      </p:tavLst>
-                                    </p:anim>
-                                  </p:childTnLst>
-                                </p:cTn>
-                              </p:par>
-                            </p:childTnLst>
-                          </p:cTn>
-                        </p:par>
-                      </p:childTnLst>
-                    </p:cTn>
-                  </p:par>
-                  <p:par>
-                    <p:cTn id="24" fill="hold">
-                      <p:stCondLst>
-                        <p:cond delay="indefinite"/>
-                      </p:stCondLst>
-                      <p:childTnLst>
-                        <p:par>
-                          <p:cTn id="25" fill="hold">
-                            <p:stCondLst>
-                              <p:cond delay="0"/>
-                            </p:stCondLst>
-                            <p:childTnLst>
-                              <p:par>
-                                <p:cTn id="26" presetID="42" presetClass="entr" presetSubtype="0" fill="hold" grpId="0" nodeType="clickEffect">
-                                  <p:stCondLst>
-                                    <p:cond delay="0"/>
-                                  </p:stCondLst>
-                                  <p:childTnLst>
-                                    <p:set>
-                                      <p:cBhvr>
-                                        <p:cTn id="27" dur="1" fill="hold">
-                                          <p:stCondLst>
-                                            <p:cond delay="0"/>
-                                          </p:stCondLst>
-                                        </p:cTn>
-                                        <p:tgtEl>
-                                          <p:spTgt spid="7">
-                                            <p:txEl>
-                                              <p:pRg st="4" end="4"/>
-                                            </p:txEl>
-                                          </p:spTgt>
-                                        </p:tgtEl>
-                                        <p:attrNameLst>
-                                          <p:attrName>style.visibility</p:attrName>
-                                        </p:attrNameLst>
-                                      </p:cBhvr>
-                                      <p:to>
-                                        <p:strVal val="visible"/>
-                                      </p:to>
-                                    </p:set>
-                                    <p:animEffect transition="in" filter="fade">
-                                      <p:cBhvr>
-                                        <p:cTn id="28" dur="500"/>
-                                        <p:tgtEl>
-                                          <p:spTgt spid="7">
-                                            <p:txEl>
-                                              <p:pRg st="4" end="4"/>
-                                            </p:txEl>
-                                          </p:spTgt>
-                                        </p:tgtEl>
-                                      </p:cBhvr>
-                                    </p:animEffect>
-                                    <p:anim calcmode="lin" valueType="num">
-                                      <p:cBhvr>
-                                        <p:cTn id="29" dur="500" fill="hold"/>
-                                        <p:tgtEl>
-                                          <p:spTgt spid="7">
-                                            <p:txEl>
-                                              <p:pRg st="4" end="4"/>
-                                            </p:txEl>
-                                          </p:spTgt>
-                                        </p:tgtEl>
-                                        <p:attrNameLst>
-                                          <p:attrName>ppt_x</p:attrName>
-                                        </p:attrNameLst>
-                                      </p:cBhvr>
-                                      <p:tavLst>
-                                        <p:tav tm="0">
-                                          <p:val>
-                                            <p:strVal val="#ppt_x"/>
-                                          </p:val>
-                                        </p:tav>
-                                        <p:tav tm="100000">
-                                          <p:val>
-                                            <p:strVal val="#ppt_x"/>
-                                          </p:val>
-                                        </p:tav>
-                                      </p:tavLst>
-                                    </p:anim>
-                                    <p:anim calcmode="lin" valueType="num">
-                                      <p:cBhvr>
-                                        <p:cTn id="30" dur="500" fill="hold"/>
-                                        <p:tgtEl>
-                                          <p:spTgt spid="7">
-                                            <p:txEl>
-                                              <p:pRg st="4" end="4"/>
-                                            </p:txEl>
-                                          </p:spTgt>
-                                        </p:tgtEl>
-                                        <p:attrNameLst>
-                                          <p:attrName>ppt_y</p:attrName>
-                                        </p:attrNameLst>
-                                      </p:cBhvr>
-                                      <p:tavLst>
-                                        <p:tav tm="0">
-                                          <p:val>
-                                            <p:strVal val="#ppt_y+.1"/>
-                                          </p:val>
-                                        </p:tav>
-                                        <p:tav tm="100000">
-                                          <p:val>
-                                            <p:strVal val="#ppt_y"/>
-                                          </p:val>
-                                        </p:tav>
-                                      </p:tavLst>
-                                    </p:anim>
-                                  </p:childTnLst>
-                                </p:cTn>
-                              </p:par>
-                            </p:childTnLst>
-                          </p:cTn>
-                        </p:par>
-                      </p:childTnLst>
-                    </p:cTn>
-                  </p:par>
-                  <p:par>
-                    <p:cTn id="31" fill="hold">
-                      <p:stCondLst>
-                        <p:cond delay="indefinite"/>
-                      </p:stCondLst>
-                      <p:childTnLst>
-                        <p:par>
-                          <p:cTn id="32" fill="hold">
-                            <p:stCondLst>
-                              <p:cond delay="0"/>
-                            </p:stCondLst>
-                            <p:childTnLst>
-                              <p:par>
-                                <p:cTn id="33" presetID="42" presetClass="entr" presetSubtype="0" fill="hold" grpId="0" nodeType="clickEffect">
-                                  <p:stCondLst>
-                                    <p:cond delay="0"/>
-                                  </p:stCondLst>
-                                  <p:childTnLst>
-                                    <p:set>
-                                      <p:cBhvr>
-                                        <p:cTn id="34" dur="1" fill="hold">
-                                          <p:stCondLst>
-                                            <p:cond delay="0"/>
-                                          </p:stCondLst>
-                                        </p:cTn>
-                                        <p:tgtEl>
-                                          <p:spTgt spid="7">
-                                            <p:txEl>
-                                              <p:pRg st="6" end="6"/>
-                                            </p:txEl>
-                                          </p:spTgt>
-                                        </p:tgtEl>
-                                        <p:attrNameLst>
-                                          <p:attrName>style.visibility</p:attrName>
-                                        </p:attrNameLst>
-                                      </p:cBhvr>
-                                      <p:to>
-                                        <p:strVal val="visible"/>
-                                      </p:to>
-                                    </p:set>
-                                    <p:animEffect transition="in" filter="fade">
-                                      <p:cBhvr>
-                                        <p:cTn id="35" dur="500"/>
-                                        <p:tgtEl>
-                                          <p:spTgt spid="7">
-                                            <p:txEl>
-                                              <p:pRg st="6" end="6"/>
-                                            </p:txEl>
-                                          </p:spTgt>
-                                        </p:tgtEl>
-                                      </p:cBhvr>
-                                    </p:animEffect>
-                                    <p:anim calcmode="lin" valueType="num">
-                                      <p:cBhvr>
-                                        <p:cTn id="36" dur="500" fill="hold"/>
-                                        <p:tgtEl>
-                                          <p:spTgt spid="7">
-                                            <p:txEl>
-                                              <p:pRg st="6" end="6"/>
-                                            </p:txEl>
-                                          </p:spTgt>
-                                        </p:tgtEl>
-                                        <p:attrNameLst>
-                                          <p:attrName>ppt_x</p:attrName>
-                                        </p:attrNameLst>
-                                      </p:cBhvr>
-                                      <p:tavLst>
-                                        <p:tav tm="0">
-                                          <p:val>
-                                            <p:strVal val="#ppt_x"/>
-                                          </p:val>
-                                        </p:tav>
-                                        <p:tav tm="100000">
-                                          <p:val>
-                                            <p:strVal val="#ppt_x"/>
-                                          </p:val>
-                                        </p:tav>
-                                      </p:tavLst>
-                                    </p:anim>
-                                    <p:anim calcmode="lin" valueType="num">
-                                      <p:cBhvr>
-                                        <p:cTn id="37" dur="500" fill="hold"/>
-                                        <p:tgtEl>
-                                          <p:spTgt spid="7">
-                                            <p:txEl>
-                                              <p:pRg st="6" end="6"/>
-                                            </p:txEl>
-                                          </p:spTgt>
-                                        </p:tgtEl>
-                                        <p:attrNameLst>
-                                          <p:attrName>ppt_y</p:attrName>
-                                        </p:attrNameLst>
-                                      </p:cBhvr>
-                                      <p:tavLst>
-                                        <p:tav tm="0">
-                                          <p:val>
-                                            <p:strVal val="#ppt_y+.1"/>
-                                          </p:val>
-                                        </p:tav>
-                                        <p:tav tm="100000">
-                                          <p:val>
-                                            <p:strVal val="#ppt_y"/>
-                                          </p:val>
-                                        </p:tav>
-                                      </p:tavLst>
-                                    </p:anim>
-                                  </p:childTnLst>
-                                </p:cTn>
-                              </p:par>
-                            </p:childTnLst>
-                          </p:cTn>
-                        </p:par>
-                      </p:childTnLst>
-                    </p:cTn>
-                  </p:par>
-                  <p:par>
-                    <p:cTn id="38" fill="hold">
-                      <p:stCondLst>
-                        <p:cond delay="indefinite"/>
-                      </p:stCondLst>
-                      <p:childTnLst>
-                        <p:par>
-                          <p:cTn id="39" fill="hold">
-                            <p:stCondLst>
-                              <p:cond delay="0"/>
-                            </p:stCondLst>
-                            <p:childTnLst>
-                              <p:par>
-                                <p:cTn id="40" presetID="42" presetClass="entr" presetSubtype="0" fill="hold" grpId="0" nodeType="clickEffect">
-                                  <p:stCondLst>
-                                    <p:cond delay="0"/>
-                                  </p:stCondLst>
-                                  <p:childTnLst>
-                                    <p:set>
-                                      <p:cBhvr>
-                                        <p:cTn id="41" dur="1" fill="hold">
-                                          <p:stCondLst>
-                                            <p:cond delay="0"/>
-                                          </p:stCondLst>
-                                        </p:cTn>
-                                        <p:tgtEl>
-                                          <p:spTgt spid="7">
-                                            <p:txEl>
-                                              <p:pRg st="7" end="7"/>
-                                            </p:txEl>
-                                          </p:spTgt>
-                                        </p:tgtEl>
-                                        <p:attrNameLst>
-                                          <p:attrName>style.visibility</p:attrName>
-                                        </p:attrNameLst>
-                                      </p:cBhvr>
-                                      <p:to>
-                                        <p:strVal val="visible"/>
-                                      </p:to>
-                                    </p:set>
-                                    <p:animEffect transition="in" filter="fade">
-                                      <p:cBhvr>
-                                        <p:cTn id="42" dur="500"/>
-                                        <p:tgtEl>
-                                          <p:spTgt spid="7">
-                                            <p:txEl>
-                                              <p:pRg st="7" end="7"/>
-                                            </p:txEl>
-                                          </p:spTgt>
-                                        </p:tgtEl>
-                                      </p:cBhvr>
-                                    </p:animEffect>
-                                    <p:anim calcmode="lin" valueType="num">
-                                      <p:cBhvr>
-                                        <p:cTn id="43" dur="500" fill="hold"/>
-                                        <p:tgtEl>
-                                          <p:spTgt spid="7">
-                                            <p:txEl>
-                                              <p:pRg st="7" end="7"/>
-                                            </p:txEl>
-                                          </p:spTgt>
-                                        </p:tgtEl>
-                                        <p:attrNameLst>
-                                          <p:attrName>ppt_x</p:attrName>
-                                        </p:attrNameLst>
-                                      </p:cBhvr>
-                                      <p:tavLst>
-                                        <p:tav tm="0">
-                                          <p:val>
-                                            <p:strVal val="#ppt_x"/>
-                                          </p:val>
-                                        </p:tav>
-                                        <p:tav tm="100000">
-                                          <p:val>
-                                            <p:strVal val="#ppt_x"/>
-                                          </p:val>
-                                        </p:tav>
-                                      </p:tavLst>
-                                    </p:anim>
-                                    <p:anim calcmode="lin" valueType="num">
-                                      <p:cBhvr>
-                                        <p:cTn id="44" dur="500" fill="hold"/>
-                                        <p:tgtEl>
-                                          <p:spTgt spid="7">
-                                            <p:txEl>
-                                              <p:pRg st="7" end="7"/>
-                                            </p:txEl>
-                                          </p:spTgt>
-                                        </p:tgtEl>
-                                        <p:attrNameLst>
-                                          <p:attrName>ppt_y</p:attrName>
-                                        </p:attrNameLst>
-                                      </p:cBhvr>
-                                      <p:tavLst>
-                                        <p:tav tm="0">
-                                          <p:val>
-                                            <p:strVal val="#ppt_y+.1"/>
-                                          </p:val>
-                                        </p:tav>
-                                        <p:tav tm="100000">
-                                          <p:val>
-                                            <p:strVal val="#ppt_y"/>
-                                          </p:val>
-                                        </p:tav>
-                                      </p:tavLst>
-                                    </p:anim>
-                                  </p:childTnLst>
-                                </p:cTn>
-                              </p:par>
-                            </p:childTnLst>
-                          </p:cTn>
-                        </p:par>
-                      </p:childTnLst>
-                    </p:cTn>
-                  </p:par>
-                </p:childTnLst>
-              </p:cTn>
-              <p:prevCondLst>
-                <p:cond evt="onPrev" delay="0">
-                  <p:tgtEl>
-                    <p:sldTgt/>
-                  </p:tgtEl>
-                </p:cond>
-              </p:prevCondLst>
-              <p:nextCondLst>
-                <p:cond evt="onNext" delay="0">
-                  <p:tgtEl>
-                    <p:sldTgt/>
-                  </p:tgtEl>
-                </p:cond>
-              </p:nextCondLst>
-            </p:seq>
-          </p:childTnLst>
-        </p:cTn>
-      </p:par>
-    </p:tnLst>
-    <p:bldLst>
-      <p:bldP spid="7" grpId="0" uiExpand="1" build="p"/>
-    </p:bldLst>
-  </p:timing>
-</p:sld>
-</file>
-
-<file path=ppt/slides/slide2.xml><?xml version="1.0" encoding="utf-8"?>
-<p:sld xmlns:a="http://schemas.openxmlformats.org/drawingml/2006/main" xmlns:r="http://schemas.openxmlformats.org/officeDocument/2006/relationships" xmlns:p="http://schemas.openxmlformats.org/presentationml/2006/main">
-  <p:cSld>
-    <p:spTree>
-      <p:nvGrpSpPr>
-        <p:cNvPr id="1" name=""/>
-        <p:cNvGrpSpPr/>
-        <p:nvPr/>
-      </p:nvGrpSpPr>
-      <p:grpSpPr>
-        <a:xfrm>
-          <a:off x="0" y="0"/>
-          <a:ext cx="0" cy="0"/>
-          <a:chOff x="0" y="0"/>
-          <a:chExt cx="0" cy="0"/>
-        </a:xfrm>
-      </p:grpSpPr>
-      <p:sp>
-        <p:nvSpPr>
-          <p:cNvPr id="6" name="Title 5"/>
-          <p:cNvSpPr>
-            <a:spLocks noGrp="1"/>
-          </p:cNvSpPr>
-          <p:nvPr>
-            <p:ph type="title"/>
-          </p:nvPr>
-        </p:nvSpPr>
-        <p:spPr/>
-        <p:txBody>
-          <a:bodyPr/>
-          <a:lstStyle/>
-          <a:p>
-            <a:r>
-              <a:rPr lang="en-US" dirty="0" smtClean="0"/>
-              <a:t>Agenda</a:t>
-            </a:r>
-            <a:endParaRPr lang="en-US" dirty="0"/>
-          </a:p>
-        </p:txBody>
-      </p:sp>
-      <p:sp>
-        <p:nvSpPr>
-          <p:cNvPr id="7" name="Text Placeholder 6"/>
-          <p:cNvSpPr>
-            <a:spLocks noGrp="1"/>
-          </p:cNvSpPr>
-          <p:nvPr>
-            <p:ph type="body" idx="1"/>
-          </p:nvPr>
-        </p:nvSpPr>
-        <p:spPr/>
-        <p:txBody>
-          <a:bodyPr>
-            <a:normAutofit/>
-          </a:bodyPr>
-          <a:lstStyle/>
-          <a:p>
-            <a:r>
-              <a:rPr lang="en-US" dirty="0" smtClean="0"/>
-              <a:t>Introduction </a:t>
-            </a:r>
-            <a:r>
-              <a:rPr lang="en-US" dirty="0" smtClean="0"/>
-              <a:t>to Python</a:t>
-            </a:r>
-          </a:p>
-          <a:p>
-            <a:r>
-              <a:rPr lang="en-US" dirty="0" smtClean="0"/>
-              <a:t>Kahoot Quiz</a:t>
-            </a:r>
-          </a:p>
-          <a:p>
-            <a:r>
-              <a:rPr lang="en-US" dirty="0" smtClean="0"/>
-              <a:t>Python Activities</a:t>
-            </a:r>
-          </a:p>
-        </p:txBody>
-      </p:sp>
-      <p:sp>
-        <p:nvSpPr>
-          <p:cNvPr id="4" name="Date Placeholder 3"/>
-          <p:cNvSpPr>
-            <a:spLocks noGrp="1"/>
-          </p:cNvSpPr>
-          <p:nvPr>
-            <p:ph type="dt" sz="half" idx="10"/>
-          </p:nvPr>
-        </p:nvSpPr>
-        <p:spPr/>
-        <p:txBody>
-          <a:bodyPr/>
-          <a:lstStyle/>
-          <a:p>
-            <a:fld id="{1C2D31DE-C454-491C-B5C3-F097855E3DF7}" type="datetime4">
-              <a:rPr lang="en-US" smtClean="0"/>
-              <a:pPr/>
-              <a:t>April 6, 2020</a:t>
-            </a:fld>
-            <a:endParaRPr lang="en-US" dirty="0"/>
-          </a:p>
-        </p:txBody>
-      </p:sp>
-    </p:spTree>
-    <p:extLst>
-      <p:ext uri="{BB962C8B-B14F-4D97-AF65-F5344CB8AC3E}">
-        <p14:creationId xmlns:p14="http://schemas.microsoft.com/office/powerpoint/2010/main" val="2629401558"/>
-      </p:ext>
-    </p:extLst>
-  </p:cSld>
-  <p:clrMapOvr>
-    <a:masterClrMapping/>
-  </p:clrMapOvr>
-  <mc:AlternateContent xmlns:mc="http://schemas.openxmlformats.org/markup-compatibility/2006" xmlns:p14="http://schemas.microsoft.com/office/powerpoint/2010/main">
-    <mc:Choice Requires="p14">
-      <p:transition spd="slow" p14:dur="1600">
-        <p:blinds dir="vert"/>
-      </p:transition>
-    </mc:Choice>
-    <mc:Fallback xmlns="">
-      <p:transition spd="slow">
-        <p:blinds dir="vert"/>
-      </p:transition>
-    </mc:Fallback>
-  </mc:AlternateContent>
-  <p:timing>
-    <p:tnLst>
-      <p:par>
-        <p:cTn id="1" dur="indefinite" restart="never" nodeType="tmRoot"/>
-      </p:par>
-    </p:tnLst>
-  </p:timing>
-</p:sld>
-</file>
-
-<file path=ppt/slides/slide20.xml><?xml version="1.0" encoding="utf-8"?>
-<p:sld xmlns:a="http://schemas.openxmlformats.org/drawingml/2006/main" xmlns:r="http://schemas.openxmlformats.org/officeDocument/2006/relationships" xmlns:p="http://schemas.openxmlformats.org/presentationml/2006/main">
-  <p:cSld>
-    <p:spTree>
-      <p:nvGrpSpPr>
-        <p:cNvPr id="1" name=""/>
-        <p:cNvGrpSpPr/>
-        <p:nvPr/>
-      </p:nvGrpSpPr>
-      <p:grpSpPr>
-        <a:xfrm>
-          <a:off x="0" y="0"/>
-          <a:ext cx="0" cy="0"/>
-          <a:chOff x="0" y="0"/>
-          <a:chExt cx="0" cy="0"/>
-        </a:xfrm>
-      </p:grpSpPr>
-      <p:sp>
-        <p:nvSpPr>
-          <p:cNvPr id="2" name="Title 1"/>
-          <p:cNvSpPr>
-            <a:spLocks noGrp="1"/>
-          </p:cNvSpPr>
-          <p:nvPr>
-            <p:ph type="title"/>
-          </p:nvPr>
-        </p:nvSpPr>
-        <p:spPr/>
-        <p:txBody>
-          <a:bodyPr/>
-          <a:lstStyle/>
-          <a:p>
-            <a:r>
-              <a:rPr lang="en-US" dirty="0" smtClean="0"/>
-              <a:t>Setting variables vs. checking values</a:t>
-            </a:r>
-            <a:endParaRPr lang="en-US" dirty="0"/>
-          </a:p>
-        </p:txBody>
-      </p:sp>
-      <p:sp>
-        <p:nvSpPr>
-          <p:cNvPr id="4" name="Text Placeholder 3"/>
-          <p:cNvSpPr>
-            <a:spLocks noGrp="1"/>
-          </p:cNvSpPr>
-          <p:nvPr>
-            <p:ph type="body" idx="1"/>
-          </p:nvPr>
-        </p:nvSpPr>
-        <p:spPr/>
-        <p:txBody>
-          <a:bodyPr/>
-          <a:lstStyle/>
-          <a:p>
-            <a:r>
-              <a:rPr lang="en-US" dirty="0" smtClean="0"/>
-              <a:t>Setting variables (</a:t>
-            </a:r>
-            <a:r>
-              <a:rPr lang="en-US" dirty="0" smtClean="0">
-                <a:solidFill>
-                  <a:schemeClr val="accent1">
-                    <a:lumMod val="20000"/>
-                    <a:lumOff val="80000"/>
-                  </a:schemeClr>
-                </a:solidFill>
-                <a:latin typeface="Consolas" panose="020B0609020204030204" pitchFamily="49" charset="0"/>
-              </a:rPr>
-              <a:t>=</a:t>
-            </a:r>
-            <a:r>
-              <a:rPr lang="en-US" dirty="0" smtClean="0"/>
-              <a:t>)</a:t>
-            </a:r>
-            <a:endParaRPr lang="en-US" dirty="0"/>
-          </a:p>
-        </p:txBody>
-      </p:sp>
-      <p:sp>
-        <p:nvSpPr>
-          <p:cNvPr id="5" name="Content Placeholder 4"/>
-          <p:cNvSpPr>
-            <a:spLocks noGrp="1"/>
-          </p:cNvSpPr>
-          <p:nvPr>
-            <p:ph sz="half" idx="2"/>
-          </p:nvPr>
-        </p:nvSpPr>
-        <p:spPr/>
-        <p:txBody>
-          <a:bodyPr/>
-          <a:lstStyle/>
-          <a:p>
-            <a:r>
-              <a:rPr lang="en-US" sz="2800" i="1" dirty="0" smtClean="0"/>
-              <a:t>Single</a:t>
-            </a:r>
-            <a:r>
-              <a:rPr lang="en-US" sz="2800" dirty="0" smtClean="0"/>
-              <a:t> equals sign</a:t>
-            </a:r>
-          </a:p>
-          <a:p>
-            <a:r>
-              <a:rPr lang="en-US" sz="2800" dirty="0" smtClean="0"/>
-              <a:t>Stores some information in a variable</a:t>
-            </a:r>
-          </a:p>
-          <a:p>
-            <a:r>
-              <a:rPr lang="en-US" sz="2800" dirty="0" smtClean="0"/>
-              <a:t>Used for user </a:t>
-            </a:r>
-            <a:r>
-              <a:rPr lang="en-US" sz="2800" dirty="0" smtClean="0">
-                <a:solidFill>
-                  <a:srgbClr val="000000"/>
-                </a:solidFill>
-                <a:latin typeface="Consolas" panose="020B0609020204030204" pitchFamily="49" charset="0"/>
-              </a:rPr>
-              <a:t>input</a:t>
-            </a:r>
-          </a:p>
-          <a:p>
-            <a:endParaRPr lang="en-US" dirty="0"/>
-          </a:p>
-          <a:p>
-            <a:endParaRPr lang="en-US" dirty="0" smtClean="0"/>
-          </a:p>
-          <a:p>
-            <a:pPr marL="57150" indent="0">
-              <a:buNone/>
-            </a:pPr>
-            <a:r>
-              <a:rPr lang="en-US" sz="3200" dirty="0" smtClean="0">
-                <a:solidFill>
-                  <a:srgbClr val="000000"/>
-                </a:solidFill>
-                <a:latin typeface="Consolas" panose="020B0609020204030204" pitchFamily="49" charset="0"/>
-              </a:rPr>
-              <a:t>movie </a:t>
-            </a:r>
-            <a:r>
-              <a:rPr lang="en-US" sz="3200" dirty="0">
-                <a:solidFill>
-                  <a:srgbClr val="000000"/>
-                </a:solidFill>
-                <a:latin typeface="Consolas" panose="020B0609020204030204" pitchFamily="49" charset="0"/>
-              </a:rPr>
-              <a:t>= </a:t>
-            </a:r>
-            <a:r>
-              <a:rPr lang="en-US" sz="3200" dirty="0">
-                <a:solidFill>
-                  <a:srgbClr val="A31515"/>
-                </a:solidFill>
-                <a:latin typeface="Consolas" panose="020B0609020204030204" pitchFamily="49" charset="0"/>
-              </a:rPr>
-              <a:t>"</a:t>
-            </a:r>
-            <a:r>
-              <a:rPr lang="en-US" sz="3200" dirty="0" smtClean="0">
-                <a:solidFill>
-                  <a:srgbClr val="A31515"/>
-                </a:solidFill>
-                <a:latin typeface="Consolas" panose="020B0609020204030204" pitchFamily="49" charset="0"/>
-              </a:rPr>
-              <a:t>Minions"</a:t>
-            </a:r>
-          </a:p>
-          <a:p>
-            <a:r>
-              <a:rPr lang="en-US" sz="2800" dirty="0" smtClean="0"/>
-              <a:t>Sets the </a:t>
-            </a:r>
-            <a:r>
-              <a:rPr lang="en-US" sz="2800" dirty="0" smtClean="0">
-                <a:solidFill>
-                  <a:srgbClr val="000000"/>
-                </a:solidFill>
-                <a:latin typeface="Consolas" panose="020B0609020204030204" pitchFamily="49" charset="0"/>
-              </a:rPr>
-              <a:t>movie</a:t>
-            </a:r>
-            <a:r>
-              <a:rPr lang="en-US" sz="2800" dirty="0" smtClean="0"/>
-              <a:t> variable to “Minions”</a:t>
-            </a:r>
-            <a:endParaRPr lang="en-US" sz="2800" dirty="0">
-              <a:solidFill>
-                <a:srgbClr val="000000"/>
-              </a:solidFill>
-              <a:latin typeface="Consolas" panose="020B0609020204030204" pitchFamily="49" charset="0"/>
-            </a:endParaRPr>
-          </a:p>
-          <a:p>
-            <a:pPr marL="57150" indent="0">
-              <a:buNone/>
-            </a:pPr>
-            <a:endParaRPr lang="en-US" sz="3200" dirty="0">
-              <a:solidFill>
-                <a:srgbClr val="000000"/>
-              </a:solidFill>
-              <a:latin typeface="Consolas" panose="020B0609020204030204" pitchFamily="49" charset="0"/>
-            </a:endParaRPr>
-          </a:p>
-          <a:p>
-            <a:pPr marL="57150" indent="0">
-              <a:buNone/>
-            </a:pPr>
-            <a:endParaRPr lang="en-US" dirty="0"/>
-          </a:p>
-        </p:txBody>
-      </p:sp>
-      <p:sp>
-        <p:nvSpPr>
-          <p:cNvPr id="6" name="Text Placeholder 5"/>
-          <p:cNvSpPr>
-            <a:spLocks noGrp="1"/>
-          </p:cNvSpPr>
-          <p:nvPr>
-            <p:ph type="body" sz="quarter" idx="3"/>
-          </p:nvPr>
-        </p:nvSpPr>
-        <p:spPr/>
-        <p:txBody>
-          <a:bodyPr/>
-          <a:lstStyle/>
-          <a:p>
-            <a:r>
-              <a:rPr lang="en-US" dirty="0" smtClean="0"/>
-              <a:t>Checking values (</a:t>
-            </a:r>
-            <a:r>
-              <a:rPr lang="en-US" dirty="0" smtClean="0">
-                <a:solidFill>
-                  <a:schemeClr val="accent1">
-                    <a:lumMod val="20000"/>
-                    <a:lumOff val="80000"/>
-                  </a:schemeClr>
-                </a:solidFill>
-                <a:latin typeface="Consolas" panose="020B0609020204030204" pitchFamily="49" charset="0"/>
-              </a:rPr>
-              <a:t>==</a:t>
-            </a:r>
-            <a:r>
-              <a:rPr lang="en-US" dirty="0" smtClean="0"/>
-              <a:t>)</a:t>
-            </a:r>
-            <a:endParaRPr lang="en-US" dirty="0"/>
-          </a:p>
-        </p:txBody>
-      </p:sp>
-      <p:sp>
-        <p:nvSpPr>
-          <p:cNvPr id="7" name="Content Placeholder 6"/>
-          <p:cNvSpPr>
-            <a:spLocks noGrp="1"/>
-          </p:cNvSpPr>
-          <p:nvPr>
-            <p:ph sz="quarter" idx="4"/>
-          </p:nvPr>
-        </p:nvSpPr>
-        <p:spPr/>
-        <p:txBody>
-          <a:bodyPr>
-            <a:normAutofit/>
-          </a:bodyPr>
-          <a:lstStyle/>
-          <a:p>
-            <a:r>
-              <a:rPr lang="en-US" sz="2800" i="1" dirty="0" smtClean="0"/>
-              <a:t>Double</a:t>
-            </a:r>
-            <a:r>
-              <a:rPr lang="en-US" sz="2800" dirty="0" smtClean="0"/>
-              <a:t> equals sign</a:t>
-            </a:r>
-          </a:p>
-          <a:p>
-            <a:r>
-              <a:rPr lang="en-US" sz="2800" dirty="0" smtClean="0"/>
-              <a:t>Compares a variable to another value</a:t>
-            </a:r>
-          </a:p>
-          <a:p>
-            <a:r>
-              <a:rPr lang="en-US" sz="2800" dirty="0" smtClean="0"/>
-              <a:t>Used in </a:t>
-            </a:r>
-            <a:r>
-              <a:rPr lang="en-US" sz="2800" dirty="0" smtClean="0">
-                <a:solidFill>
-                  <a:srgbClr val="000000"/>
-                </a:solidFill>
-                <a:latin typeface="Consolas" panose="020B0609020204030204" pitchFamily="49" charset="0"/>
-              </a:rPr>
-              <a:t>if</a:t>
-            </a:r>
-            <a:r>
-              <a:rPr lang="en-US" sz="2800" dirty="0" smtClean="0"/>
-              <a:t> statements</a:t>
-            </a:r>
-          </a:p>
-          <a:p>
-            <a:pPr marL="57150" indent="0">
-              <a:buNone/>
-            </a:pPr>
-            <a:endParaRPr lang="en-US" dirty="0" smtClean="0"/>
-          </a:p>
-          <a:p>
-            <a:pPr marL="57150" indent="0">
-              <a:buNone/>
-            </a:pPr>
-            <a:endParaRPr lang="en-US" dirty="0"/>
-          </a:p>
-          <a:p>
-            <a:pPr marL="57150" indent="0">
-              <a:buNone/>
-            </a:pPr>
-            <a:r>
-              <a:rPr lang="en-US" sz="3200" dirty="0" smtClean="0">
-                <a:solidFill>
-                  <a:srgbClr val="0000FF"/>
-                </a:solidFill>
-                <a:latin typeface="Consolas" panose="020B0609020204030204" pitchFamily="49" charset="0"/>
-              </a:rPr>
-              <a:t>if</a:t>
-            </a:r>
-            <a:r>
-              <a:rPr lang="en-US" sz="3200" dirty="0" smtClean="0">
-                <a:solidFill>
-                  <a:srgbClr val="000000"/>
-                </a:solidFill>
-                <a:latin typeface="Consolas" panose="020B0609020204030204" pitchFamily="49" charset="0"/>
-              </a:rPr>
-              <a:t> movie </a:t>
-            </a:r>
-            <a:r>
-              <a:rPr lang="en-US" sz="3200" dirty="0">
-                <a:solidFill>
-                  <a:srgbClr val="000000"/>
-                </a:solidFill>
-                <a:latin typeface="Consolas" panose="020B0609020204030204" pitchFamily="49" charset="0"/>
-              </a:rPr>
-              <a:t>== </a:t>
-            </a:r>
-            <a:r>
-              <a:rPr lang="en-US" sz="3200" dirty="0">
-                <a:solidFill>
-                  <a:srgbClr val="A31515"/>
-                </a:solidFill>
-                <a:latin typeface="Consolas" panose="020B0609020204030204" pitchFamily="49" charset="0"/>
-              </a:rPr>
-              <a:t>"Minions"</a:t>
-            </a:r>
-            <a:r>
-              <a:rPr lang="en-US" sz="3200" dirty="0">
-                <a:solidFill>
-                  <a:srgbClr val="000000"/>
-                </a:solidFill>
-                <a:latin typeface="Consolas" panose="020B0609020204030204" pitchFamily="49" charset="0"/>
-              </a:rPr>
-              <a:t>:</a:t>
-            </a:r>
-          </a:p>
-          <a:p>
-            <a:r>
-              <a:rPr lang="en-US" sz="2800" dirty="0" smtClean="0"/>
-              <a:t>Checks if the </a:t>
-            </a:r>
-            <a:r>
-              <a:rPr lang="en-US" sz="2800" dirty="0">
-                <a:solidFill>
-                  <a:srgbClr val="000000"/>
-                </a:solidFill>
-                <a:latin typeface="Consolas" panose="020B0609020204030204" pitchFamily="49" charset="0"/>
-              </a:rPr>
-              <a:t>movie</a:t>
-            </a:r>
-            <a:r>
-              <a:rPr lang="en-US" sz="2800" dirty="0" smtClean="0"/>
-              <a:t> variable contains “Minions”</a:t>
-            </a:r>
-            <a:endParaRPr lang="en-US" sz="2800" dirty="0">
-              <a:solidFill>
-                <a:srgbClr val="000000"/>
-              </a:solidFill>
-              <a:latin typeface="Consolas" panose="020B0609020204030204" pitchFamily="49" charset="0"/>
-            </a:endParaRPr>
-          </a:p>
-        </p:txBody>
-      </p:sp>
-    </p:spTree>
-    <p:extLst>
-      <p:ext uri="{BB962C8B-B14F-4D97-AF65-F5344CB8AC3E}">
-        <p14:creationId xmlns:p14="http://schemas.microsoft.com/office/powerpoint/2010/main" val="2145441813"/>
-      </p:ext>
-    </p:extLst>
-  </p:cSld>
-  <p:clrMapOvr>
-    <a:masterClrMapping/>
-  </p:clrMapOvr>
-  <p:transition spd="med">
-    <p:pull/>
-  </p:transition>
-  <p:timing>
-    <p:tnLst>
-      <p:par>
-        <p:cTn id="1" dur="indefinite" restart="never" nodeType="tmRoot"/>
-      </p:par>
-    </p:tnLst>
-  </p:timing>
-</p:sld>
-</file>
-
-<file path=ppt/slides/slide21.xml><?xml version="1.0" encoding="utf-8"?>
-<p:sld xmlns:a="http://schemas.openxmlformats.org/drawingml/2006/main" xmlns:r="http://schemas.openxmlformats.org/officeDocument/2006/relationships" xmlns:p="http://schemas.openxmlformats.org/presentationml/2006/main">
-  <p:cSld>
-    <p:spTree>
-      <p:nvGrpSpPr>
-        <p:cNvPr id="1" name=""/>
-        <p:cNvGrpSpPr/>
-        <p:nvPr/>
-      </p:nvGrpSpPr>
-      <p:grpSpPr>
-        <a:xfrm>
-          <a:off x="0" y="0"/>
-          <a:ext cx="0" cy="0"/>
-          <a:chOff x="0" y="0"/>
-          <a:chExt cx="0" cy="0"/>
-        </a:xfrm>
-      </p:grpSpPr>
-      <p:sp>
-        <p:nvSpPr>
-          <p:cNvPr id="6" name="Title 5"/>
-          <p:cNvSpPr>
-            <a:spLocks noGrp="1"/>
-          </p:cNvSpPr>
-          <p:nvPr>
-            <p:ph type="title"/>
-          </p:nvPr>
-        </p:nvSpPr>
-        <p:spPr/>
-        <p:txBody>
-          <a:bodyPr/>
-          <a:lstStyle/>
-          <a:p>
-            <a:r>
-              <a:rPr lang="en-US" dirty="0" smtClean="0"/>
-              <a:t>If/else – Python Example</a:t>
-            </a:r>
-            <a:endParaRPr lang="en-US" dirty="0"/>
-          </a:p>
-        </p:txBody>
-      </p:sp>
-      <p:sp>
-        <p:nvSpPr>
-          <p:cNvPr id="7" name="Content Placeholder 6"/>
-          <p:cNvSpPr>
-            <a:spLocks noGrp="1"/>
-          </p:cNvSpPr>
-          <p:nvPr>
-            <p:ph idx="1"/>
-          </p:nvPr>
-        </p:nvSpPr>
-        <p:spPr/>
-        <p:txBody>
-          <a:bodyPr>
-            <a:normAutofit lnSpcReduction="10000"/>
-          </a:bodyPr>
-          <a:lstStyle/>
-          <a:p>
-            <a:pPr marL="57150" indent="0">
-              <a:buNone/>
-            </a:pPr>
-            <a:r>
-              <a:rPr lang="en-US" sz="3600" dirty="0">
-                <a:solidFill>
-                  <a:srgbClr val="000000"/>
-                </a:solidFill>
-                <a:latin typeface="Consolas" panose="020B0609020204030204" pitchFamily="49" charset="0"/>
-              </a:rPr>
-              <a:t>color = input(</a:t>
-            </a:r>
-            <a:r>
-              <a:rPr lang="en-US" sz="3600" dirty="0">
-                <a:solidFill>
-                  <a:srgbClr val="A31515"/>
-                </a:solidFill>
-                <a:latin typeface="Consolas" panose="020B0609020204030204" pitchFamily="49" charset="0"/>
-              </a:rPr>
-              <a:t>"What is your favorite color?"</a:t>
-            </a:r>
-            <a:r>
-              <a:rPr lang="en-US" sz="3600" dirty="0">
-                <a:solidFill>
-                  <a:srgbClr val="000000"/>
-                </a:solidFill>
-                <a:latin typeface="Consolas" panose="020B0609020204030204" pitchFamily="49" charset="0"/>
-              </a:rPr>
-              <a:t>)</a:t>
-            </a:r>
-          </a:p>
-          <a:p>
-            <a:pPr marL="57150" indent="0">
-              <a:buNone/>
-            </a:pPr>
-            <a:endParaRPr lang="en-US" sz="3600" dirty="0" smtClean="0">
-              <a:solidFill>
-                <a:srgbClr val="0000FF"/>
-              </a:solidFill>
-              <a:latin typeface="Consolas" panose="020B0609020204030204" pitchFamily="49" charset="0"/>
-            </a:endParaRPr>
-          </a:p>
-          <a:p>
-            <a:pPr marL="57150" indent="0">
-              <a:buNone/>
-            </a:pPr>
-            <a:r>
-              <a:rPr lang="en-US" sz="3600" dirty="0" smtClean="0">
-                <a:solidFill>
-                  <a:srgbClr val="0000FF"/>
-                </a:solidFill>
-                <a:latin typeface="Consolas" panose="020B0609020204030204" pitchFamily="49" charset="0"/>
-              </a:rPr>
-              <a:t>if</a:t>
-            </a:r>
-            <a:r>
-              <a:rPr lang="en-US" sz="3600" dirty="0" smtClean="0">
-                <a:solidFill>
-                  <a:srgbClr val="000000"/>
-                </a:solidFill>
-                <a:latin typeface="Consolas" panose="020B0609020204030204" pitchFamily="49" charset="0"/>
-              </a:rPr>
-              <a:t> </a:t>
-            </a:r>
-            <a:r>
-              <a:rPr lang="en-US" sz="3600" dirty="0">
-                <a:solidFill>
-                  <a:srgbClr val="000000"/>
-                </a:solidFill>
-                <a:latin typeface="Consolas" panose="020B0609020204030204" pitchFamily="49" charset="0"/>
-              </a:rPr>
-              <a:t>color == </a:t>
-            </a:r>
-            <a:r>
-              <a:rPr lang="en-US" sz="3600" dirty="0">
-                <a:solidFill>
-                  <a:srgbClr val="A31515"/>
-                </a:solidFill>
-                <a:latin typeface="Consolas" panose="020B0609020204030204" pitchFamily="49" charset="0"/>
-              </a:rPr>
-              <a:t>"blue"</a:t>
-            </a:r>
-            <a:r>
-              <a:rPr lang="en-US" sz="3600" dirty="0">
-                <a:solidFill>
-                  <a:srgbClr val="000000"/>
-                </a:solidFill>
-                <a:latin typeface="Consolas" panose="020B0609020204030204" pitchFamily="49" charset="0"/>
-              </a:rPr>
-              <a:t>:</a:t>
-            </a:r>
-          </a:p>
-          <a:p>
-            <a:pPr marL="57150" indent="0">
-              <a:buNone/>
-            </a:pPr>
-            <a:r>
-              <a:rPr lang="en-US" sz="3600" dirty="0" smtClean="0">
-                <a:solidFill>
-                  <a:srgbClr val="000000"/>
-                </a:solidFill>
-                <a:latin typeface="Consolas" panose="020B0609020204030204" pitchFamily="49" charset="0"/>
-              </a:rPr>
-              <a:t>	print</a:t>
-            </a:r>
-            <a:r>
-              <a:rPr lang="en-US" sz="3600" dirty="0">
-                <a:solidFill>
-                  <a:srgbClr val="000000"/>
-                </a:solidFill>
-                <a:latin typeface="Consolas" panose="020B0609020204030204" pitchFamily="49" charset="0"/>
-              </a:rPr>
-              <a:t>(</a:t>
-            </a:r>
-            <a:r>
-              <a:rPr lang="en-US" sz="3600" dirty="0">
-                <a:solidFill>
-                  <a:srgbClr val="A31515"/>
-                </a:solidFill>
-                <a:latin typeface="Consolas" panose="020B0609020204030204" pitchFamily="49" charset="0"/>
-              </a:rPr>
-              <a:t>"That's my favorite too!"</a:t>
-            </a:r>
-            <a:r>
-              <a:rPr lang="en-US" sz="3600" dirty="0">
-                <a:solidFill>
-                  <a:srgbClr val="000000"/>
-                </a:solidFill>
-                <a:latin typeface="Consolas" panose="020B0609020204030204" pitchFamily="49" charset="0"/>
-              </a:rPr>
-              <a:t>)</a:t>
-            </a:r>
-          </a:p>
-          <a:p>
-            <a:pPr marL="57150" indent="0">
-              <a:buNone/>
-            </a:pPr>
-            <a:r>
-              <a:rPr lang="en-US" sz="3600" dirty="0">
-                <a:solidFill>
-                  <a:srgbClr val="0000FF"/>
-                </a:solidFill>
-                <a:latin typeface="Consolas" panose="020B0609020204030204" pitchFamily="49" charset="0"/>
-              </a:rPr>
-              <a:t>else</a:t>
-            </a:r>
-            <a:r>
-              <a:rPr lang="en-US" sz="3600" dirty="0">
-                <a:solidFill>
-                  <a:srgbClr val="000000"/>
-                </a:solidFill>
-                <a:latin typeface="Consolas" panose="020B0609020204030204" pitchFamily="49" charset="0"/>
-              </a:rPr>
-              <a:t>:</a:t>
-            </a:r>
-          </a:p>
-          <a:p>
-            <a:pPr marL="57150" indent="0">
-              <a:buNone/>
-            </a:pPr>
-            <a:r>
-              <a:rPr lang="en-US" sz="3600" dirty="0" smtClean="0">
-                <a:solidFill>
-                  <a:srgbClr val="000000"/>
-                </a:solidFill>
-                <a:latin typeface="Consolas" panose="020B0609020204030204" pitchFamily="49" charset="0"/>
-              </a:rPr>
-              <a:t>	print</a:t>
-            </a:r>
-            <a:r>
-              <a:rPr lang="en-US" sz="3600" dirty="0">
-                <a:solidFill>
-                  <a:srgbClr val="000000"/>
-                </a:solidFill>
-                <a:latin typeface="Consolas" panose="020B0609020204030204" pitchFamily="49" charset="0"/>
-              </a:rPr>
-              <a:t>(</a:t>
-            </a:r>
-            <a:r>
-              <a:rPr lang="en-US" sz="3600" dirty="0">
-                <a:solidFill>
-                  <a:srgbClr val="A31515"/>
-                </a:solidFill>
-                <a:latin typeface="Consolas" panose="020B0609020204030204" pitchFamily="49" charset="0"/>
-              </a:rPr>
-              <a:t>"That's not my favorite"</a:t>
-            </a:r>
-            <a:r>
-              <a:rPr lang="en-US" sz="3600" dirty="0">
-                <a:solidFill>
-                  <a:srgbClr val="000000"/>
-                </a:solidFill>
-                <a:latin typeface="Consolas" panose="020B0609020204030204" pitchFamily="49" charset="0"/>
-              </a:rPr>
-              <a:t>)</a:t>
-            </a:r>
-          </a:p>
-          <a:p>
-            <a:pPr marL="57150" indent="0">
-              <a:buNone/>
-            </a:pPr>
-            <a:endParaRPr lang="en-US" sz="3600" dirty="0"/>
-          </a:p>
-          <a:p>
-            <a:pPr marL="57150" indent="0" algn="ctr">
-              <a:buNone/>
-            </a:pPr>
-            <a:r>
-              <a:rPr lang="en-US" sz="4000" dirty="0" smtClean="0"/>
-              <a:t>What will this code do?</a:t>
-            </a:r>
-          </a:p>
-        </p:txBody>
-      </p:sp>
-    </p:spTree>
-    <p:extLst>
-      <p:ext uri="{BB962C8B-B14F-4D97-AF65-F5344CB8AC3E}">
-        <p14:creationId xmlns:p14="http://schemas.microsoft.com/office/powerpoint/2010/main" val="3837237718"/>
-      </p:ext>
-    </p:extLst>
-  </p:cSld>
-  <p:clrMapOvr>
-    <a:masterClrMapping/>
-  </p:clrMapOvr>
-  <p:transition spd="med">
-    <p:pull/>
-  </p:transition>
-  <p:timing>
-    <p:tnLst>
-      <p:par>
-        <p:cTn id="1" dur="indefinite" restart="never" nodeType="tmRoot"/>
-      </p:par>
-    </p:tnLst>
-  </p:timing>
-</p:sld>
-</file>
-
-<file path=ppt/slides/slide22.xml><?xml version="1.0" encoding="utf-8"?>
-<p:sld xmlns:a="http://schemas.openxmlformats.org/drawingml/2006/main" xmlns:r="http://schemas.openxmlformats.org/officeDocument/2006/relationships" xmlns:p="http://schemas.openxmlformats.org/presentationml/2006/main">
-  <p:cSld>
-    <p:spTree>
-      <p:nvGrpSpPr>
-        <p:cNvPr id="1" name=""/>
-        <p:cNvGrpSpPr/>
-        <p:nvPr/>
-      </p:nvGrpSpPr>
-      <p:grpSpPr>
-        <a:xfrm>
-          <a:off x="0" y="0"/>
-          <a:ext cx="0" cy="0"/>
-          <a:chOff x="0" y="0"/>
-          <a:chExt cx="0" cy="0"/>
-        </a:xfrm>
-      </p:grpSpPr>
-      <p:sp>
-        <p:nvSpPr>
-          <p:cNvPr id="6" name="Title 5"/>
-          <p:cNvSpPr>
-            <a:spLocks noGrp="1"/>
-          </p:cNvSpPr>
-          <p:nvPr>
-            <p:ph type="title"/>
-          </p:nvPr>
-        </p:nvSpPr>
-        <p:spPr/>
-        <p:txBody>
-          <a:bodyPr/>
-          <a:lstStyle/>
-          <a:p>
-            <a:r>
-              <a:rPr lang="en-US" dirty="0" smtClean="0"/>
               <a:t>Repeating code with Loops</a:t>
             </a:r>
             <a:endParaRPr lang="en-US" dirty="0"/>
@@ -43344,7 +39844,7 @@
 </p:sld>
 </file>
 
-<file path=ppt/slides/slide23.xml><?xml version="1.0" encoding="utf-8"?>
+<file path=ppt/slides/slide17.xml><?xml version="1.0" encoding="utf-8"?>
 <p:sld xmlns:a="http://schemas.openxmlformats.org/drawingml/2006/main" xmlns:r="http://schemas.openxmlformats.org/officeDocument/2006/relationships" xmlns:p="http://schemas.openxmlformats.org/presentationml/2006/main">
   <p:cSld>
     <p:spTree>
@@ -43577,7 +40077,7 @@
 </p:sld>
 </file>
 
-<file path=ppt/slides/slide24.xml><?xml version="1.0" encoding="utf-8"?>
+<file path=ppt/slides/slide18.xml><?xml version="1.0" encoding="utf-8"?>
 <p:sld xmlns:a="http://schemas.openxmlformats.org/drawingml/2006/main" xmlns:r="http://schemas.openxmlformats.org/officeDocument/2006/relationships" xmlns:p="http://schemas.openxmlformats.org/presentationml/2006/main">
   <p:cSld>
     <p:spTree>
@@ -43783,7 +40283,7 @@
 </p:sld>
 </file>
 
-<file path=ppt/slides/slide25.xml><?xml version="1.0" encoding="utf-8"?>
+<file path=ppt/slides/slide19.xml><?xml version="1.0" encoding="utf-8"?>
 <p:sld xmlns:a="http://schemas.openxmlformats.org/drawingml/2006/main" xmlns:r="http://schemas.openxmlformats.org/officeDocument/2006/relationships" xmlns:p="http://schemas.openxmlformats.org/presentationml/2006/main">
   <p:cSld>
     <p:spTree>
@@ -44762,7 +41262,139 @@
 </p:sld>
 </file>
 
-<file path=ppt/slides/slide26.xml><?xml version="1.0" encoding="utf-8"?>
+<file path=ppt/slides/slide2.xml><?xml version="1.0" encoding="utf-8"?>
+<p:sld xmlns:a="http://schemas.openxmlformats.org/drawingml/2006/main" xmlns:r="http://schemas.openxmlformats.org/officeDocument/2006/relationships" xmlns:p="http://schemas.openxmlformats.org/presentationml/2006/main">
+  <p:cSld>
+    <p:spTree>
+      <p:nvGrpSpPr>
+        <p:cNvPr id="1" name=""/>
+        <p:cNvGrpSpPr/>
+        <p:nvPr/>
+      </p:nvGrpSpPr>
+      <p:grpSpPr>
+        <a:xfrm>
+          <a:off x="0" y="0"/>
+          <a:ext cx="0" cy="0"/>
+          <a:chOff x="0" y="0"/>
+          <a:chExt cx="0" cy="0"/>
+        </a:xfrm>
+      </p:grpSpPr>
+      <p:sp>
+        <p:nvSpPr>
+          <p:cNvPr id="6" name="Title 5"/>
+          <p:cNvSpPr>
+            <a:spLocks noGrp="1"/>
+          </p:cNvSpPr>
+          <p:nvPr>
+            <p:ph type="title"/>
+          </p:nvPr>
+        </p:nvSpPr>
+        <p:spPr/>
+        <p:txBody>
+          <a:bodyPr/>
+          <a:lstStyle/>
+          <a:p>
+            <a:r>
+              <a:rPr lang="en-US" dirty="0" smtClean="0"/>
+              <a:t>Agenda</a:t>
+            </a:r>
+            <a:endParaRPr lang="en-US" dirty="0"/>
+          </a:p>
+        </p:txBody>
+      </p:sp>
+      <p:sp>
+        <p:nvSpPr>
+          <p:cNvPr id="7" name="Text Placeholder 6"/>
+          <p:cNvSpPr>
+            <a:spLocks noGrp="1"/>
+          </p:cNvSpPr>
+          <p:nvPr>
+            <p:ph type="body" idx="1"/>
+          </p:nvPr>
+        </p:nvSpPr>
+        <p:spPr/>
+        <p:txBody>
+          <a:bodyPr>
+            <a:normAutofit/>
+          </a:bodyPr>
+          <a:lstStyle/>
+          <a:p>
+            <a:r>
+              <a:rPr lang="en-US" dirty="0" smtClean="0"/>
+              <a:t>Introduction to Python</a:t>
+            </a:r>
+          </a:p>
+          <a:p>
+            <a:r>
+              <a:rPr lang="en-US" dirty="0" smtClean="0"/>
+              <a:t>Kahoot Quiz</a:t>
+            </a:r>
+          </a:p>
+          <a:p>
+            <a:r>
+              <a:rPr lang="en-US" dirty="0" smtClean="0"/>
+              <a:t>Python Activities</a:t>
+            </a:r>
+          </a:p>
+        </p:txBody>
+      </p:sp>
+      <p:sp>
+        <p:nvSpPr>
+          <p:cNvPr id="4" name="Date Placeholder 3"/>
+          <p:cNvSpPr>
+            <a:spLocks noGrp="1"/>
+          </p:cNvSpPr>
+          <p:nvPr>
+            <p:ph type="dt" sz="half" idx="10"/>
+          </p:nvPr>
+        </p:nvSpPr>
+        <p:spPr/>
+        <p:txBody>
+          <a:bodyPr/>
+          <a:lstStyle/>
+          <a:p>
+            <a:fld id="{1C2D31DE-C454-491C-B5C3-F097855E3DF7}" type="datetime4">
+              <a:rPr lang="en-US" smtClean="0"/>
+              <a:pPr/>
+              <a:t>April 21, 2020</a:t>
+            </a:fld>
+            <a:endParaRPr lang="en-US" dirty="0"/>
+          </a:p>
+        </p:txBody>
+      </p:sp>
+    </p:spTree>
+    <p:extLst>
+      <p:ext uri="{BB962C8B-B14F-4D97-AF65-F5344CB8AC3E}">
+        <p14:creationId xmlns:p14="http://schemas.microsoft.com/office/powerpoint/2010/main" val="2629401558"/>
+      </p:ext>
+    </p:extLst>
+  </p:cSld>
+  <p:clrMapOvr>
+    <a:masterClrMapping/>
+  </p:clrMapOvr>
+  <mc:AlternateContent xmlns:mc="http://schemas.openxmlformats.org/markup-compatibility/2006" xmlns:p14="http://schemas.microsoft.com/office/powerpoint/2010/main">
+    <mc:Choice Requires="p14">
+      <p:transition spd="slow" p14:dur="1600">
+        <p:blinds dir="vert"/>
+      </p:transition>
+    </mc:Choice>
+    <mc:Fallback xmlns="">
+      <p:transition spd="slow">
+        <p:blinds dir="vert"/>
+      </p:transition>
+    </mc:Fallback>
+  </mc:AlternateContent>
+  <p:timing>
+    <p:tnLst>
+      <p:par>
+        <p:cTn id="1" dur="indefinite" restart="never" nodeType="tmRoot"/>
+      </p:par>
+    </p:tnLst>
+  </p:timing>
+</p:sld>
+</file>
+
+<file path=ppt/slides/slide20.xml><?xml version="1.0" encoding="utf-8"?>
 <p:sld xmlns:a="http://schemas.openxmlformats.org/drawingml/2006/main" xmlns:r="http://schemas.openxmlformats.org/officeDocument/2006/relationships" xmlns:p="http://schemas.openxmlformats.org/presentationml/2006/main">
   <p:cSld>
     <p:spTree>
@@ -45092,7 +41724,7 @@
 </p:sld>
 </file>
 
-<file path=ppt/slides/slide27.xml><?xml version="1.0" encoding="utf-8"?>
+<file path=ppt/slides/slide21.xml><?xml version="1.0" encoding="utf-8"?>
 <p:sld xmlns:a="http://schemas.openxmlformats.org/drawingml/2006/main" xmlns:r="http://schemas.openxmlformats.org/officeDocument/2006/relationships" xmlns:p="http://schemas.openxmlformats.org/presentationml/2006/main">
   <p:cSld>
     <p:spTree>
@@ -45164,207 +41796,6 @@
   </p:clrMapOvr>
   <p:transition spd="slow">
     <p:push dir="u"/>
-  </p:transition>
-  <p:timing>
-    <p:tnLst>
-      <p:par>
-        <p:cTn id="1" dur="indefinite" restart="never" nodeType="tmRoot"/>
-      </p:par>
-    </p:tnLst>
-  </p:timing>
-</p:sld>
-</file>
-
-<file path=ppt/slides/slide28.xml><?xml version="1.0" encoding="utf-8"?>
-<p:sld xmlns:a="http://schemas.openxmlformats.org/drawingml/2006/main" xmlns:r="http://schemas.openxmlformats.org/officeDocument/2006/relationships" xmlns:p="http://schemas.openxmlformats.org/presentationml/2006/main">
-  <p:cSld>
-    <p:spTree>
-      <p:nvGrpSpPr>
-        <p:cNvPr id="1" name=""/>
-        <p:cNvGrpSpPr/>
-        <p:nvPr/>
-      </p:nvGrpSpPr>
-      <p:grpSpPr>
-        <a:xfrm>
-          <a:off x="0" y="0"/>
-          <a:ext cx="0" cy="0"/>
-          <a:chOff x="0" y="0"/>
-          <a:chExt cx="0" cy="0"/>
-        </a:xfrm>
-      </p:grpSpPr>
-      <p:pic>
-        <p:nvPicPr>
-          <p:cNvPr id="1026" name="Picture 2" descr="Image result for python turtle square gif"/>
-          <p:cNvPicPr>
-            <a:picLocks noGrp="1" noChangeAspect="1" noChangeArrowheads="1" noCrop="1"/>
-          </p:cNvPicPr>
-          <p:nvPr>
-            <p:ph type="pic" sz="quarter" idx="13"/>
-          </p:nvPr>
-        </p:nvPicPr>
-        <p:blipFill>
-          <a:blip r:embed="rId2">
-            <a:extLst>
-              <a:ext uri="{28A0092B-C50C-407E-A947-70E740481C1C}">
-                <a14:useLocalDpi xmlns:a14="http://schemas.microsoft.com/office/drawing/2010/main" val="0"/>
-              </a:ext>
-            </a:extLst>
-          </a:blip>
-          <a:srcRect t="12762" b="12762"/>
-          <a:stretch>
-            <a:fillRect/>
-          </a:stretch>
-        </p:blipFill>
-        <p:spPr bwMode="auto">
-          <a:prstGeom prst="rect">
-            <a:avLst/>
-          </a:prstGeom>
-          <a:noFill/>
-          <a:extLst>
-            <a:ext uri="{909E8E84-426E-40DD-AFC4-6F175D3DCCD1}">
-              <a14:hiddenFill xmlns:a14="http://schemas.microsoft.com/office/drawing/2010/main">
-                <a:solidFill>
-                  <a:srgbClr val="FFFFFF"/>
-                </a:solidFill>
-              </a14:hiddenFill>
-            </a:ext>
-          </a:extLst>
-        </p:spPr>
-      </p:pic>
-      <p:sp>
-        <p:nvSpPr>
-          <p:cNvPr id="3" name="Title 2"/>
-          <p:cNvSpPr>
-            <a:spLocks noGrp="1"/>
-          </p:cNvSpPr>
-          <p:nvPr>
-            <p:ph type="title"/>
-          </p:nvPr>
-        </p:nvSpPr>
-        <p:spPr/>
-        <p:txBody>
-          <a:bodyPr/>
-          <a:lstStyle/>
-          <a:p>
-            <a:r>
-              <a:rPr lang="en-US" dirty="0" smtClean="0"/>
-              <a:t>Follow-Along Activity</a:t>
-            </a:r>
-            <a:endParaRPr lang="en-US" dirty="0"/>
-          </a:p>
-        </p:txBody>
-      </p:sp>
-    </p:spTree>
-    <p:extLst>
-      <p:ext uri="{BB962C8B-B14F-4D97-AF65-F5344CB8AC3E}">
-        <p14:creationId xmlns:p14="http://schemas.microsoft.com/office/powerpoint/2010/main" val="4206450011"/>
-      </p:ext>
-    </p:extLst>
-  </p:cSld>
-  <p:clrMapOvr>
-    <a:masterClrMapping/>
-  </p:clrMapOvr>
-  <p:transition>
-    <p:fade/>
-  </p:transition>
-  <p:timing>
-    <p:tnLst>
-      <p:par>
-        <p:cTn id="1" dur="indefinite" restart="never" nodeType="tmRoot"/>
-      </p:par>
-    </p:tnLst>
-  </p:timing>
-</p:sld>
-</file>
-
-<file path=ppt/slides/slide29.xml><?xml version="1.0" encoding="utf-8"?>
-<p:sld xmlns:a="http://schemas.openxmlformats.org/drawingml/2006/main" xmlns:r="http://schemas.openxmlformats.org/officeDocument/2006/relationships" xmlns:p="http://schemas.openxmlformats.org/presentationml/2006/main">
-  <p:cSld>
-    <p:spTree>
-      <p:nvGrpSpPr>
-        <p:cNvPr id="1" name=""/>
-        <p:cNvGrpSpPr/>
-        <p:nvPr/>
-      </p:nvGrpSpPr>
-      <p:grpSpPr>
-        <a:xfrm>
-          <a:off x="0" y="0"/>
-          <a:ext cx="0" cy="0"/>
-          <a:chOff x="0" y="0"/>
-          <a:chExt cx="0" cy="0"/>
-        </a:xfrm>
-      </p:grpSpPr>
-      <p:sp>
-        <p:nvSpPr>
-          <p:cNvPr id="2" name="Title 1"/>
-          <p:cNvSpPr>
-            <a:spLocks noGrp="1"/>
-          </p:cNvSpPr>
-          <p:nvPr>
-            <p:ph type="title"/>
-          </p:nvPr>
-        </p:nvSpPr>
-        <p:spPr/>
-        <p:txBody>
-          <a:bodyPr/>
-          <a:lstStyle/>
-          <a:p>
-            <a:r>
-              <a:rPr lang="en-US" dirty="0" smtClean="0"/>
-              <a:t>Turtle Activities</a:t>
-            </a:r>
-            <a:endParaRPr lang="en-US" dirty="0"/>
-          </a:p>
-        </p:txBody>
-      </p:sp>
-      <p:sp>
-        <p:nvSpPr>
-          <p:cNvPr id="3" name="Content Placeholder 2"/>
-          <p:cNvSpPr>
-            <a:spLocks noGrp="1"/>
-          </p:cNvSpPr>
-          <p:nvPr>
-            <p:ph idx="1"/>
-          </p:nvPr>
-        </p:nvSpPr>
-        <p:spPr/>
-        <p:txBody>
-          <a:bodyPr anchor="ctr">
-            <a:normAutofit/>
-          </a:bodyPr>
-          <a:lstStyle/>
-          <a:p>
-            <a:pPr marL="57150" indent="0" algn="ctr">
-              <a:buNone/>
-            </a:pPr>
-            <a:r>
-              <a:rPr lang="en-US" sz="9600" dirty="0" smtClean="0">
-                <a:hlinkClick r:id="rId3"/>
-              </a:rPr>
-              <a:t>bit.ly/</a:t>
-            </a:r>
-            <a:r>
-              <a:rPr lang="en-US" sz="9600" dirty="0" err="1" smtClean="0">
-                <a:hlinkClick r:id="rId3"/>
-              </a:rPr>
-              <a:t>PyChallenges</a:t>
-            </a:r>
-            <a:endParaRPr lang="en-US" sz="9600" dirty="0"/>
-          </a:p>
-        </p:txBody>
-      </p:sp>
-    </p:spTree>
-    <p:extLst>
-      <p:ext uri="{BB962C8B-B14F-4D97-AF65-F5344CB8AC3E}">
-        <p14:creationId xmlns:p14="http://schemas.microsoft.com/office/powerpoint/2010/main" val="3314393105"/>
-      </p:ext>
-    </p:extLst>
-  </p:cSld>
-  <p:clrMapOvr>
-    <a:masterClrMapping/>
-  </p:clrMapOvr>
-  <p:transition>
-    <p:fade/>
   </p:transition>
   <p:timing>
     <p:tnLst>

</xml_diff>

<commit_message>
Deploy hylandtechoutreach/python-camp to github.com/hylandtechoutreach/python-camp.git:gh-pages
</commit_message>
<xml_diff>
--- a/ProgrammingWithPythonVirtual.pptx
+++ b/ProgrammingWithPythonVirtual.pptx
@@ -5,7 +5,7 @@
     <p:sldMasterId id="2147483648" r:id="rId1"/>
   </p:sldMasterIdLst>
   <p:notesMasterIdLst>
-    <p:notesMasterId r:id="rId31"/>
+    <p:notesMasterId r:id="rId23"/>
   </p:notesMasterIdLst>
   <p:sldIdLst>
     <p:sldId id="259" r:id="rId2"/>
@@ -23,20 +23,12 @@
     <p:sldId id="291" r:id="rId14"/>
     <p:sldId id="307" r:id="rId15"/>
     <p:sldId id="290" r:id="rId16"/>
-    <p:sldId id="293" r:id="rId17"/>
-    <p:sldId id="294" r:id="rId18"/>
-    <p:sldId id="308" r:id="rId19"/>
-    <p:sldId id="296" r:id="rId20"/>
-    <p:sldId id="297" r:id="rId21"/>
-    <p:sldId id="295" r:id="rId22"/>
-    <p:sldId id="299" r:id="rId23"/>
-    <p:sldId id="300" r:id="rId24"/>
-    <p:sldId id="309" r:id="rId25"/>
-    <p:sldId id="301" r:id="rId26"/>
-    <p:sldId id="302" r:id="rId27"/>
-    <p:sldId id="276" r:id="rId28"/>
-    <p:sldId id="305" r:id="rId29"/>
-    <p:sldId id="304" r:id="rId30"/>
+    <p:sldId id="299" r:id="rId17"/>
+    <p:sldId id="300" r:id="rId18"/>
+    <p:sldId id="309" r:id="rId19"/>
+    <p:sldId id="301" r:id="rId20"/>
+    <p:sldId id="302" r:id="rId21"/>
+    <p:sldId id="276" r:id="rId22"/>
   </p:sldIdLst>
   <p:sldSz cx="12192000" cy="6858000"/>
   <p:notesSz cx="6858000" cy="9144000"/>
@@ -236,7 +228,7 @@
           <a:p>
             <a:fld id="{19104133-B5B0-4351-8158-4F0E5EB1E2BF}" type="datetimeFigureOut">
               <a:rPr lang="en-US" smtClean="0"/>
-              <a:t>4/6/2020</a:t>
+              <a:t>4/21/2020</a:t>
             </a:fld>
             <a:endParaRPr lang="en-US"/>
           </a:p>
@@ -934,11 +926,20 @@
           <a:p>
             <a:r>
               <a:rPr lang="en-US" dirty="0" smtClean="0"/>
-              <a:t>In</a:t>
+              <a:t>This slide is</a:t>
             </a:r>
             <a:r>
               <a:rPr lang="en-US" baseline="0" dirty="0" smtClean="0"/>
-              <a:t> a real conversation, one person would respond differently based on what the other person says. A computer also has to respond to user input! Like when searching for something on Google, the results will change based on what the user enters.</a:t>
+              <a:t> mostly for informational purposes, and the students will likely be distracted by the looping gif, so it is not necessary to stay very long on this slide.</a:t>
+            </a:r>
+          </a:p>
+          <a:p>
+            <a:endParaRPr lang="en-US" baseline="0" dirty="0" smtClean="0"/>
+          </a:p>
+          <a:p>
+            <a:r>
+              <a:rPr lang="en-US" baseline="0" dirty="0" smtClean="0"/>
+              <a:t>Explain loops in the context of the image; rather than having to hand-animate every single repeated frame, the gif will loop forever, which is much easier!</a:t>
             </a:r>
             <a:endParaRPr lang="en-US" dirty="0"/>
           </a:p>
@@ -970,7 +971,7 @@
     </p:spTree>
     <p:extLst>
       <p:ext uri="{BB962C8B-B14F-4D97-AF65-F5344CB8AC3E}">
-        <p14:creationId xmlns:p14="http://schemas.microsoft.com/office/powerpoint/2010/main" val="1865151885"/>
+        <p14:creationId xmlns:p14="http://schemas.microsoft.com/office/powerpoint/2010/main" val="2995987653"/>
       </p:ext>
     </p:extLst>
   </p:cSld>
@@ -1026,34 +1027,21 @@
           <a:p>
             <a:r>
               <a:rPr lang="en-US" dirty="0" smtClean="0"/>
-              <a:t>What will happen if the user enters blue? What will happen if the user</a:t>
+              <a:t>See</a:t>
             </a:r>
             <a:r>
               <a:rPr lang="en-US" baseline="0" dirty="0" smtClean="0"/>
-              <a:t> enters something other than blue? Explain that this is the same as the example from a real-life conversation.</a:t>
+              <a:t> if the students can figure out what this code does. The </a:t>
             </a:r>
-          </a:p>
-          <a:p>
-            <a:endParaRPr lang="en-US" baseline="0" dirty="0" smtClean="0"/>
-          </a:p>
-          <a:p>
             <a:r>
               <a:rPr lang="en-US" b="1" baseline="0" dirty="0" smtClean="0"/>
-              <a:t>Indentation</a:t>
+              <a:t>for</a:t>
             </a:r>
             <a:r>
-              <a:rPr lang="en-US" b="0" i="0" baseline="0" dirty="0" smtClean="0"/>
-              <a:t> tells the program what to do </a:t>
+              <a:rPr lang="en-US" b="0" baseline="0" dirty="0" smtClean="0"/>
+              <a:t> loop syntax is not incredibly important, as it will be the same every time (other than the number of iterations). Allow the students to type this code into trinket to see what it does.</a:t>
             </a:r>
-            <a:r>
-              <a:rPr lang="en-US" b="0" i="1" baseline="0" dirty="0" smtClean="0"/>
-              <a:t>if</a:t>
-            </a:r>
-            <a:r>
-              <a:rPr lang="en-US" b="0" i="0" baseline="0" dirty="0" smtClean="0"/>
-              <a:t> the condition is met. </a:t>
-            </a:r>
-            <a:endParaRPr lang="en-US" b="1" dirty="0"/>
+            <a:endParaRPr lang="en-US" dirty="0"/>
           </a:p>
         </p:txBody>
       </p:sp>
@@ -1083,7 +1071,7 @@
     </p:spTree>
     <p:extLst>
       <p:ext uri="{BB962C8B-B14F-4D97-AF65-F5344CB8AC3E}">
-        <p14:creationId xmlns:p14="http://schemas.microsoft.com/office/powerpoint/2010/main" val="2337393084"/>
+        <p14:creationId xmlns:p14="http://schemas.microsoft.com/office/powerpoint/2010/main" val="3921428091"/>
       </p:ext>
     </p:extLst>
   </p:cSld>
@@ -1139,21 +1127,55 @@
           <a:p>
             <a:r>
               <a:rPr lang="en-US" dirty="0" smtClean="0"/>
-              <a:t>Walk through the example</a:t>
+              <a:t>Explain what the</a:t>
             </a:r>
             <a:r>
               <a:rPr lang="en-US" baseline="0" dirty="0" smtClean="0"/>
-              <a:t> line by line. Emphasize the need for indentation under the </a:t>
+              <a:t> example code does. Emphasize the need for indentation.</a:t>
+            </a:r>
+          </a:p>
+          <a:p>
+            <a:endParaRPr lang="en-US" baseline="0" dirty="0" smtClean="0"/>
+          </a:p>
+          <a:p>
+            <a:r>
+              <a:rPr lang="en-US" baseline="0" dirty="0" smtClean="0"/>
+              <a:t>Printing a message is simple enough; it just prints the message to the screen.</a:t>
+            </a:r>
+          </a:p>
+          <a:p>
+            <a:endParaRPr lang="en-US" baseline="0" dirty="0" smtClean="0"/>
+          </a:p>
+          <a:p>
+            <a:r>
+              <a:rPr lang="en-US" baseline="0" dirty="0" smtClean="0"/>
+              <a:t>The </a:t>
             </a:r>
             <a:r>
               <a:rPr lang="en-US" b="1" baseline="0" dirty="0" smtClean="0"/>
-              <a:t>if</a:t>
+              <a:t>print</a:t>
             </a:r>
             <a:r>
               <a:rPr lang="en-US" b="0" baseline="0" dirty="0" smtClean="0"/>
-              <a:t>.</a:t>
+              <a:t> code is within the </a:t>
             </a:r>
-            <a:endParaRPr lang="en-US" b="0" dirty="0"/>
+            <a:r>
+              <a:rPr lang="en-US" b="1" baseline="0" dirty="0" smtClean="0"/>
+              <a:t>for</a:t>
+            </a:r>
+            <a:r>
+              <a:rPr lang="en-US" b="0" baseline="0" dirty="0" smtClean="0"/>
+              <a:t> code (under it, and indented). The </a:t>
+            </a:r>
+            <a:r>
+              <a:rPr lang="en-US" b="1" baseline="0" dirty="0" smtClean="0"/>
+              <a:t>for x in range():</a:t>
+            </a:r>
+            <a:r>
+              <a:rPr lang="en-US" b="0" baseline="0" dirty="0" smtClean="0"/>
+              <a:t> will always be the same for them, the only thing they’ll change is the number.</a:t>
+            </a:r>
+            <a:endParaRPr lang="en-US" dirty="0"/>
           </a:p>
         </p:txBody>
       </p:sp>
@@ -1183,7 +1205,7 @@
     </p:spTree>
     <p:extLst>
       <p:ext uri="{BB962C8B-B14F-4D97-AF65-F5344CB8AC3E}">
-        <p14:creationId xmlns:p14="http://schemas.microsoft.com/office/powerpoint/2010/main" val="874223267"/>
+        <p14:creationId xmlns:p14="http://schemas.microsoft.com/office/powerpoint/2010/main" val="3310518321"/>
       </p:ext>
     </p:extLst>
   </p:cSld>
@@ -1239,35 +1261,27 @@
           <a:p>
             <a:r>
               <a:rPr lang="en-US" dirty="0" smtClean="0"/>
-              <a:t>Explain</a:t>
+              <a:t>Give students the opportunity</a:t>
             </a:r>
             <a:r>
               <a:rPr lang="en-US" baseline="0" dirty="0" smtClean="0"/>
-              <a:t> the distinction between single equals and double equals. This syntax can sometimes trip students up. They should remember, if they are using an </a:t>
+              <a:t> to try and change the code so it prints more messages. All they have to do is change </a:t>
             </a:r>
             <a:r>
               <a:rPr lang="en-US" b="1" baseline="0" dirty="0" smtClean="0"/>
-              <a:t>if</a:t>
+              <a:t>10</a:t>
             </a:r>
             <a:r>
               <a:rPr lang="en-US" b="0" baseline="0" dirty="0" smtClean="0"/>
-              <a:t>, they should use </a:t>
+              <a:t> to </a:t>
             </a:r>
             <a:r>
-              <a:rPr lang="en-US" b="0" i="1" baseline="0" dirty="0" smtClean="0"/>
-              <a:t>two</a:t>
+              <a:rPr lang="en-US" b="1" baseline="0" dirty="0" smtClean="0"/>
+              <a:t>20</a:t>
             </a:r>
             <a:r>
               <a:rPr lang="en-US" b="0" baseline="0" dirty="0" smtClean="0"/>
-              <a:t> equals signs. If they are setting a variable or looking for user input, they should use </a:t>
-            </a:r>
-            <a:r>
-              <a:rPr lang="en-US" b="0" i="1" baseline="0" dirty="0" smtClean="0"/>
-              <a:t>one</a:t>
-            </a:r>
-            <a:r>
-              <a:rPr lang="en-US" b="0" baseline="0" dirty="0" smtClean="0"/>
-              <a:t> equals sign.</a:t>
+              <a:t> (or another number higher than 10) so it prints more.</a:t>
             </a:r>
             <a:endParaRPr lang="en-US" dirty="0"/>
           </a:p>
@@ -1299,7 +1313,7 @@
     </p:spTree>
     <p:extLst>
       <p:ext uri="{BB962C8B-B14F-4D97-AF65-F5344CB8AC3E}">
-        <p14:creationId xmlns:p14="http://schemas.microsoft.com/office/powerpoint/2010/main" val="1652787256"/>
+        <p14:creationId xmlns:p14="http://schemas.microsoft.com/office/powerpoint/2010/main" val="1593956060"/>
       </p:ext>
     </p:extLst>
   </p:cSld>
@@ -1355,19 +1369,11 @@
           <a:p>
             <a:r>
               <a:rPr lang="en-US" dirty="0" smtClean="0"/>
-              <a:t>See if the students can guess what this code</a:t>
+              <a:t>Click the</a:t>
             </a:r>
             <a:r>
               <a:rPr lang="en-US" baseline="0" dirty="0" smtClean="0"/>
-              <a:t> will do. </a:t>
-            </a:r>
-            <a:r>
-              <a:rPr lang="en-US" b="1" baseline="0" dirty="0" smtClean="0"/>
-              <a:t>else</a:t>
-            </a:r>
-            <a:r>
-              <a:rPr lang="en-US" b="0" baseline="0" dirty="0" smtClean="0"/>
-              <a:t> allows different code to execute if a condition is not true.</a:t>
+              <a:t> link to start the Kahoot quiz</a:t>
             </a:r>
             <a:endParaRPr lang="en-US" dirty="0"/>
           </a:p>
@@ -1399,208 +1405,7 @@
     </p:spTree>
     <p:extLst>
       <p:ext uri="{BB962C8B-B14F-4D97-AF65-F5344CB8AC3E}">
-        <p14:creationId xmlns:p14="http://schemas.microsoft.com/office/powerpoint/2010/main" val="3521182454"/>
-      </p:ext>
-    </p:extLst>
-  </p:cSld>
-  <p:clrMapOvr>
-    <a:masterClrMapping/>
-  </p:clrMapOvr>
-</p:notes>
-</file>
-
-<file path=ppt/notesSlides/notesSlide18.xml><?xml version="1.0" encoding="utf-8"?>
-<p:notes xmlns:a="http://schemas.openxmlformats.org/drawingml/2006/main" xmlns:r="http://schemas.openxmlformats.org/officeDocument/2006/relationships" xmlns:p="http://schemas.openxmlformats.org/presentationml/2006/main">
-  <p:cSld>
-    <p:spTree>
-      <p:nvGrpSpPr>
-        <p:cNvPr id="1" name=""/>
-        <p:cNvGrpSpPr/>
-        <p:nvPr/>
-      </p:nvGrpSpPr>
-      <p:grpSpPr>
-        <a:xfrm>
-          <a:off x="0" y="0"/>
-          <a:ext cx="0" cy="0"/>
-          <a:chOff x="0" y="0"/>
-          <a:chExt cx="0" cy="0"/>
-        </a:xfrm>
-      </p:grpSpPr>
-      <p:sp>
-        <p:nvSpPr>
-          <p:cNvPr id="2" name="Slide Image Placeholder 1"/>
-          <p:cNvSpPr>
-            <a:spLocks noGrp="1" noRot="1" noChangeAspect="1"/>
-          </p:cNvSpPr>
-          <p:nvPr>
-            <p:ph type="sldImg"/>
-          </p:nvPr>
-        </p:nvSpPr>
-        <p:spPr/>
-      </p:sp>
-      <p:sp>
-        <p:nvSpPr>
-          <p:cNvPr id="3" name="Notes Placeholder 2"/>
-          <p:cNvSpPr>
-            <a:spLocks noGrp="1"/>
-          </p:cNvSpPr>
-          <p:nvPr>
-            <p:ph type="body" idx="1"/>
-          </p:nvPr>
-        </p:nvSpPr>
-        <p:spPr/>
-        <p:txBody>
-          <a:bodyPr/>
-          <a:lstStyle/>
-          <a:p>
-            <a:r>
-              <a:rPr lang="en-US" dirty="0" smtClean="0"/>
-              <a:t>This slide is</a:t>
-            </a:r>
-            <a:r>
-              <a:rPr lang="en-US" baseline="0" dirty="0" smtClean="0"/>
-              <a:t> mostly for informational purposes, and the students will likely be distracted by the looping gif, so it is not necessary to stay very long on this slide.</a:t>
-            </a:r>
-          </a:p>
-          <a:p>
-            <a:endParaRPr lang="en-US" baseline="0" dirty="0" smtClean="0"/>
-          </a:p>
-          <a:p>
-            <a:r>
-              <a:rPr lang="en-US" baseline="0" dirty="0" smtClean="0"/>
-              <a:t>Explain loops in the context of the image; rather than having to hand-animate every single repeated frame, the gif will loop forever, which is much easier!</a:t>
-            </a:r>
-            <a:endParaRPr lang="en-US" dirty="0"/>
-          </a:p>
-        </p:txBody>
-      </p:sp>
-      <p:sp>
-        <p:nvSpPr>
-          <p:cNvPr id="4" name="Slide Number Placeholder 3"/>
-          <p:cNvSpPr>
-            <a:spLocks noGrp="1"/>
-          </p:cNvSpPr>
-          <p:nvPr>
-            <p:ph type="sldNum" sz="quarter" idx="10"/>
-          </p:nvPr>
-        </p:nvSpPr>
-        <p:spPr/>
-        <p:txBody>
-          <a:bodyPr/>
-          <a:lstStyle/>
-          <a:p>
-            <a:fld id="{DEC8F7F9-57EC-49CF-9FCD-2B781E4B449F}" type="slidenum">
-              <a:rPr lang="en-US" smtClean="0"/>
-              <a:t>22</a:t>
-            </a:fld>
-            <a:endParaRPr lang="en-US"/>
-          </a:p>
-        </p:txBody>
-      </p:sp>
-    </p:spTree>
-    <p:extLst>
-      <p:ext uri="{BB962C8B-B14F-4D97-AF65-F5344CB8AC3E}">
-        <p14:creationId xmlns:p14="http://schemas.microsoft.com/office/powerpoint/2010/main" val="2995987653"/>
-      </p:ext>
-    </p:extLst>
-  </p:cSld>
-  <p:clrMapOvr>
-    <a:masterClrMapping/>
-  </p:clrMapOvr>
-</p:notes>
-</file>
-
-<file path=ppt/notesSlides/notesSlide19.xml><?xml version="1.0" encoding="utf-8"?>
-<p:notes xmlns:a="http://schemas.openxmlformats.org/drawingml/2006/main" xmlns:r="http://schemas.openxmlformats.org/officeDocument/2006/relationships" xmlns:p="http://schemas.openxmlformats.org/presentationml/2006/main">
-  <p:cSld>
-    <p:spTree>
-      <p:nvGrpSpPr>
-        <p:cNvPr id="1" name=""/>
-        <p:cNvGrpSpPr/>
-        <p:nvPr/>
-      </p:nvGrpSpPr>
-      <p:grpSpPr>
-        <a:xfrm>
-          <a:off x="0" y="0"/>
-          <a:ext cx="0" cy="0"/>
-          <a:chOff x="0" y="0"/>
-          <a:chExt cx="0" cy="0"/>
-        </a:xfrm>
-      </p:grpSpPr>
-      <p:sp>
-        <p:nvSpPr>
-          <p:cNvPr id="2" name="Slide Image Placeholder 1"/>
-          <p:cNvSpPr>
-            <a:spLocks noGrp="1" noRot="1" noChangeAspect="1"/>
-          </p:cNvSpPr>
-          <p:nvPr>
-            <p:ph type="sldImg"/>
-          </p:nvPr>
-        </p:nvSpPr>
-        <p:spPr/>
-      </p:sp>
-      <p:sp>
-        <p:nvSpPr>
-          <p:cNvPr id="3" name="Notes Placeholder 2"/>
-          <p:cNvSpPr>
-            <a:spLocks noGrp="1"/>
-          </p:cNvSpPr>
-          <p:nvPr>
-            <p:ph type="body" idx="1"/>
-          </p:nvPr>
-        </p:nvSpPr>
-        <p:spPr/>
-        <p:txBody>
-          <a:bodyPr/>
-          <a:lstStyle/>
-          <a:p>
-            <a:r>
-              <a:rPr lang="en-US" dirty="0" smtClean="0"/>
-              <a:t>See</a:t>
-            </a:r>
-            <a:r>
-              <a:rPr lang="en-US" baseline="0" dirty="0" smtClean="0"/>
-              <a:t> if the students can figure out what this code does. The </a:t>
-            </a:r>
-            <a:r>
-              <a:rPr lang="en-US" b="1" baseline="0" dirty="0" smtClean="0"/>
-              <a:t>for</a:t>
-            </a:r>
-            <a:r>
-              <a:rPr lang="en-US" b="0" baseline="0" dirty="0" smtClean="0"/>
-              <a:t> loop syntax is not incredibly important, as it will be the same every time (other than the number of iterations). Allow the students to type this code into trinket to see what it does.</a:t>
-            </a:r>
-            <a:endParaRPr lang="en-US" dirty="0"/>
-          </a:p>
-        </p:txBody>
-      </p:sp>
-      <p:sp>
-        <p:nvSpPr>
-          <p:cNvPr id="4" name="Slide Number Placeholder 3"/>
-          <p:cNvSpPr>
-            <a:spLocks noGrp="1"/>
-          </p:cNvSpPr>
-          <p:nvPr>
-            <p:ph type="sldNum" sz="quarter" idx="10"/>
-          </p:nvPr>
-        </p:nvSpPr>
-        <p:spPr/>
-        <p:txBody>
-          <a:bodyPr/>
-          <a:lstStyle/>
-          <a:p>
-            <a:fld id="{DEC8F7F9-57EC-49CF-9FCD-2B781E4B449F}" type="slidenum">
-              <a:rPr lang="en-US" smtClean="0"/>
-              <a:t>23</a:t>
-            </a:fld>
-            <a:endParaRPr lang="en-US"/>
-          </a:p>
-        </p:txBody>
-      </p:sp>
-    </p:spTree>
-    <p:extLst>
-      <p:ext uri="{BB962C8B-B14F-4D97-AF65-F5344CB8AC3E}">
-        <p14:creationId xmlns:p14="http://schemas.microsoft.com/office/powerpoint/2010/main" val="3921428091"/>
+        <p14:creationId xmlns:p14="http://schemas.microsoft.com/office/powerpoint/2010/main" val="3866903638"/>
       </p:ext>
     </p:extLst>
   </p:cSld>
@@ -1693,432 +1498,6 @@
     <p:extLst>
       <p:ext uri="{BB962C8B-B14F-4D97-AF65-F5344CB8AC3E}">
         <p14:creationId xmlns:p14="http://schemas.microsoft.com/office/powerpoint/2010/main" val="442973681"/>
-      </p:ext>
-    </p:extLst>
-  </p:cSld>
-  <p:clrMapOvr>
-    <a:masterClrMapping/>
-  </p:clrMapOvr>
-</p:notes>
-</file>
-
-<file path=ppt/notesSlides/notesSlide20.xml><?xml version="1.0" encoding="utf-8"?>
-<p:notes xmlns:a="http://schemas.openxmlformats.org/drawingml/2006/main" xmlns:r="http://schemas.openxmlformats.org/officeDocument/2006/relationships" xmlns:p="http://schemas.openxmlformats.org/presentationml/2006/main">
-  <p:cSld>
-    <p:spTree>
-      <p:nvGrpSpPr>
-        <p:cNvPr id="1" name=""/>
-        <p:cNvGrpSpPr/>
-        <p:nvPr/>
-      </p:nvGrpSpPr>
-      <p:grpSpPr>
-        <a:xfrm>
-          <a:off x="0" y="0"/>
-          <a:ext cx="0" cy="0"/>
-          <a:chOff x="0" y="0"/>
-          <a:chExt cx="0" cy="0"/>
-        </a:xfrm>
-      </p:grpSpPr>
-      <p:sp>
-        <p:nvSpPr>
-          <p:cNvPr id="2" name="Slide Image Placeholder 1"/>
-          <p:cNvSpPr>
-            <a:spLocks noGrp="1" noRot="1" noChangeAspect="1"/>
-          </p:cNvSpPr>
-          <p:nvPr>
-            <p:ph type="sldImg"/>
-          </p:nvPr>
-        </p:nvSpPr>
-        <p:spPr/>
-      </p:sp>
-      <p:sp>
-        <p:nvSpPr>
-          <p:cNvPr id="3" name="Notes Placeholder 2"/>
-          <p:cNvSpPr>
-            <a:spLocks noGrp="1"/>
-          </p:cNvSpPr>
-          <p:nvPr>
-            <p:ph type="body" idx="1"/>
-          </p:nvPr>
-        </p:nvSpPr>
-        <p:spPr/>
-        <p:txBody>
-          <a:bodyPr/>
-          <a:lstStyle/>
-          <a:p>
-            <a:r>
-              <a:rPr lang="en-US" dirty="0" smtClean="0"/>
-              <a:t>Explain what the</a:t>
-            </a:r>
-            <a:r>
-              <a:rPr lang="en-US" baseline="0" dirty="0" smtClean="0"/>
-              <a:t> example code does. Emphasize the need for indentation.</a:t>
-            </a:r>
-          </a:p>
-          <a:p>
-            <a:endParaRPr lang="en-US" baseline="0" dirty="0" smtClean="0"/>
-          </a:p>
-          <a:p>
-            <a:r>
-              <a:rPr lang="en-US" baseline="0" dirty="0" smtClean="0"/>
-              <a:t>Printing a message is simple enough; it just prints the message to the screen.</a:t>
-            </a:r>
-          </a:p>
-          <a:p>
-            <a:endParaRPr lang="en-US" baseline="0" dirty="0" smtClean="0"/>
-          </a:p>
-          <a:p>
-            <a:r>
-              <a:rPr lang="en-US" baseline="0" dirty="0" smtClean="0"/>
-              <a:t>The </a:t>
-            </a:r>
-            <a:r>
-              <a:rPr lang="en-US" b="1" baseline="0" dirty="0" smtClean="0"/>
-              <a:t>print</a:t>
-            </a:r>
-            <a:r>
-              <a:rPr lang="en-US" b="0" baseline="0" dirty="0" smtClean="0"/>
-              <a:t> code is within the </a:t>
-            </a:r>
-            <a:r>
-              <a:rPr lang="en-US" b="1" baseline="0" dirty="0" smtClean="0"/>
-              <a:t>for</a:t>
-            </a:r>
-            <a:r>
-              <a:rPr lang="en-US" b="0" baseline="0" dirty="0" smtClean="0"/>
-              <a:t> code (under it, and indented). The </a:t>
-            </a:r>
-            <a:r>
-              <a:rPr lang="en-US" b="1" baseline="0" dirty="0" smtClean="0"/>
-              <a:t>for x in range():</a:t>
-            </a:r>
-            <a:r>
-              <a:rPr lang="en-US" b="0" baseline="0" dirty="0" smtClean="0"/>
-              <a:t> will always be the same for them, the only thing they’ll change is the number.</a:t>
-            </a:r>
-            <a:endParaRPr lang="en-US" dirty="0"/>
-          </a:p>
-        </p:txBody>
-      </p:sp>
-      <p:sp>
-        <p:nvSpPr>
-          <p:cNvPr id="4" name="Slide Number Placeholder 3"/>
-          <p:cNvSpPr>
-            <a:spLocks noGrp="1"/>
-          </p:cNvSpPr>
-          <p:nvPr>
-            <p:ph type="sldNum" sz="quarter" idx="10"/>
-          </p:nvPr>
-        </p:nvSpPr>
-        <p:spPr/>
-        <p:txBody>
-          <a:bodyPr/>
-          <a:lstStyle/>
-          <a:p>
-            <a:fld id="{DEC8F7F9-57EC-49CF-9FCD-2B781E4B449F}" type="slidenum">
-              <a:rPr lang="en-US" smtClean="0"/>
-              <a:t>25</a:t>
-            </a:fld>
-            <a:endParaRPr lang="en-US"/>
-          </a:p>
-        </p:txBody>
-      </p:sp>
-    </p:spTree>
-    <p:extLst>
-      <p:ext uri="{BB962C8B-B14F-4D97-AF65-F5344CB8AC3E}">
-        <p14:creationId xmlns:p14="http://schemas.microsoft.com/office/powerpoint/2010/main" val="3310518321"/>
-      </p:ext>
-    </p:extLst>
-  </p:cSld>
-  <p:clrMapOvr>
-    <a:masterClrMapping/>
-  </p:clrMapOvr>
-</p:notes>
-</file>
-
-<file path=ppt/notesSlides/notesSlide21.xml><?xml version="1.0" encoding="utf-8"?>
-<p:notes xmlns:a="http://schemas.openxmlformats.org/drawingml/2006/main" xmlns:r="http://schemas.openxmlformats.org/officeDocument/2006/relationships" xmlns:p="http://schemas.openxmlformats.org/presentationml/2006/main">
-  <p:cSld>
-    <p:spTree>
-      <p:nvGrpSpPr>
-        <p:cNvPr id="1" name=""/>
-        <p:cNvGrpSpPr/>
-        <p:nvPr/>
-      </p:nvGrpSpPr>
-      <p:grpSpPr>
-        <a:xfrm>
-          <a:off x="0" y="0"/>
-          <a:ext cx="0" cy="0"/>
-          <a:chOff x="0" y="0"/>
-          <a:chExt cx="0" cy="0"/>
-        </a:xfrm>
-      </p:grpSpPr>
-      <p:sp>
-        <p:nvSpPr>
-          <p:cNvPr id="2" name="Slide Image Placeholder 1"/>
-          <p:cNvSpPr>
-            <a:spLocks noGrp="1" noRot="1" noChangeAspect="1"/>
-          </p:cNvSpPr>
-          <p:nvPr>
-            <p:ph type="sldImg"/>
-          </p:nvPr>
-        </p:nvSpPr>
-        <p:spPr/>
-      </p:sp>
-      <p:sp>
-        <p:nvSpPr>
-          <p:cNvPr id="3" name="Notes Placeholder 2"/>
-          <p:cNvSpPr>
-            <a:spLocks noGrp="1"/>
-          </p:cNvSpPr>
-          <p:nvPr>
-            <p:ph type="body" idx="1"/>
-          </p:nvPr>
-        </p:nvSpPr>
-        <p:spPr/>
-        <p:txBody>
-          <a:bodyPr/>
-          <a:lstStyle/>
-          <a:p>
-            <a:r>
-              <a:rPr lang="en-US" dirty="0" smtClean="0"/>
-              <a:t>Give students the opportunity</a:t>
-            </a:r>
-            <a:r>
-              <a:rPr lang="en-US" baseline="0" dirty="0" smtClean="0"/>
-              <a:t> to try and change the code so it prints more messages. All they have to do is change </a:t>
-            </a:r>
-            <a:r>
-              <a:rPr lang="en-US" b="1" baseline="0" dirty="0" smtClean="0"/>
-              <a:t>10</a:t>
-            </a:r>
-            <a:r>
-              <a:rPr lang="en-US" b="0" baseline="0" dirty="0" smtClean="0"/>
-              <a:t> to </a:t>
-            </a:r>
-            <a:r>
-              <a:rPr lang="en-US" b="1" baseline="0" dirty="0" smtClean="0"/>
-              <a:t>20</a:t>
-            </a:r>
-            <a:r>
-              <a:rPr lang="en-US" b="0" baseline="0" dirty="0" smtClean="0"/>
-              <a:t> (or another number higher than 10) so it prints more.</a:t>
-            </a:r>
-            <a:endParaRPr lang="en-US" dirty="0"/>
-          </a:p>
-        </p:txBody>
-      </p:sp>
-      <p:sp>
-        <p:nvSpPr>
-          <p:cNvPr id="4" name="Slide Number Placeholder 3"/>
-          <p:cNvSpPr>
-            <a:spLocks noGrp="1"/>
-          </p:cNvSpPr>
-          <p:nvPr>
-            <p:ph type="sldNum" sz="quarter" idx="10"/>
-          </p:nvPr>
-        </p:nvSpPr>
-        <p:spPr/>
-        <p:txBody>
-          <a:bodyPr/>
-          <a:lstStyle/>
-          <a:p>
-            <a:fld id="{DEC8F7F9-57EC-49CF-9FCD-2B781E4B449F}" type="slidenum">
-              <a:rPr lang="en-US" smtClean="0"/>
-              <a:t>26</a:t>
-            </a:fld>
-            <a:endParaRPr lang="en-US"/>
-          </a:p>
-        </p:txBody>
-      </p:sp>
-    </p:spTree>
-    <p:extLst>
-      <p:ext uri="{BB962C8B-B14F-4D97-AF65-F5344CB8AC3E}">
-        <p14:creationId xmlns:p14="http://schemas.microsoft.com/office/powerpoint/2010/main" val="1593956060"/>
-      </p:ext>
-    </p:extLst>
-  </p:cSld>
-  <p:clrMapOvr>
-    <a:masterClrMapping/>
-  </p:clrMapOvr>
-</p:notes>
-</file>
-
-<file path=ppt/notesSlides/notesSlide22.xml><?xml version="1.0" encoding="utf-8"?>
-<p:notes xmlns:a="http://schemas.openxmlformats.org/drawingml/2006/main" xmlns:r="http://schemas.openxmlformats.org/officeDocument/2006/relationships" xmlns:p="http://schemas.openxmlformats.org/presentationml/2006/main">
-  <p:cSld>
-    <p:spTree>
-      <p:nvGrpSpPr>
-        <p:cNvPr id="1" name=""/>
-        <p:cNvGrpSpPr/>
-        <p:nvPr/>
-      </p:nvGrpSpPr>
-      <p:grpSpPr>
-        <a:xfrm>
-          <a:off x="0" y="0"/>
-          <a:ext cx="0" cy="0"/>
-          <a:chOff x="0" y="0"/>
-          <a:chExt cx="0" cy="0"/>
-        </a:xfrm>
-      </p:grpSpPr>
-      <p:sp>
-        <p:nvSpPr>
-          <p:cNvPr id="2" name="Slide Image Placeholder 1"/>
-          <p:cNvSpPr>
-            <a:spLocks noGrp="1" noRot="1" noChangeAspect="1"/>
-          </p:cNvSpPr>
-          <p:nvPr>
-            <p:ph type="sldImg"/>
-          </p:nvPr>
-        </p:nvSpPr>
-        <p:spPr/>
-      </p:sp>
-      <p:sp>
-        <p:nvSpPr>
-          <p:cNvPr id="3" name="Notes Placeholder 2"/>
-          <p:cNvSpPr>
-            <a:spLocks noGrp="1"/>
-          </p:cNvSpPr>
-          <p:nvPr>
-            <p:ph type="body" idx="1"/>
-          </p:nvPr>
-        </p:nvSpPr>
-        <p:spPr/>
-        <p:txBody>
-          <a:bodyPr/>
-          <a:lstStyle/>
-          <a:p>
-            <a:r>
-              <a:rPr lang="en-US" dirty="0" smtClean="0"/>
-              <a:t>Click the</a:t>
-            </a:r>
-            <a:r>
-              <a:rPr lang="en-US" baseline="0" dirty="0" smtClean="0"/>
-              <a:t> link to start the Kahoot quiz</a:t>
-            </a:r>
-            <a:endParaRPr lang="en-US" dirty="0"/>
-          </a:p>
-        </p:txBody>
-      </p:sp>
-      <p:sp>
-        <p:nvSpPr>
-          <p:cNvPr id="4" name="Slide Number Placeholder 3"/>
-          <p:cNvSpPr>
-            <a:spLocks noGrp="1"/>
-          </p:cNvSpPr>
-          <p:nvPr>
-            <p:ph type="sldNum" sz="quarter" idx="10"/>
-          </p:nvPr>
-        </p:nvSpPr>
-        <p:spPr/>
-        <p:txBody>
-          <a:bodyPr/>
-          <a:lstStyle/>
-          <a:p>
-            <a:fld id="{DEC8F7F9-57EC-49CF-9FCD-2B781E4B449F}" type="slidenum">
-              <a:rPr lang="en-US" smtClean="0"/>
-              <a:t>27</a:t>
-            </a:fld>
-            <a:endParaRPr lang="en-US"/>
-          </a:p>
-        </p:txBody>
-      </p:sp>
-    </p:spTree>
-    <p:extLst>
-      <p:ext uri="{BB962C8B-B14F-4D97-AF65-F5344CB8AC3E}">
-        <p14:creationId xmlns:p14="http://schemas.microsoft.com/office/powerpoint/2010/main" val="3866903638"/>
-      </p:ext>
-    </p:extLst>
-  </p:cSld>
-  <p:clrMapOvr>
-    <a:masterClrMapping/>
-  </p:clrMapOvr>
-</p:notes>
-</file>
-
-<file path=ppt/notesSlides/notesSlide23.xml><?xml version="1.0" encoding="utf-8"?>
-<p:notes xmlns:a="http://schemas.openxmlformats.org/drawingml/2006/main" xmlns:r="http://schemas.openxmlformats.org/officeDocument/2006/relationships" xmlns:p="http://schemas.openxmlformats.org/presentationml/2006/main">
-  <p:cSld>
-    <p:spTree>
-      <p:nvGrpSpPr>
-        <p:cNvPr id="1" name=""/>
-        <p:cNvGrpSpPr/>
-        <p:nvPr/>
-      </p:nvGrpSpPr>
-      <p:grpSpPr>
-        <a:xfrm>
-          <a:off x="0" y="0"/>
-          <a:ext cx="0" cy="0"/>
-          <a:chOff x="0" y="0"/>
-          <a:chExt cx="0" cy="0"/>
-        </a:xfrm>
-      </p:grpSpPr>
-      <p:sp>
-        <p:nvSpPr>
-          <p:cNvPr id="2" name="Slide Image Placeholder 1"/>
-          <p:cNvSpPr>
-            <a:spLocks noGrp="1" noRot="1" noChangeAspect="1"/>
-          </p:cNvSpPr>
-          <p:nvPr>
-            <p:ph type="sldImg"/>
-          </p:nvPr>
-        </p:nvSpPr>
-        <p:spPr/>
-      </p:sp>
-      <p:sp>
-        <p:nvSpPr>
-          <p:cNvPr id="3" name="Notes Placeholder 2"/>
-          <p:cNvSpPr>
-            <a:spLocks noGrp="1"/>
-          </p:cNvSpPr>
-          <p:nvPr>
-            <p:ph type="body" idx="1"/>
-          </p:nvPr>
-        </p:nvSpPr>
-        <p:spPr/>
-        <p:txBody>
-          <a:bodyPr/>
-          <a:lstStyle/>
-          <a:p>
-            <a:r>
-              <a:rPr lang="en-US" dirty="0" smtClean="0"/>
-              <a:t>Direct the students to visit the</a:t>
-            </a:r>
-            <a:r>
-              <a:rPr lang="en-US" baseline="0" dirty="0" smtClean="0"/>
-              <a:t> URL. This will contain the instructions for the challenge activities.</a:t>
-            </a:r>
-            <a:endParaRPr lang="en-US" dirty="0"/>
-          </a:p>
-        </p:txBody>
-      </p:sp>
-      <p:sp>
-        <p:nvSpPr>
-          <p:cNvPr id="4" name="Slide Number Placeholder 3"/>
-          <p:cNvSpPr>
-            <a:spLocks noGrp="1"/>
-          </p:cNvSpPr>
-          <p:nvPr>
-            <p:ph type="sldNum" sz="quarter" idx="10"/>
-          </p:nvPr>
-        </p:nvSpPr>
-        <p:spPr/>
-        <p:txBody>
-          <a:bodyPr/>
-          <a:lstStyle/>
-          <a:p>
-            <a:fld id="{DEC8F7F9-57EC-49CF-9FCD-2B781E4B449F}" type="slidenum">
-              <a:rPr lang="en-US" smtClean="0"/>
-              <a:t>29</a:t>
-            </a:fld>
-            <a:endParaRPr lang="en-US"/>
-          </a:p>
-        </p:txBody>
-      </p:sp>
-    </p:spTree>
-    <p:extLst>
-      <p:ext uri="{BB962C8B-B14F-4D97-AF65-F5344CB8AC3E}">
-        <p14:creationId xmlns:p14="http://schemas.microsoft.com/office/powerpoint/2010/main" val="1162618150"/>
       </p:ext>
     </p:extLst>
   </p:cSld>
@@ -2569,15 +1948,7 @@
             </a:r>
             <a:r>
               <a:rPr lang="en-US" baseline="0" dirty="0" smtClean="0"/>
-              <a:t> if they can guess what this does. </a:t>
-            </a:r>
-            <a:r>
-              <a:rPr lang="en-US" baseline="0" dirty="0" smtClean="0"/>
-              <a:t>Then reveal </a:t>
-            </a:r>
-            <a:r>
-              <a:rPr lang="en-US" baseline="0" dirty="0" smtClean="0"/>
-              <a:t>the answer.</a:t>
+              <a:t> if they can guess what this does. Then reveal the answer.</a:t>
             </a:r>
           </a:p>
           <a:p>
@@ -3056,7 +2427,7 @@
             <a:fld id="{1C2D31DE-C454-491C-B5C3-F097855E3DF7}" type="datetime4">
               <a:rPr lang="en-US" smtClean="0"/>
               <a:pPr/>
-              <a:t>April 6, 2020</a:t>
+              <a:t>April 21, 2020</a:t>
             </a:fld>
             <a:endParaRPr lang="en-US" dirty="0"/>
           </a:p>
@@ -6456,7 +5827,7 @@
           <a:p>
             <a:fld id="{5958763E-B898-436D-883D-03711491D54A}" type="datetimeFigureOut">
               <a:rPr lang="en-US" smtClean="0"/>
-              <a:t>4/6/2020</a:t>
+              <a:t>4/21/2020</a:t>
             </a:fld>
             <a:endParaRPr lang="en-US"/>
           </a:p>
@@ -6657,7 +6028,7 @@
           <a:p>
             <a:fld id="{5958763E-B898-436D-883D-03711491D54A}" type="datetimeFigureOut">
               <a:rPr lang="en-US" smtClean="0"/>
-              <a:t>4/6/2020</a:t>
+              <a:t>4/21/2020</a:t>
             </a:fld>
             <a:endParaRPr lang="en-US"/>
           </a:p>
@@ -6914,7 +6285,7 @@
           <a:p>
             <a:fld id="{5958763E-B898-436D-883D-03711491D54A}" type="datetimeFigureOut">
               <a:rPr lang="en-US" smtClean="0"/>
-              <a:t>4/6/2020</a:t>
+              <a:t>4/21/2020</a:t>
             </a:fld>
             <a:endParaRPr lang="en-US"/>
           </a:p>
@@ -7269,7 +6640,7 @@
           <a:p>
             <a:fld id="{5958763E-B898-436D-883D-03711491D54A}" type="datetimeFigureOut">
               <a:rPr lang="en-US" smtClean="0"/>
-              <a:t>4/6/2020</a:t>
+              <a:t>4/21/2020</a:t>
             </a:fld>
             <a:endParaRPr lang="en-US"/>
           </a:p>
@@ -7692,7 +7063,7 @@
           <a:p>
             <a:fld id="{5958763E-B898-436D-883D-03711491D54A}" type="datetimeFigureOut">
               <a:rPr lang="en-US" smtClean="0"/>
-              <a:t>4/6/2020</a:t>
+              <a:t>4/21/2020</a:t>
             </a:fld>
             <a:endParaRPr lang="en-US"/>
           </a:p>
@@ -8200,7 +7571,7 @@
           <a:p>
             <a:fld id="{5958763E-B898-436D-883D-03711491D54A}" type="datetimeFigureOut">
               <a:rPr lang="en-US" smtClean="0"/>
-              <a:t>4/6/2020</a:t>
+              <a:t>4/21/2020</a:t>
             </a:fld>
             <a:endParaRPr lang="en-US"/>
           </a:p>
@@ -8658,7 +8029,7 @@
           <a:p>
             <a:fld id="{5958763E-B898-436D-883D-03711491D54A}" type="datetimeFigureOut">
               <a:rPr lang="en-US" smtClean="0"/>
-              <a:t>4/6/2020</a:t>
+              <a:t>4/21/2020</a:t>
             </a:fld>
             <a:endParaRPr lang="en-US"/>
           </a:p>
@@ -9276,7 +8647,7 @@
           <a:p>
             <a:fld id="{5958763E-B898-436D-883D-03711491D54A}" type="datetimeFigureOut">
               <a:rPr lang="en-US" smtClean="0"/>
-              <a:t>4/6/2020</a:t>
+              <a:t>4/21/2020</a:t>
             </a:fld>
             <a:endParaRPr lang="en-US"/>
           </a:p>
@@ -10054,7 +9425,7 @@
           <a:p>
             <a:fld id="{5958763E-B898-436D-883D-03711491D54A}" type="datetimeFigureOut">
               <a:rPr lang="en-US" smtClean="0"/>
-              <a:t>4/6/2020</a:t>
+              <a:t>4/21/2020</a:t>
             </a:fld>
             <a:endParaRPr lang="en-US"/>
           </a:p>
@@ -10165,7 +9536,7 @@
           <a:p>
             <a:fld id="{5958763E-B898-436D-883D-03711491D54A}" type="datetimeFigureOut">
               <a:rPr lang="en-US" smtClean="0"/>
-              <a:t>4/6/2020</a:t>
+              <a:t>4/21/2020</a:t>
             </a:fld>
             <a:endParaRPr lang="en-US"/>
           </a:p>
@@ -10507,7 +9878,7 @@
             <a:fld id="{1C2D31DE-C454-491C-B5C3-F097855E3DF7}" type="datetime4">
               <a:rPr lang="en-US" smtClean="0"/>
               <a:pPr/>
-              <a:t>April 6, 2020</a:t>
+              <a:t>April 21, 2020</a:t>
             </a:fld>
             <a:endParaRPr lang="en-US" dirty="0"/>
           </a:p>
@@ -13667,7 +13038,7 @@
           <a:p>
             <a:fld id="{5958763E-B898-436D-883D-03711491D54A}" type="datetimeFigureOut">
               <a:rPr lang="en-US" smtClean="0"/>
-              <a:t>4/6/2020</a:t>
+              <a:t>4/21/2020</a:t>
             </a:fld>
             <a:endParaRPr lang="en-US"/>
           </a:p>
@@ -13798,7 +13169,7 @@
           <a:p>
             <a:fld id="{5958763E-B898-436D-883D-03711491D54A}" type="datetimeFigureOut">
               <a:rPr lang="en-US" smtClean="0"/>
-              <a:t>4/6/2020</a:t>
+              <a:t>4/21/2020</a:t>
             </a:fld>
             <a:endParaRPr lang="en-US"/>
           </a:p>
@@ -13929,7 +13300,7 @@
           <a:p>
             <a:fld id="{5958763E-B898-436D-883D-03711491D54A}" type="datetimeFigureOut">
               <a:rPr lang="en-US" smtClean="0"/>
-              <a:t>4/6/2020</a:t>
+              <a:t>4/21/2020</a:t>
             </a:fld>
             <a:endParaRPr lang="en-US"/>
           </a:p>
@@ -14060,7 +13431,7 @@
           <a:p>
             <a:fld id="{5958763E-B898-436D-883D-03711491D54A}" type="datetimeFigureOut">
               <a:rPr lang="en-US" smtClean="0"/>
-              <a:t>4/6/2020</a:t>
+              <a:t>4/21/2020</a:t>
             </a:fld>
             <a:endParaRPr lang="en-US"/>
           </a:p>
@@ -14191,7 +13562,7 @@
           <a:p>
             <a:fld id="{5958763E-B898-436D-883D-03711491D54A}" type="datetimeFigureOut">
               <a:rPr lang="en-US" smtClean="0"/>
-              <a:t>4/6/2020</a:t>
+              <a:t>4/21/2020</a:t>
             </a:fld>
             <a:endParaRPr lang="en-US"/>
           </a:p>
@@ -14322,7 +13693,7 @@
           <a:p>
             <a:fld id="{5958763E-B898-436D-883D-03711491D54A}" type="datetimeFigureOut">
               <a:rPr lang="en-US" smtClean="0"/>
-              <a:t>4/6/2020</a:t>
+              <a:t>4/21/2020</a:t>
             </a:fld>
             <a:endParaRPr lang="en-US"/>
           </a:p>
@@ -14453,7 +13824,7 @@
           <a:p>
             <a:fld id="{5958763E-B898-436D-883D-03711491D54A}" type="datetimeFigureOut">
               <a:rPr lang="en-US" smtClean="0"/>
-              <a:t>4/6/2020</a:t>
+              <a:t>4/21/2020</a:t>
             </a:fld>
             <a:endParaRPr lang="en-US"/>
           </a:p>
@@ -14584,7 +13955,7 @@
           <a:p>
             <a:fld id="{5958763E-B898-436D-883D-03711491D54A}" type="datetimeFigureOut">
               <a:rPr lang="en-US" smtClean="0"/>
-              <a:t>4/6/2020</a:t>
+              <a:t>4/21/2020</a:t>
             </a:fld>
             <a:endParaRPr lang="en-US"/>
           </a:p>
@@ -14724,7 +14095,7 @@
           <a:p>
             <a:fld id="{5958763E-B898-436D-883D-03711491D54A}" type="datetimeFigureOut">
               <a:rPr lang="en-US" smtClean="0"/>
-              <a:t>4/6/2020</a:t>
+              <a:t>4/21/2020</a:t>
             </a:fld>
             <a:endParaRPr lang="en-US"/>
           </a:p>
@@ -18085,7 +17456,7 @@
             <a:fld id="{1C2D31DE-C454-491C-B5C3-F097855E3DF7}" type="datetime4">
               <a:rPr lang="en-US" smtClean="0"/>
               <a:pPr/>
-              <a:t>April 6, 2020</a:t>
+              <a:t>April 21, 2020</a:t>
             </a:fld>
             <a:endParaRPr lang="en-US" dirty="0"/>
           </a:p>
@@ -30330,7 +29701,7 @@
           <a:p>
             <a:fld id="{5958763E-B898-436D-883D-03711491D54A}" type="datetimeFigureOut">
               <a:rPr lang="en-US" smtClean="0"/>
-              <a:t>4/6/2020</a:t>
+              <a:t>4/21/2020</a:t>
             </a:fld>
             <a:endParaRPr lang="en-US"/>
           </a:p>
@@ -30739,7 +30110,7 @@
           <a:p>
             <a:fld id="{5958763E-B898-436D-883D-03711491D54A}" type="datetimeFigureOut">
               <a:rPr lang="en-US" smtClean="0"/>
-              <a:t>4/6/2020</a:t>
+              <a:t>4/21/2020</a:t>
             </a:fld>
             <a:endParaRPr lang="en-US"/>
           </a:p>
@@ -31040,7 +30411,7 @@
           <a:p>
             <a:fld id="{5958763E-B898-436D-883D-03711491D54A}" type="datetimeFigureOut">
               <a:rPr lang="en-US" smtClean="0"/>
-              <a:t>4/6/2020</a:t>
+              <a:t>4/21/2020</a:t>
             </a:fld>
             <a:endParaRPr lang="en-US"/>
           </a:p>
@@ -31248,7 +30619,7 @@
           <a:p>
             <a:fld id="{5958763E-B898-436D-883D-03711491D54A}" type="datetimeFigureOut">
               <a:rPr lang="en-US" smtClean="0"/>
-              <a:t>4/6/2020</a:t>
+              <a:t>4/21/2020</a:t>
             </a:fld>
             <a:endParaRPr lang="en-US"/>
           </a:p>
@@ -31516,7 +30887,7 @@
           <a:p>
             <a:fld id="{5958763E-B898-436D-883D-03711491D54A}" type="datetimeFigureOut">
               <a:rPr lang="en-US" smtClean="0"/>
-              <a:t>4/6/2020</a:t>
+              <a:t>4/21/2020</a:t>
             </a:fld>
             <a:endParaRPr lang="en-US"/>
           </a:p>
@@ -32033,7 +31404,7 @@
           <a:p>
             <a:fld id="{5958763E-B898-436D-883D-03711491D54A}" type="datetimeFigureOut">
               <a:rPr lang="en-US" smtClean="0"/>
-              <a:t>4/6/2020</a:t>
+              <a:t>4/21/2020</a:t>
             </a:fld>
             <a:endParaRPr lang="en-US"/>
           </a:p>
@@ -32521,7 +31892,7 @@
           <a:p>
             <a:fld id="{5958763E-B898-436D-883D-03711491D54A}" type="datetimeFigureOut">
               <a:rPr lang="en-US" smtClean="0"/>
-              <a:t>4/6/2020</a:t>
+              <a:t>4/21/2020</a:t>
             </a:fld>
             <a:endParaRPr lang="en-US"/>
           </a:p>
@@ -33347,7 +32718,7 @@
           <a:p>
             <a:fld id="{5958763E-B898-436D-883D-03711491D54A}" type="datetimeFigureOut">
               <a:rPr lang="en-US" smtClean="0"/>
-              <a:t>4/6/2020</a:t>
+              <a:t>4/21/2020</a:t>
             </a:fld>
             <a:endParaRPr lang="en-US"/>
           </a:p>
@@ -33555,7 +32926,7 @@
           <a:p>
             <a:fld id="{5958763E-B898-436D-883D-03711491D54A}" type="datetimeFigureOut">
               <a:rPr lang="en-US" smtClean="0"/>
-              <a:t>4/6/2020</a:t>
+              <a:t>4/21/2020</a:t>
             </a:fld>
             <a:endParaRPr lang="en-US"/>
           </a:p>
@@ -33897,7 +33268,7 @@
           <a:p>
             <a:fld id="{5958763E-B898-436D-883D-03711491D54A}" type="datetimeFigureOut">
               <a:rPr lang="en-US" smtClean="0"/>
-              <a:t>4/6/2020</a:t>
+              <a:t>4/21/2020</a:t>
             </a:fld>
             <a:endParaRPr lang="en-US"/>
           </a:p>
@@ -34134,7 +33505,7 @@
           <a:p>
             <a:fld id="{5958763E-B898-436D-883D-03711491D54A}" type="datetimeFigureOut">
               <a:rPr lang="en-US" smtClean="0"/>
-              <a:t>4/6/2020</a:t>
+              <a:t>4/21/2020</a:t>
             </a:fld>
             <a:endParaRPr lang="en-US"/>
           </a:p>
@@ -34385,7 +33756,7 @@
           <a:p>
             <a:fld id="{5958763E-B898-436D-883D-03711491D54A}" type="datetimeFigureOut">
               <a:rPr lang="en-US" smtClean="0"/>
-              <a:t>4/6/2020</a:t>
+              <a:t>4/21/2020</a:t>
             </a:fld>
             <a:endParaRPr lang="en-US"/>
           </a:p>
@@ -34943,11 +34314,7 @@
           <a:p>
             <a:r>
               <a:rPr lang="en-US" dirty="0" smtClean="0"/>
-              <a:t>Virtual Hy-Tech </a:t>
-            </a:r>
-            <a:r>
-              <a:rPr lang="en-US" dirty="0" smtClean="0"/>
-              <a:t>Camp</a:t>
+              <a:t>Virtual Hy-Tech Camp</a:t>
             </a:r>
             <a:endParaRPr lang="en-US" dirty="0"/>
           </a:p>
@@ -40349,2873 +39716,6 @@
           <a:p>
             <a:r>
               <a:rPr lang="en-US" dirty="0" smtClean="0"/>
-              <a:t>More User interactions – if/else</a:t>
-            </a:r>
-            <a:endParaRPr lang="en-US" dirty="0"/>
-          </a:p>
-        </p:txBody>
-      </p:sp>
-      <p:sp>
-        <p:nvSpPr>
-          <p:cNvPr id="7" name="Content Placeholder 6"/>
-          <p:cNvSpPr>
-            <a:spLocks noGrp="1"/>
-          </p:cNvSpPr>
-          <p:nvPr>
-            <p:ph idx="1"/>
-          </p:nvPr>
-        </p:nvSpPr>
-        <p:spPr>
-          <a:xfrm>
-            <a:off x="6435724" y="1192976"/>
-            <a:ext cx="5375275" cy="5322124"/>
-          </a:xfrm>
-        </p:spPr>
-        <p:txBody>
-          <a:bodyPr>
-            <a:normAutofit/>
-          </a:bodyPr>
-          <a:lstStyle/>
-          <a:p>
-            <a:r>
-              <a:rPr lang="en-US" dirty="0" smtClean="0"/>
-              <a:t>Real life conversation: Responses change based on what the other party says</a:t>
-            </a:r>
-          </a:p>
-          <a:p>
-            <a:pPr marL="57150" indent="0">
-              <a:buNone/>
-            </a:pPr>
-            <a:endParaRPr lang="en-US" dirty="0"/>
-          </a:p>
-          <a:p>
-            <a:r>
-              <a:rPr lang="en-US" b="1" dirty="0" smtClean="0"/>
-              <a:t>If</a:t>
-            </a:r>
-            <a:r>
-              <a:rPr lang="en-US" dirty="0" smtClean="0"/>
-              <a:t> someone says their favorite color is </a:t>
-            </a:r>
-            <a:r>
-              <a:rPr lang="en-US" dirty="0" smtClean="0">
-                <a:solidFill>
-                  <a:schemeClr val="accent1"/>
-                </a:solidFill>
-              </a:rPr>
-              <a:t>blue</a:t>
-            </a:r>
-            <a:r>
-              <a:rPr lang="en-US" dirty="0" smtClean="0"/>
-              <a:t>, you might say “That’s my favorite too!”</a:t>
-            </a:r>
-            <a:endParaRPr lang="en-US" dirty="0"/>
-          </a:p>
-          <a:p>
-            <a:r>
-              <a:rPr lang="en-US" dirty="0" smtClean="0"/>
-              <a:t>If they say something </a:t>
-            </a:r>
-            <a:r>
-              <a:rPr lang="en-US" b="1" dirty="0" smtClean="0"/>
-              <a:t>else</a:t>
-            </a:r>
-            <a:r>
-              <a:rPr lang="en-US" dirty="0" smtClean="0"/>
-              <a:t>, you might say “That’s not my favorite”</a:t>
-            </a:r>
-          </a:p>
-        </p:txBody>
-      </p:sp>
-      <p:pic>
-        <p:nvPicPr>
-          <p:cNvPr id="2050" name="Picture 2" descr="Image result for what's your favorite color comic"/>
-          <p:cNvPicPr>
-            <a:picLocks noChangeAspect="1" noChangeArrowheads="1"/>
-          </p:cNvPicPr>
-          <p:nvPr/>
-        </p:nvPicPr>
-        <p:blipFill>
-          <a:blip r:embed="rId3">
-            <a:extLst>
-              <a:ext uri="{28A0092B-C50C-407E-A947-70E740481C1C}">
-                <a14:useLocalDpi xmlns:a14="http://schemas.microsoft.com/office/drawing/2010/main" val="0"/>
-              </a:ext>
-            </a:extLst>
-          </a:blip>
-          <a:srcRect/>
-          <a:stretch>
-            <a:fillRect/>
-          </a:stretch>
-        </p:blipFill>
-        <p:spPr bwMode="auto">
-          <a:xfrm>
-            <a:off x="381000" y="1192976"/>
-            <a:ext cx="6054725" cy="4357747"/>
-          </a:xfrm>
-          <a:prstGeom prst="rect">
-            <a:avLst/>
-          </a:prstGeom>
-          <a:noFill/>
-          <a:extLst>
-            <a:ext uri="{909E8E84-426E-40DD-AFC4-6F175D3DCCD1}">
-              <a14:hiddenFill xmlns:a14="http://schemas.microsoft.com/office/drawing/2010/main">
-                <a:solidFill>
-                  <a:srgbClr val="FFFFFF"/>
-                </a:solidFill>
-              </a14:hiddenFill>
-            </a:ext>
-          </a:extLst>
-        </p:spPr>
-      </p:pic>
-    </p:spTree>
-    <p:extLst>
-      <p:ext uri="{BB962C8B-B14F-4D97-AF65-F5344CB8AC3E}">
-        <p14:creationId xmlns:p14="http://schemas.microsoft.com/office/powerpoint/2010/main" val="3927346277"/>
-      </p:ext>
-    </p:extLst>
-  </p:cSld>
-  <p:clrMapOvr>
-    <a:masterClrMapping/>
-  </p:clrMapOvr>
-  <p:transition spd="med">
-    <p:pull/>
-  </p:transition>
-  <p:timing>
-    <p:tnLst>
-      <p:par>
-        <p:cTn id="1" dur="indefinite" restart="never" nodeType="tmRoot">
-          <p:childTnLst>
-            <p:seq concurrent="1" nextAc="seek">
-              <p:cTn id="2" dur="indefinite" nodeType="mainSeq">
-                <p:childTnLst>
-                  <p:par>
-                    <p:cTn id="3" fill="hold">
-                      <p:stCondLst>
-                        <p:cond delay="indefinite"/>
-                      </p:stCondLst>
-                      <p:childTnLst>
-                        <p:par>
-                          <p:cTn id="4" fill="hold">
-                            <p:stCondLst>
-                              <p:cond delay="0"/>
-                            </p:stCondLst>
-                            <p:childTnLst>
-                              <p:par>
-                                <p:cTn id="5" presetID="2" presetClass="entr" presetSubtype="4" fill="hold" grpId="0" nodeType="clickEffect">
-                                  <p:stCondLst>
-                                    <p:cond delay="0"/>
-                                  </p:stCondLst>
-                                  <p:childTnLst>
-                                    <p:set>
-                                      <p:cBhvr>
-                                        <p:cTn id="6" dur="1" fill="hold">
-                                          <p:stCondLst>
-                                            <p:cond delay="0"/>
-                                          </p:stCondLst>
-                                        </p:cTn>
-                                        <p:tgtEl>
-                                          <p:spTgt spid="7">
-                                            <p:txEl>
-                                              <p:pRg st="0" end="0"/>
-                                            </p:txEl>
-                                          </p:spTgt>
-                                        </p:tgtEl>
-                                        <p:attrNameLst>
-                                          <p:attrName>style.visibility</p:attrName>
-                                        </p:attrNameLst>
-                                      </p:cBhvr>
-                                      <p:to>
-                                        <p:strVal val="visible"/>
-                                      </p:to>
-                                    </p:set>
-                                    <p:anim calcmode="lin" valueType="num">
-                                      <p:cBhvr additive="base">
-                                        <p:cTn id="7" dur="500" fill="hold"/>
-                                        <p:tgtEl>
-                                          <p:spTgt spid="7">
-                                            <p:txEl>
-                                              <p:pRg st="0" end="0"/>
-                                            </p:txEl>
-                                          </p:spTgt>
-                                        </p:tgtEl>
-                                        <p:attrNameLst>
-                                          <p:attrName>ppt_x</p:attrName>
-                                        </p:attrNameLst>
-                                      </p:cBhvr>
-                                      <p:tavLst>
-                                        <p:tav tm="0">
-                                          <p:val>
-                                            <p:strVal val="#ppt_x"/>
-                                          </p:val>
-                                        </p:tav>
-                                        <p:tav tm="100000">
-                                          <p:val>
-                                            <p:strVal val="#ppt_x"/>
-                                          </p:val>
-                                        </p:tav>
-                                      </p:tavLst>
-                                    </p:anim>
-                                    <p:anim calcmode="lin" valueType="num">
-                                      <p:cBhvr additive="base">
-                                        <p:cTn id="8" dur="500" fill="hold"/>
-                                        <p:tgtEl>
-                                          <p:spTgt spid="7">
-                                            <p:txEl>
-                                              <p:pRg st="0" end="0"/>
-                                            </p:txEl>
-                                          </p:spTgt>
-                                        </p:tgtEl>
-                                        <p:attrNameLst>
-                                          <p:attrName>ppt_y</p:attrName>
-                                        </p:attrNameLst>
-                                      </p:cBhvr>
-                                      <p:tavLst>
-                                        <p:tav tm="0">
-                                          <p:val>
-                                            <p:strVal val="1+#ppt_h/2"/>
-                                          </p:val>
-                                        </p:tav>
-                                        <p:tav tm="100000">
-                                          <p:val>
-                                            <p:strVal val="#ppt_y"/>
-                                          </p:val>
-                                        </p:tav>
-                                      </p:tavLst>
-                                    </p:anim>
-                                  </p:childTnLst>
-                                </p:cTn>
-                              </p:par>
-                            </p:childTnLst>
-                          </p:cTn>
-                        </p:par>
-                      </p:childTnLst>
-                    </p:cTn>
-                  </p:par>
-                  <p:par>
-                    <p:cTn id="9" fill="hold">
-                      <p:stCondLst>
-                        <p:cond delay="indefinite"/>
-                      </p:stCondLst>
-                      <p:childTnLst>
-                        <p:par>
-                          <p:cTn id="10" fill="hold">
-                            <p:stCondLst>
-                              <p:cond delay="0"/>
-                            </p:stCondLst>
-                            <p:childTnLst>
-                              <p:par>
-                                <p:cTn id="11" presetID="2" presetClass="entr" presetSubtype="4" fill="hold" grpId="0" nodeType="clickEffect">
-                                  <p:stCondLst>
-                                    <p:cond delay="0"/>
-                                  </p:stCondLst>
-                                  <p:childTnLst>
-                                    <p:set>
-                                      <p:cBhvr>
-                                        <p:cTn id="12" dur="1" fill="hold">
-                                          <p:stCondLst>
-                                            <p:cond delay="0"/>
-                                          </p:stCondLst>
-                                        </p:cTn>
-                                        <p:tgtEl>
-                                          <p:spTgt spid="7">
-                                            <p:txEl>
-                                              <p:pRg st="2" end="2"/>
-                                            </p:txEl>
-                                          </p:spTgt>
-                                        </p:tgtEl>
-                                        <p:attrNameLst>
-                                          <p:attrName>style.visibility</p:attrName>
-                                        </p:attrNameLst>
-                                      </p:cBhvr>
-                                      <p:to>
-                                        <p:strVal val="visible"/>
-                                      </p:to>
-                                    </p:set>
-                                    <p:anim calcmode="lin" valueType="num">
-                                      <p:cBhvr additive="base">
-                                        <p:cTn id="13" dur="500" fill="hold"/>
-                                        <p:tgtEl>
-                                          <p:spTgt spid="7">
-                                            <p:txEl>
-                                              <p:pRg st="2" end="2"/>
-                                            </p:txEl>
-                                          </p:spTgt>
-                                        </p:tgtEl>
-                                        <p:attrNameLst>
-                                          <p:attrName>ppt_x</p:attrName>
-                                        </p:attrNameLst>
-                                      </p:cBhvr>
-                                      <p:tavLst>
-                                        <p:tav tm="0">
-                                          <p:val>
-                                            <p:strVal val="#ppt_x"/>
-                                          </p:val>
-                                        </p:tav>
-                                        <p:tav tm="100000">
-                                          <p:val>
-                                            <p:strVal val="#ppt_x"/>
-                                          </p:val>
-                                        </p:tav>
-                                      </p:tavLst>
-                                    </p:anim>
-                                    <p:anim calcmode="lin" valueType="num">
-                                      <p:cBhvr additive="base">
-                                        <p:cTn id="14" dur="500" fill="hold"/>
-                                        <p:tgtEl>
-                                          <p:spTgt spid="7">
-                                            <p:txEl>
-                                              <p:pRg st="2" end="2"/>
-                                            </p:txEl>
-                                          </p:spTgt>
-                                        </p:tgtEl>
-                                        <p:attrNameLst>
-                                          <p:attrName>ppt_y</p:attrName>
-                                        </p:attrNameLst>
-                                      </p:cBhvr>
-                                      <p:tavLst>
-                                        <p:tav tm="0">
-                                          <p:val>
-                                            <p:strVal val="1+#ppt_h/2"/>
-                                          </p:val>
-                                        </p:tav>
-                                        <p:tav tm="100000">
-                                          <p:val>
-                                            <p:strVal val="#ppt_y"/>
-                                          </p:val>
-                                        </p:tav>
-                                      </p:tavLst>
-                                    </p:anim>
-                                  </p:childTnLst>
-                                </p:cTn>
-                              </p:par>
-                            </p:childTnLst>
-                          </p:cTn>
-                        </p:par>
-                      </p:childTnLst>
-                    </p:cTn>
-                  </p:par>
-                  <p:par>
-                    <p:cTn id="15" fill="hold">
-                      <p:stCondLst>
-                        <p:cond delay="indefinite"/>
-                      </p:stCondLst>
-                      <p:childTnLst>
-                        <p:par>
-                          <p:cTn id="16" fill="hold">
-                            <p:stCondLst>
-                              <p:cond delay="0"/>
-                            </p:stCondLst>
-                            <p:childTnLst>
-                              <p:par>
-                                <p:cTn id="17" presetID="2" presetClass="entr" presetSubtype="4" fill="hold" grpId="0" nodeType="clickEffect">
-                                  <p:stCondLst>
-                                    <p:cond delay="0"/>
-                                  </p:stCondLst>
-                                  <p:childTnLst>
-                                    <p:set>
-                                      <p:cBhvr>
-                                        <p:cTn id="18" dur="1" fill="hold">
-                                          <p:stCondLst>
-                                            <p:cond delay="0"/>
-                                          </p:stCondLst>
-                                        </p:cTn>
-                                        <p:tgtEl>
-                                          <p:spTgt spid="7">
-                                            <p:txEl>
-                                              <p:pRg st="3" end="3"/>
-                                            </p:txEl>
-                                          </p:spTgt>
-                                        </p:tgtEl>
-                                        <p:attrNameLst>
-                                          <p:attrName>style.visibility</p:attrName>
-                                        </p:attrNameLst>
-                                      </p:cBhvr>
-                                      <p:to>
-                                        <p:strVal val="visible"/>
-                                      </p:to>
-                                    </p:set>
-                                    <p:anim calcmode="lin" valueType="num">
-                                      <p:cBhvr additive="base">
-                                        <p:cTn id="19" dur="500" fill="hold"/>
-                                        <p:tgtEl>
-                                          <p:spTgt spid="7">
-                                            <p:txEl>
-                                              <p:pRg st="3" end="3"/>
-                                            </p:txEl>
-                                          </p:spTgt>
-                                        </p:tgtEl>
-                                        <p:attrNameLst>
-                                          <p:attrName>ppt_x</p:attrName>
-                                        </p:attrNameLst>
-                                      </p:cBhvr>
-                                      <p:tavLst>
-                                        <p:tav tm="0">
-                                          <p:val>
-                                            <p:strVal val="#ppt_x"/>
-                                          </p:val>
-                                        </p:tav>
-                                        <p:tav tm="100000">
-                                          <p:val>
-                                            <p:strVal val="#ppt_x"/>
-                                          </p:val>
-                                        </p:tav>
-                                      </p:tavLst>
-                                    </p:anim>
-                                    <p:anim calcmode="lin" valueType="num">
-                                      <p:cBhvr additive="base">
-                                        <p:cTn id="20" dur="500" fill="hold"/>
-                                        <p:tgtEl>
-                                          <p:spTgt spid="7">
-                                            <p:txEl>
-                                              <p:pRg st="3" end="3"/>
-                                            </p:txEl>
-                                          </p:spTgt>
-                                        </p:tgtEl>
-                                        <p:attrNameLst>
-                                          <p:attrName>ppt_y</p:attrName>
-                                        </p:attrNameLst>
-                                      </p:cBhvr>
-                                      <p:tavLst>
-                                        <p:tav tm="0">
-                                          <p:val>
-                                            <p:strVal val="1+#ppt_h/2"/>
-                                          </p:val>
-                                        </p:tav>
-                                        <p:tav tm="100000">
-                                          <p:val>
-                                            <p:strVal val="#ppt_y"/>
-                                          </p:val>
-                                        </p:tav>
-                                      </p:tavLst>
-                                    </p:anim>
-                                  </p:childTnLst>
-                                </p:cTn>
-                              </p:par>
-                            </p:childTnLst>
-                          </p:cTn>
-                        </p:par>
-                      </p:childTnLst>
-                    </p:cTn>
-                  </p:par>
-                </p:childTnLst>
-              </p:cTn>
-              <p:prevCondLst>
-                <p:cond evt="onPrev" delay="0">
-                  <p:tgtEl>
-                    <p:sldTgt/>
-                  </p:tgtEl>
-                </p:cond>
-              </p:prevCondLst>
-              <p:nextCondLst>
-                <p:cond evt="onNext" delay="0">
-                  <p:tgtEl>
-                    <p:sldTgt/>
-                  </p:tgtEl>
-                </p:cond>
-              </p:nextCondLst>
-            </p:seq>
-          </p:childTnLst>
-        </p:cTn>
-      </p:par>
-    </p:tnLst>
-    <p:bldLst>
-      <p:bldP spid="7" grpId="0" build="p"/>
-    </p:bldLst>
-  </p:timing>
-</p:sld>
-</file>
-
-<file path=ppt/slides/slide17.xml><?xml version="1.0" encoding="utf-8"?>
-<p:sld xmlns:a="http://schemas.openxmlformats.org/drawingml/2006/main" xmlns:r="http://schemas.openxmlformats.org/officeDocument/2006/relationships" xmlns:p="http://schemas.openxmlformats.org/presentationml/2006/main">
-  <p:cSld>
-    <p:spTree>
-      <p:nvGrpSpPr>
-        <p:cNvPr id="1" name=""/>
-        <p:cNvGrpSpPr/>
-        <p:nvPr/>
-      </p:nvGrpSpPr>
-      <p:grpSpPr>
-        <a:xfrm>
-          <a:off x="0" y="0"/>
-          <a:ext cx="0" cy="0"/>
-          <a:chOff x="0" y="0"/>
-          <a:chExt cx="0" cy="0"/>
-        </a:xfrm>
-      </p:grpSpPr>
-      <p:sp>
-        <p:nvSpPr>
-          <p:cNvPr id="6" name="Title 5"/>
-          <p:cNvSpPr>
-            <a:spLocks noGrp="1"/>
-          </p:cNvSpPr>
-          <p:nvPr>
-            <p:ph type="title"/>
-          </p:nvPr>
-        </p:nvSpPr>
-        <p:spPr/>
-        <p:txBody>
-          <a:bodyPr/>
-          <a:lstStyle/>
-          <a:p>
-            <a:r>
-              <a:rPr lang="en-US" dirty="0" smtClean="0"/>
-              <a:t>if – Python Example</a:t>
-            </a:r>
-            <a:endParaRPr lang="en-US" dirty="0"/>
-          </a:p>
-        </p:txBody>
-      </p:sp>
-      <p:sp>
-        <p:nvSpPr>
-          <p:cNvPr id="7" name="Content Placeholder 6"/>
-          <p:cNvSpPr>
-            <a:spLocks noGrp="1"/>
-          </p:cNvSpPr>
-          <p:nvPr>
-            <p:ph idx="1"/>
-          </p:nvPr>
-        </p:nvSpPr>
-        <p:spPr/>
-        <p:txBody>
-          <a:bodyPr>
-            <a:normAutofit/>
-          </a:bodyPr>
-          <a:lstStyle/>
-          <a:p>
-            <a:pPr marL="57150" indent="0">
-              <a:buNone/>
-            </a:pPr>
-            <a:r>
-              <a:rPr lang="en-US" sz="3600" dirty="0" smtClean="0">
-                <a:solidFill>
-                  <a:srgbClr val="000000"/>
-                </a:solidFill>
-                <a:latin typeface="Consolas" panose="020B0609020204030204" pitchFamily="49" charset="0"/>
-              </a:rPr>
-              <a:t>color </a:t>
-            </a:r>
-            <a:r>
-              <a:rPr lang="en-US" sz="3600" dirty="0">
-                <a:solidFill>
-                  <a:srgbClr val="000000"/>
-                </a:solidFill>
-                <a:latin typeface="Consolas" panose="020B0609020204030204" pitchFamily="49" charset="0"/>
-              </a:rPr>
-              <a:t>= input(</a:t>
-            </a:r>
-            <a:r>
-              <a:rPr lang="en-US" sz="3600" dirty="0">
-                <a:solidFill>
-                  <a:srgbClr val="A31515"/>
-                </a:solidFill>
-                <a:latin typeface="Consolas" panose="020B0609020204030204" pitchFamily="49" charset="0"/>
-              </a:rPr>
-              <a:t>"What is your </a:t>
-            </a:r>
-            <a:r>
-              <a:rPr lang="en-US" sz="3600" dirty="0" smtClean="0">
-                <a:solidFill>
-                  <a:srgbClr val="A31515"/>
-                </a:solidFill>
-                <a:latin typeface="Consolas" panose="020B0609020204030204" pitchFamily="49" charset="0"/>
-              </a:rPr>
-              <a:t>favorite color?"</a:t>
-            </a:r>
-            <a:r>
-              <a:rPr lang="en-US" sz="3600" dirty="0" smtClean="0">
-                <a:solidFill>
-                  <a:srgbClr val="000000"/>
-                </a:solidFill>
-                <a:latin typeface="Consolas" panose="020B0609020204030204" pitchFamily="49" charset="0"/>
-              </a:rPr>
-              <a:t>)</a:t>
-            </a:r>
-            <a:endParaRPr lang="en-US" sz="3600" dirty="0" smtClean="0">
-              <a:solidFill>
-                <a:srgbClr val="0000FF"/>
-              </a:solidFill>
-              <a:latin typeface="Consolas" panose="020B0609020204030204" pitchFamily="49" charset="0"/>
-            </a:endParaRPr>
-          </a:p>
-          <a:p>
-            <a:pPr marL="57150" indent="0">
-              <a:buNone/>
-            </a:pPr>
-            <a:endParaRPr lang="en-US" sz="3600" dirty="0" smtClean="0">
-              <a:solidFill>
-                <a:srgbClr val="0000FF"/>
-              </a:solidFill>
-              <a:latin typeface="Consolas" panose="020B0609020204030204" pitchFamily="49" charset="0"/>
-            </a:endParaRPr>
-          </a:p>
-          <a:p>
-            <a:pPr marL="57150" indent="0">
-              <a:buNone/>
-            </a:pPr>
-            <a:r>
-              <a:rPr lang="en-US" sz="3600" dirty="0" smtClean="0">
-                <a:solidFill>
-                  <a:srgbClr val="0000FF"/>
-                </a:solidFill>
-                <a:latin typeface="Consolas" panose="020B0609020204030204" pitchFamily="49" charset="0"/>
-              </a:rPr>
-              <a:t>if</a:t>
-            </a:r>
-            <a:r>
-              <a:rPr lang="en-US" sz="3600" dirty="0" smtClean="0">
-                <a:solidFill>
-                  <a:srgbClr val="000000"/>
-                </a:solidFill>
-                <a:latin typeface="Consolas" panose="020B0609020204030204" pitchFamily="49" charset="0"/>
-              </a:rPr>
-              <a:t> </a:t>
-            </a:r>
-            <a:r>
-              <a:rPr lang="en-US" sz="3600" dirty="0">
-                <a:solidFill>
-                  <a:srgbClr val="000000"/>
-                </a:solidFill>
-                <a:latin typeface="Consolas" panose="020B0609020204030204" pitchFamily="49" charset="0"/>
-              </a:rPr>
-              <a:t>color == </a:t>
-            </a:r>
-            <a:r>
-              <a:rPr lang="en-US" sz="3600" dirty="0">
-                <a:solidFill>
-                  <a:srgbClr val="A31515"/>
-                </a:solidFill>
-                <a:latin typeface="Consolas" panose="020B0609020204030204" pitchFamily="49" charset="0"/>
-              </a:rPr>
-              <a:t>"blue"</a:t>
-            </a:r>
-            <a:r>
-              <a:rPr lang="en-US" sz="3600" dirty="0">
-                <a:solidFill>
-                  <a:srgbClr val="000000"/>
-                </a:solidFill>
-                <a:latin typeface="Consolas" panose="020B0609020204030204" pitchFamily="49" charset="0"/>
-              </a:rPr>
-              <a:t>:</a:t>
-            </a:r>
-          </a:p>
-          <a:p>
-            <a:pPr marL="57150" indent="0">
-              <a:buNone/>
-            </a:pPr>
-            <a:r>
-              <a:rPr lang="en-US" sz="3600" dirty="0" smtClean="0">
-                <a:solidFill>
-                  <a:srgbClr val="000000"/>
-                </a:solidFill>
-                <a:latin typeface="Consolas" panose="020B0609020204030204" pitchFamily="49" charset="0"/>
-              </a:rPr>
-              <a:t>	print</a:t>
-            </a:r>
-            <a:r>
-              <a:rPr lang="en-US" sz="3600" dirty="0">
-                <a:solidFill>
-                  <a:srgbClr val="000000"/>
-                </a:solidFill>
-                <a:latin typeface="Consolas" panose="020B0609020204030204" pitchFamily="49" charset="0"/>
-              </a:rPr>
-              <a:t>(</a:t>
-            </a:r>
-            <a:r>
-              <a:rPr lang="en-US" sz="3600" dirty="0">
-                <a:solidFill>
-                  <a:srgbClr val="A31515"/>
-                </a:solidFill>
-                <a:latin typeface="Consolas" panose="020B0609020204030204" pitchFamily="49" charset="0"/>
-              </a:rPr>
-              <a:t>"That's my favorite too!"</a:t>
-            </a:r>
-            <a:r>
-              <a:rPr lang="en-US" sz="3600" dirty="0">
-                <a:solidFill>
-                  <a:srgbClr val="000000"/>
-                </a:solidFill>
-                <a:latin typeface="Consolas" panose="020B0609020204030204" pitchFamily="49" charset="0"/>
-              </a:rPr>
-              <a:t>)</a:t>
-            </a:r>
-          </a:p>
-          <a:p>
-            <a:pPr marL="57150" indent="0">
-              <a:buNone/>
-            </a:pPr>
-            <a:endParaRPr lang="en-US" sz="3600" dirty="0" smtClean="0"/>
-          </a:p>
-          <a:p>
-            <a:pPr marL="57150" indent="0">
-              <a:buNone/>
-            </a:pPr>
-            <a:endParaRPr lang="en-US" sz="3600" dirty="0"/>
-          </a:p>
-          <a:p>
-            <a:pPr marL="57150" indent="0" algn="ctr">
-              <a:buNone/>
-            </a:pPr>
-            <a:r>
-              <a:rPr lang="en-US" sz="4000" dirty="0" smtClean="0"/>
-              <a:t>What will this code do?</a:t>
-            </a:r>
-          </a:p>
-        </p:txBody>
-      </p:sp>
-    </p:spTree>
-    <p:extLst>
-      <p:ext uri="{BB962C8B-B14F-4D97-AF65-F5344CB8AC3E}">
-        <p14:creationId xmlns:p14="http://schemas.microsoft.com/office/powerpoint/2010/main" val="124400724"/>
-      </p:ext>
-    </p:extLst>
-  </p:cSld>
-  <p:clrMapOvr>
-    <a:masterClrMapping/>
-  </p:clrMapOvr>
-  <p:transition spd="med">
-    <p:pull/>
-  </p:transition>
-  <p:timing>
-    <p:tnLst>
-      <p:par>
-        <p:cTn id="1" dur="indefinite" restart="never" nodeType="tmRoot"/>
-      </p:par>
-    </p:tnLst>
-  </p:timing>
-</p:sld>
-</file>
-
-<file path=ppt/slides/slide18.xml><?xml version="1.0" encoding="utf-8"?>
-<p:sld xmlns:a="http://schemas.openxmlformats.org/drawingml/2006/main" xmlns:r="http://schemas.openxmlformats.org/officeDocument/2006/relationships" xmlns:p="http://schemas.openxmlformats.org/presentationml/2006/main">
-  <p:cSld>
-    <p:spTree>
-      <p:nvGrpSpPr>
-        <p:cNvPr id="1" name=""/>
-        <p:cNvGrpSpPr/>
-        <p:nvPr/>
-      </p:nvGrpSpPr>
-      <p:grpSpPr>
-        <a:xfrm>
-          <a:off x="0" y="0"/>
-          <a:ext cx="0" cy="0"/>
-          <a:chOff x="0" y="0"/>
-          <a:chExt cx="0" cy="0"/>
-        </a:xfrm>
-      </p:grpSpPr>
-      <p:pic>
-        <p:nvPicPr>
-          <p:cNvPr id="3" name="zoom_0">
-            <a:hlinkClick r:id="" action="ppaction://media"/>
-          </p:cNvPr>
-          <p:cNvPicPr>
-            <a:picLocks noChangeAspect="1"/>
-          </p:cNvPicPr>
-          <p:nvPr>
-            <a:videoFile r:link="rId1"/>
-            <p:extLst>
-              <p:ext uri="{DAA4B4D4-6D71-4841-9C94-3DE7FCFB9230}">
-                <p14:media xmlns:p14="http://schemas.microsoft.com/office/powerpoint/2010/main" r:embed="rId2">
-                  <p14:trim st="7461" end="5492"/>
-                </p14:media>
-              </p:ext>
-            </p:extLst>
-          </p:nvPr>
-        </p:nvPicPr>
-        <p:blipFill>
-          <a:blip r:embed="rId4"/>
-          <a:stretch>
-            <a:fillRect/>
-          </a:stretch>
-        </p:blipFill>
-        <p:spPr>
-          <a:xfrm>
-            <a:off x="0" y="0"/>
-            <a:ext cx="12192000" cy="6858000"/>
-          </a:xfrm>
-          <a:prstGeom prst="rect">
-            <a:avLst/>
-          </a:prstGeom>
-        </p:spPr>
-      </p:pic>
-    </p:spTree>
-    <p:extLst>
-      <p:ext uri="{BB962C8B-B14F-4D97-AF65-F5344CB8AC3E}">
-        <p14:creationId xmlns:p14="http://schemas.microsoft.com/office/powerpoint/2010/main" val="3820579153"/>
-      </p:ext>
-    </p:extLst>
-  </p:cSld>
-  <p:clrMapOvr>
-    <a:masterClrMapping/>
-  </p:clrMapOvr>
-  <p:transition>
-    <p:fade/>
-  </p:transition>
-  <p:timing>
-    <p:tnLst>
-      <p:par>
-        <p:cTn id="1" dur="indefinite" restart="never" nodeType="tmRoot">
-          <p:childTnLst>
-            <p:seq concurrent="1" nextAc="seek">
-              <p:cTn id="2" dur="indefinite" nodeType="mainSeq">
-                <p:childTnLst>
-                  <p:par>
-                    <p:cTn id="3" fill="hold">
-                      <p:stCondLst>
-                        <p:cond delay="indefinite"/>
-                        <p:cond evt="onBegin" delay="0">
-                          <p:tn val="2"/>
-                        </p:cond>
-                      </p:stCondLst>
-                      <p:childTnLst>
-                        <p:par>
-                          <p:cTn id="4" fill="hold">
-                            <p:stCondLst>
-                              <p:cond delay="0"/>
-                            </p:stCondLst>
-                            <p:childTnLst>
-                              <p:par>
-                                <p:cTn id="5" presetID="1" presetClass="mediacall" presetSubtype="0" fill="hold" nodeType="afterEffect">
-                                  <p:stCondLst>
-                                    <p:cond delay="0"/>
-                                  </p:stCondLst>
-                                  <p:childTnLst>
-                                    <p:cmd type="call" cmd="playFrom(0.0)">
-                                      <p:cBhvr>
-                                        <p:cTn id="6" dur="19607" fill="hold"/>
-                                        <p:tgtEl>
-                                          <p:spTgt spid="3"/>
-                                        </p:tgtEl>
-                                      </p:cBhvr>
-                                    </p:cmd>
-                                  </p:childTnLst>
-                                </p:cTn>
-                              </p:par>
-                            </p:childTnLst>
-                          </p:cTn>
-                        </p:par>
-                      </p:childTnLst>
-                    </p:cTn>
-                  </p:par>
-                </p:childTnLst>
-              </p:cTn>
-              <p:prevCondLst>
-                <p:cond evt="onPrev" delay="0">
-                  <p:tgtEl>
-                    <p:sldTgt/>
-                  </p:tgtEl>
-                </p:cond>
-              </p:prevCondLst>
-              <p:nextCondLst>
-                <p:cond evt="onNext" delay="0">
-                  <p:tgtEl>
-                    <p:sldTgt/>
-                  </p:tgtEl>
-                </p:cond>
-              </p:nextCondLst>
-            </p:seq>
-            <p:video fullScrn="1">
-              <p:cMediaNode vol="80000">
-                <p:cTn id="7" fill="hold" display="0">
-                  <p:stCondLst>
-                    <p:cond delay="indefinite"/>
-                  </p:stCondLst>
-                </p:cTn>
-                <p:tgtEl>
-                  <p:spTgt spid="3"/>
-                </p:tgtEl>
-              </p:cMediaNode>
-            </p:video>
-            <p:seq concurrent="1" nextAc="seek">
-              <p:cTn id="8" restart="whenNotActive" fill="hold" evtFilter="cancelBubble" nodeType="interactiveSeq">
-                <p:stCondLst>
-                  <p:cond evt="onClick" delay="0">
-                    <p:tgtEl>
-                      <p:spTgt spid="3"/>
-                    </p:tgtEl>
-                  </p:cond>
-                </p:stCondLst>
-                <p:endSync evt="end" delay="0">
-                  <p:rtn val="all"/>
-                </p:endSync>
-                <p:childTnLst>
-                  <p:par>
-                    <p:cTn id="9" fill="hold">
-                      <p:stCondLst>
-                        <p:cond delay="0"/>
-                      </p:stCondLst>
-                      <p:childTnLst>
-                        <p:par>
-                          <p:cTn id="10" fill="hold">
-                            <p:stCondLst>
-                              <p:cond delay="0"/>
-                            </p:stCondLst>
-                            <p:childTnLst>
-                              <p:par>
-                                <p:cTn id="11" presetID="2" presetClass="mediacall" presetSubtype="0" fill="hold" nodeType="clickEffect">
-                                  <p:stCondLst>
-                                    <p:cond delay="0"/>
-                                  </p:stCondLst>
-                                  <p:childTnLst>
-                                    <p:cmd type="call" cmd="togglePause">
-                                      <p:cBhvr>
-                                        <p:cTn id="12" dur="1" fill="hold"/>
-                                        <p:tgtEl>
-                                          <p:spTgt spid="3"/>
-                                        </p:tgtEl>
-                                      </p:cBhvr>
-                                    </p:cmd>
-                                  </p:childTnLst>
-                                </p:cTn>
-                              </p:par>
-                            </p:childTnLst>
-                          </p:cTn>
-                        </p:par>
-                      </p:childTnLst>
-                    </p:cTn>
-                  </p:par>
-                </p:childTnLst>
-              </p:cTn>
-              <p:nextCondLst>
-                <p:cond evt="onClick" delay="0">
-                  <p:tgtEl>
-                    <p:spTgt spid="3"/>
-                  </p:tgtEl>
-                </p:cond>
-              </p:nextCondLst>
-            </p:seq>
-          </p:childTnLst>
-        </p:cTn>
-      </p:par>
-    </p:tnLst>
-  </p:timing>
-</p:sld>
-</file>
-
-<file path=ppt/slides/slide19.xml><?xml version="1.0" encoding="utf-8"?>
-<p:sld xmlns:a="http://schemas.openxmlformats.org/drawingml/2006/main" xmlns:r="http://schemas.openxmlformats.org/officeDocument/2006/relationships" xmlns:p="http://schemas.openxmlformats.org/presentationml/2006/main">
-  <p:cSld>
-    <p:spTree>
-      <p:nvGrpSpPr>
-        <p:cNvPr id="1" name=""/>
-        <p:cNvGrpSpPr/>
-        <p:nvPr/>
-      </p:nvGrpSpPr>
-      <p:grpSpPr>
-        <a:xfrm>
-          <a:off x="0" y="0"/>
-          <a:ext cx="0" cy="0"/>
-          <a:chOff x="0" y="0"/>
-          <a:chExt cx="0" cy="0"/>
-        </a:xfrm>
-      </p:grpSpPr>
-      <p:sp>
-        <p:nvSpPr>
-          <p:cNvPr id="6" name="Title 5"/>
-          <p:cNvSpPr>
-            <a:spLocks noGrp="1"/>
-          </p:cNvSpPr>
-          <p:nvPr>
-            <p:ph type="title"/>
-          </p:nvPr>
-        </p:nvSpPr>
-        <p:spPr/>
-        <p:txBody>
-          <a:bodyPr/>
-          <a:lstStyle/>
-          <a:p>
-            <a:r>
-              <a:rPr lang="en-US" dirty="0" smtClean="0"/>
-              <a:t>if – Python Example</a:t>
-            </a:r>
-            <a:endParaRPr lang="en-US" dirty="0"/>
-          </a:p>
-        </p:txBody>
-      </p:sp>
-      <p:sp>
-        <p:nvSpPr>
-          <p:cNvPr id="7" name="Content Placeholder 6"/>
-          <p:cNvSpPr>
-            <a:spLocks noGrp="1"/>
-          </p:cNvSpPr>
-          <p:nvPr>
-            <p:ph idx="1"/>
-          </p:nvPr>
-        </p:nvSpPr>
-        <p:spPr/>
-        <p:txBody>
-          <a:bodyPr>
-            <a:normAutofit lnSpcReduction="10000"/>
-          </a:bodyPr>
-          <a:lstStyle/>
-          <a:p>
-            <a:pPr marL="57150" indent="0">
-              <a:buNone/>
-            </a:pPr>
-            <a:r>
-              <a:rPr lang="en-US" sz="3600" dirty="0">
-                <a:solidFill>
-                  <a:srgbClr val="000000"/>
-                </a:solidFill>
-                <a:latin typeface="Consolas" panose="020B0609020204030204" pitchFamily="49" charset="0"/>
-              </a:rPr>
-              <a:t>color = input(</a:t>
-            </a:r>
-            <a:r>
-              <a:rPr lang="en-US" sz="3600" dirty="0">
-                <a:solidFill>
-                  <a:srgbClr val="A31515"/>
-                </a:solidFill>
-                <a:latin typeface="Consolas" panose="020B0609020204030204" pitchFamily="49" charset="0"/>
-              </a:rPr>
-              <a:t>"What is your favorite color</a:t>
-            </a:r>
-            <a:r>
-              <a:rPr lang="en-US" sz="3600" dirty="0" smtClean="0">
-                <a:solidFill>
-                  <a:srgbClr val="A31515"/>
-                </a:solidFill>
-                <a:latin typeface="Consolas" panose="020B0609020204030204" pitchFamily="49" charset="0"/>
-              </a:rPr>
-              <a:t>?"</a:t>
-            </a:r>
-            <a:r>
-              <a:rPr lang="en-US" sz="3600" dirty="0" smtClean="0">
-                <a:solidFill>
-                  <a:srgbClr val="000000"/>
-                </a:solidFill>
-                <a:latin typeface="Consolas" panose="020B0609020204030204" pitchFamily="49" charset="0"/>
-              </a:rPr>
-              <a:t>)</a:t>
-            </a:r>
-            <a:endParaRPr lang="en-US" sz="3600" dirty="0" smtClean="0">
-              <a:solidFill>
-                <a:srgbClr val="0000FF"/>
-              </a:solidFill>
-              <a:latin typeface="Consolas" panose="020B0609020204030204" pitchFamily="49" charset="0"/>
-            </a:endParaRPr>
-          </a:p>
-          <a:p>
-            <a:r>
-              <a:rPr lang="en-US" sz="3600" dirty="0" smtClean="0"/>
-              <a:t>The color the user enters </a:t>
-            </a:r>
-            <a:r>
-              <a:rPr lang="en-US" sz="3600" dirty="0"/>
-              <a:t>is stored in </a:t>
-            </a:r>
-            <a:r>
-              <a:rPr lang="en-US" sz="3600" dirty="0" smtClean="0">
-                <a:solidFill>
-                  <a:srgbClr val="000000"/>
-                </a:solidFill>
-                <a:latin typeface="Consolas" panose="020B0609020204030204" pitchFamily="49" charset="0"/>
-              </a:rPr>
-              <a:t>color</a:t>
-            </a:r>
-            <a:endParaRPr lang="en-US" sz="3600" dirty="0" smtClean="0">
-              <a:solidFill>
-                <a:srgbClr val="0000FF"/>
-              </a:solidFill>
-              <a:latin typeface="Consolas" panose="020B0609020204030204" pitchFamily="49" charset="0"/>
-            </a:endParaRPr>
-          </a:p>
-          <a:p>
-            <a:pPr marL="57150" indent="0">
-              <a:buNone/>
-            </a:pPr>
-            <a:endParaRPr lang="en-US" sz="3600" dirty="0" smtClean="0">
-              <a:solidFill>
-                <a:srgbClr val="0000FF"/>
-              </a:solidFill>
-              <a:latin typeface="Consolas" panose="020B0609020204030204" pitchFamily="49" charset="0"/>
-            </a:endParaRPr>
-          </a:p>
-          <a:p>
-            <a:pPr marL="57150" indent="0">
-              <a:buNone/>
-            </a:pPr>
-            <a:r>
-              <a:rPr lang="en-US" sz="3600" dirty="0" smtClean="0">
-                <a:solidFill>
-                  <a:srgbClr val="0000FF"/>
-                </a:solidFill>
-                <a:latin typeface="Consolas" panose="020B0609020204030204" pitchFamily="49" charset="0"/>
-              </a:rPr>
-              <a:t>if</a:t>
-            </a:r>
-            <a:r>
-              <a:rPr lang="en-US" sz="3600" dirty="0" smtClean="0">
-                <a:solidFill>
-                  <a:srgbClr val="000000"/>
-                </a:solidFill>
-                <a:latin typeface="Consolas" panose="020B0609020204030204" pitchFamily="49" charset="0"/>
-              </a:rPr>
-              <a:t> </a:t>
-            </a:r>
-            <a:r>
-              <a:rPr lang="en-US" sz="3600" dirty="0">
-                <a:solidFill>
-                  <a:srgbClr val="000000"/>
-                </a:solidFill>
-                <a:latin typeface="Consolas" panose="020B0609020204030204" pitchFamily="49" charset="0"/>
-              </a:rPr>
-              <a:t>color == </a:t>
-            </a:r>
-            <a:r>
-              <a:rPr lang="en-US" sz="3600" dirty="0">
-                <a:solidFill>
-                  <a:srgbClr val="A31515"/>
-                </a:solidFill>
-                <a:latin typeface="Consolas" panose="020B0609020204030204" pitchFamily="49" charset="0"/>
-              </a:rPr>
-              <a:t>"blue</a:t>
-            </a:r>
-            <a:r>
-              <a:rPr lang="en-US" sz="3600" dirty="0" smtClean="0">
-                <a:solidFill>
-                  <a:srgbClr val="A31515"/>
-                </a:solidFill>
-                <a:latin typeface="Consolas" panose="020B0609020204030204" pitchFamily="49" charset="0"/>
-              </a:rPr>
-              <a:t>"</a:t>
-            </a:r>
-            <a:r>
-              <a:rPr lang="en-US" sz="3600" dirty="0" smtClean="0">
-                <a:solidFill>
-                  <a:srgbClr val="000000"/>
-                </a:solidFill>
-                <a:latin typeface="Consolas" panose="020B0609020204030204" pitchFamily="49" charset="0"/>
-              </a:rPr>
-              <a:t>:</a:t>
-            </a:r>
-          </a:p>
-          <a:p>
-            <a:r>
-              <a:rPr lang="en-US" sz="3600" dirty="0" smtClean="0"/>
-              <a:t>The program checks </a:t>
-            </a:r>
-            <a:r>
-              <a:rPr lang="en-US" sz="3600" i="1" dirty="0" smtClean="0"/>
-              <a:t>if</a:t>
-            </a:r>
-            <a:r>
-              <a:rPr lang="en-US" sz="3600" dirty="0" smtClean="0"/>
-              <a:t> the color is </a:t>
-            </a:r>
-            <a:r>
-              <a:rPr lang="en-US" sz="3600" dirty="0" smtClean="0">
-                <a:solidFill>
-                  <a:schemeClr val="accent1"/>
-                </a:solidFill>
-              </a:rPr>
-              <a:t>blue</a:t>
-            </a:r>
-          </a:p>
-          <a:p>
-            <a:endParaRPr lang="en-US" sz="3600" dirty="0">
-              <a:solidFill>
-                <a:srgbClr val="000000"/>
-              </a:solidFill>
-              <a:latin typeface="Consolas" panose="020B0609020204030204" pitchFamily="49" charset="0"/>
-            </a:endParaRPr>
-          </a:p>
-          <a:p>
-            <a:pPr marL="57150" indent="0">
-              <a:buNone/>
-            </a:pPr>
-            <a:r>
-              <a:rPr lang="en-US" sz="3600" dirty="0" smtClean="0">
-                <a:solidFill>
-                  <a:srgbClr val="000000"/>
-                </a:solidFill>
-                <a:latin typeface="Consolas" panose="020B0609020204030204" pitchFamily="49" charset="0"/>
-              </a:rPr>
-              <a:t>	print</a:t>
-            </a:r>
-            <a:r>
-              <a:rPr lang="en-US" sz="3600" dirty="0">
-                <a:solidFill>
-                  <a:srgbClr val="000000"/>
-                </a:solidFill>
-                <a:latin typeface="Consolas" panose="020B0609020204030204" pitchFamily="49" charset="0"/>
-              </a:rPr>
-              <a:t>(</a:t>
-            </a:r>
-            <a:r>
-              <a:rPr lang="en-US" sz="3600" dirty="0">
-                <a:solidFill>
-                  <a:srgbClr val="A31515"/>
-                </a:solidFill>
-                <a:latin typeface="Consolas" panose="020B0609020204030204" pitchFamily="49" charset="0"/>
-              </a:rPr>
-              <a:t>"That's my favorite too</a:t>
-            </a:r>
-            <a:r>
-              <a:rPr lang="en-US" sz="3600" dirty="0" smtClean="0">
-                <a:solidFill>
-                  <a:srgbClr val="A31515"/>
-                </a:solidFill>
-                <a:latin typeface="Consolas" panose="020B0609020204030204" pitchFamily="49" charset="0"/>
-              </a:rPr>
-              <a:t>!"</a:t>
-            </a:r>
-            <a:r>
-              <a:rPr lang="en-US" sz="3600" dirty="0" smtClean="0">
-                <a:solidFill>
-                  <a:srgbClr val="000000"/>
-                </a:solidFill>
-                <a:latin typeface="Consolas" panose="020B0609020204030204" pitchFamily="49" charset="0"/>
-              </a:rPr>
-              <a:t>)</a:t>
-            </a:r>
-          </a:p>
-          <a:p>
-            <a:pPr lvl="3"/>
-            <a:r>
-              <a:rPr lang="en-US" sz="2600" dirty="0" smtClean="0"/>
-              <a:t>If it is, the program prints out the message</a:t>
-            </a:r>
-            <a:endParaRPr lang="en-US" sz="2600" dirty="0">
-              <a:solidFill>
-                <a:srgbClr val="000000"/>
-              </a:solidFill>
-              <a:latin typeface="Consolas" panose="020B0609020204030204" pitchFamily="49" charset="0"/>
-            </a:endParaRPr>
-          </a:p>
-          <a:p>
-            <a:pPr marL="57150" indent="0">
-              <a:buNone/>
-            </a:pPr>
-            <a:endParaRPr lang="en-US" sz="3600" dirty="0">
-              <a:solidFill>
-                <a:srgbClr val="000000"/>
-              </a:solidFill>
-              <a:latin typeface="Consolas" panose="020B0609020204030204" pitchFamily="49" charset="0"/>
-            </a:endParaRPr>
-          </a:p>
-        </p:txBody>
-      </p:sp>
-    </p:spTree>
-    <p:extLst>
-      <p:ext uri="{BB962C8B-B14F-4D97-AF65-F5344CB8AC3E}">
-        <p14:creationId xmlns:p14="http://schemas.microsoft.com/office/powerpoint/2010/main" val="1670044888"/>
-      </p:ext>
-    </p:extLst>
-  </p:cSld>
-  <p:clrMapOvr>
-    <a:masterClrMapping/>
-  </p:clrMapOvr>
-  <p:transition spd="med">
-    <p:pull/>
-  </p:transition>
-  <p:timing>
-    <p:tnLst>
-      <p:par>
-        <p:cTn id="1" dur="indefinite" restart="never" nodeType="tmRoot">
-          <p:childTnLst>
-            <p:seq concurrent="1" nextAc="seek">
-              <p:cTn id="2" dur="indefinite" nodeType="mainSeq">
-                <p:childTnLst>
-                  <p:par>
-                    <p:cTn id="3" fill="hold">
-                      <p:stCondLst>
-                        <p:cond delay="indefinite"/>
-                      </p:stCondLst>
-                      <p:childTnLst>
-                        <p:par>
-                          <p:cTn id="4" fill="hold">
-                            <p:stCondLst>
-                              <p:cond delay="0"/>
-                            </p:stCondLst>
-                            <p:childTnLst>
-                              <p:par>
-                                <p:cTn id="5" presetID="42" presetClass="entr" presetSubtype="0" fill="hold" grpId="0" nodeType="clickEffect">
-                                  <p:stCondLst>
-                                    <p:cond delay="0"/>
-                                  </p:stCondLst>
-                                  <p:childTnLst>
-                                    <p:set>
-                                      <p:cBhvr>
-                                        <p:cTn id="6" dur="1" fill="hold">
-                                          <p:stCondLst>
-                                            <p:cond delay="0"/>
-                                          </p:stCondLst>
-                                        </p:cTn>
-                                        <p:tgtEl>
-                                          <p:spTgt spid="7">
-                                            <p:txEl>
-                                              <p:pRg st="0" end="0"/>
-                                            </p:txEl>
-                                          </p:spTgt>
-                                        </p:tgtEl>
-                                        <p:attrNameLst>
-                                          <p:attrName>style.visibility</p:attrName>
-                                        </p:attrNameLst>
-                                      </p:cBhvr>
-                                      <p:to>
-                                        <p:strVal val="visible"/>
-                                      </p:to>
-                                    </p:set>
-                                    <p:animEffect transition="in" filter="fade">
-                                      <p:cBhvr>
-                                        <p:cTn id="7" dur="500"/>
-                                        <p:tgtEl>
-                                          <p:spTgt spid="7">
-                                            <p:txEl>
-                                              <p:pRg st="0" end="0"/>
-                                            </p:txEl>
-                                          </p:spTgt>
-                                        </p:tgtEl>
-                                      </p:cBhvr>
-                                    </p:animEffect>
-                                    <p:anim calcmode="lin" valueType="num">
-                                      <p:cBhvr>
-                                        <p:cTn id="8" dur="500" fill="hold"/>
-                                        <p:tgtEl>
-                                          <p:spTgt spid="7">
-                                            <p:txEl>
-                                              <p:pRg st="0" end="0"/>
-                                            </p:txEl>
-                                          </p:spTgt>
-                                        </p:tgtEl>
-                                        <p:attrNameLst>
-                                          <p:attrName>ppt_x</p:attrName>
-                                        </p:attrNameLst>
-                                      </p:cBhvr>
-                                      <p:tavLst>
-                                        <p:tav tm="0">
-                                          <p:val>
-                                            <p:strVal val="#ppt_x"/>
-                                          </p:val>
-                                        </p:tav>
-                                        <p:tav tm="100000">
-                                          <p:val>
-                                            <p:strVal val="#ppt_x"/>
-                                          </p:val>
-                                        </p:tav>
-                                      </p:tavLst>
-                                    </p:anim>
-                                    <p:anim calcmode="lin" valueType="num">
-                                      <p:cBhvr>
-                                        <p:cTn id="9" dur="500" fill="hold"/>
-                                        <p:tgtEl>
-                                          <p:spTgt spid="7">
-                                            <p:txEl>
-                                              <p:pRg st="0" end="0"/>
-                                            </p:txEl>
-                                          </p:spTgt>
-                                        </p:tgtEl>
-                                        <p:attrNameLst>
-                                          <p:attrName>ppt_y</p:attrName>
-                                        </p:attrNameLst>
-                                      </p:cBhvr>
-                                      <p:tavLst>
-                                        <p:tav tm="0">
-                                          <p:val>
-                                            <p:strVal val="#ppt_y+.1"/>
-                                          </p:val>
-                                        </p:tav>
-                                        <p:tav tm="100000">
-                                          <p:val>
-                                            <p:strVal val="#ppt_y"/>
-                                          </p:val>
-                                        </p:tav>
-                                      </p:tavLst>
-                                    </p:anim>
-                                  </p:childTnLst>
-                                </p:cTn>
-                              </p:par>
-                            </p:childTnLst>
-                          </p:cTn>
-                        </p:par>
-                      </p:childTnLst>
-                    </p:cTn>
-                  </p:par>
-                  <p:par>
-                    <p:cTn id="10" fill="hold">
-                      <p:stCondLst>
-                        <p:cond delay="indefinite"/>
-                      </p:stCondLst>
-                      <p:childTnLst>
-                        <p:par>
-                          <p:cTn id="11" fill="hold">
-                            <p:stCondLst>
-                              <p:cond delay="0"/>
-                            </p:stCondLst>
-                            <p:childTnLst>
-                              <p:par>
-                                <p:cTn id="12" presetID="42" presetClass="entr" presetSubtype="0" fill="hold" grpId="0" nodeType="clickEffect">
-                                  <p:stCondLst>
-                                    <p:cond delay="0"/>
-                                  </p:stCondLst>
-                                  <p:childTnLst>
-                                    <p:set>
-                                      <p:cBhvr>
-                                        <p:cTn id="13" dur="1" fill="hold">
-                                          <p:stCondLst>
-                                            <p:cond delay="0"/>
-                                          </p:stCondLst>
-                                        </p:cTn>
-                                        <p:tgtEl>
-                                          <p:spTgt spid="7">
-                                            <p:txEl>
-                                              <p:pRg st="1" end="1"/>
-                                            </p:txEl>
-                                          </p:spTgt>
-                                        </p:tgtEl>
-                                        <p:attrNameLst>
-                                          <p:attrName>style.visibility</p:attrName>
-                                        </p:attrNameLst>
-                                      </p:cBhvr>
-                                      <p:to>
-                                        <p:strVal val="visible"/>
-                                      </p:to>
-                                    </p:set>
-                                    <p:animEffect transition="in" filter="fade">
-                                      <p:cBhvr>
-                                        <p:cTn id="14" dur="500"/>
-                                        <p:tgtEl>
-                                          <p:spTgt spid="7">
-                                            <p:txEl>
-                                              <p:pRg st="1" end="1"/>
-                                            </p:txEl>
-                                          </p:spTgt>
-                                        </p:tgtEl>
-                                      </p:cBhvr>
-                                    </p:animEffect>
-                                    <p:anim calcmode="lin" valueType="num">
-                                      <p:cBhvr>
-                                        <p:cTn id="15" dur="500" fill="hold"/>
-                                        <p:tgtEl>
-                                          <p:spTgt spid="7">
-                                            <p:txEl>
-                                              <p:pRg st="1" end="1"/>
-                                            </p:txEl>
-                                          </p:spTgt>
-                                        </p:tgtEl>
-                                        <p:attrNameLst>
-                                          <p:attrName>ppt_x</p:attrName>
-                                        </p:attrNameLst>
-                                      </p:cBhvr>
-                                      <p:tavLst>
-                                        <p:tav tm="0">
-                                          <p:val>
-                                            <p:strVal val="#ppt_x"/>
-                                          </p:val>
-                                        </p:tav>
-                                        <p:tav tm="100000">
-                                          <p:val>
-                                            <p:strVal val="#ppt_x"/>
-                                          </p:val>
-                                        </p:tav>
-                                      </p:tavLst>
-                                    </p:anim>
-                                    <p:anim calcmode="lin" valueType="num">
-                                      <p:cBhvr>
-                                        <p:cTn id="16" dur="500" fill="hold"/>
-                                        <p:tgtEl>
-                                          <p:spTgt spid="7">
-                                            <p:txEl>
-                                              <p:pRg st="1" end="1"/>
-                                            </p:txEl>
-                                          </p:spTgt>
-                                        </p:tgtEl>
-                                        <p:attrNameLst>
-                                          <p:attrName>ppt_y</p:attrName>
-                                        </p:attrNameLst>
-                                      </p:cBhvr>
-                                      <p:tavLst>
-                                        <p:tav tm="0">
-                                          <p:val>
-                                            <p:strVal val="#ppt_y+.1"/>
-                                          </p:val>
-                                        </p:tav>
-                                        <p:tav tm="100000">
-                                          <p:val>
-                                            <p:strVal val="#ppt_y"/>
-                                          </p:val>
-                                        </p:tav>
-                                      </p:tavLst>
-                                    </p:anim>
-                                  </p:childTnLst>
-                                </p:cTn>
-                              </p:par>
-                            </p:childTnLst>
-                          </p:cTn>
-                        </p:par>
-                      </p:childTnLst>
-                    </p:cTn>
-                  </p:par>
-                  <p:par>
-                    <p:cTn id="17" fill="hold">
-                      <p:stCondLst>
-                        <p:cond delay="indefinite"/>
-                      </p:stCondLst>
-                      <p:childTnLst>
-                        <p:par>
-                          <p:cTn id="18" fill="hold">
-                            <p:stCondLst>
-                              <p:cond delay="0"/>
-                            </p:stCondLst>
-                            <p:childTnLst>
-                              <p:par>
-                                <p:cTn id="19" presetID="42" presetClass="entr" presetSubtype="0" fill="hold" grpId="0" nodeType="clickEffect">
-                                  <p:stCondLst>
-                                    <p:cond delay="0"/>
-                                  </p:stCondLst>
-                                  <p:childTnLst>
-                                    <p:set>
-                                      <p:cBhvr>
-                                        <p:cTn id="20" dur="1" fill="hold">
-                                          <p:stCondLst>
-                                            <p:cond delay="0"/>
-                                          </p:stCondLst>
-                                        </p:cTn>
-                                        <p:tgtEl>
-                                          <p:spTgt spid="7">
-                                            <p:txEl>
-                                              <p:pRg st="3" end="3"/>
-                                            </p:txEl>
-                                          </p:spTgt>
-                                        </p:tgtEl>
-                                        <p:attrNameLst>
-                                          <p:attrName>style.visibility</p:attrName>
-                                        </p:attrNameLst>
-                                      </p:cBhvr>
-                                      <p:to>
-                                        <p:strVal val="visible"/>
-                                      </p:to>
-                                    </p:set>
-                                    <p:animEffect transition="in" filter="fade">
-                                      <p:cBhvr>
-                                        <p:cTn id="21" dur="500"/>
-                                        <p:tgtEl>
-                                          <p:spTgt spid="7">
-                                            <p:txEl>
-                                              <p:pRg st="3" end="3"/>
-                                            </p:txEl>
-                                          </p:spTgt>
-                                        </p:tgtEl>
-                                      </p:cBhvr>
-                                    </p:animEffect>
-                                    <p:anim calcmode="lin" valueType="num">
-                                      <p:cBhvr>
-                                        <p:cTn id="22" dur="500" fill="hold"/>
-                                        <p:tgtEl>
-                                          <p:spTgt spid="7">
-                                            <p:txEl>
-                                              <p:pRg st="3" end="3"/>
-                                            </p:txEl>
-                                          </p:spTgt>
-                                        </p:tgtEl>
-                                        <p:attrNameLst>
-                                          <p:attrName>ppt_x</p:attrName>
-                                        </p:attrNameLst>
-                                      </p:cBhvr>
-                                      <p:tavLst>
-                                        <p:tav tm="0">
-                                          <p:val>
-                                            <p:strVal val="#ppt_x"/>
-                                          </p:val>
-                                        </p:tav>
-                                        <p:tav tm="100000">
-                                          <p:val>
-                                            <p:strVal val="#ppt_x"/>
-                                          </p:val>
-                                        </p:tav>
-                                      </p:tavLst>
-                                    </p:anim>
-                                    <p:anim calcmode="lin" valueType="num">
-                                      <p:cBhvr>
-                                        <p:cTn id="23" dur="500" fill="hold"/>
-                                        <p:tgtEl>
-                                          <p:spTgt spid="7">
-                                            <p:txEl>
-                                              <p:pRg st="3" end="3"/>
-                                            </p:txEl>
-                                          </p:spTgt>
-                                        </p:tgtEl>
-                                        <p:attrNameLst>
-                                          <p:attrName>ppt_y</p:attrName>
-                                        </p:attrNameLst>
-                                      </p:cBhvr>
-                                      <p:tavLst>
-                                        <p:tav tm="0">
-                                          <p:val>
-                                            <p:strVal val="#ppt_y+.1"/>
-                                          </p:val>
-                                        </p:tav>
-                                        <p:tav tm="100000">
-                                          <p:val>
-                                            <p:strVal val="#ppt_y"/>
-                                          </p:val>
-                                        </p:tav>
-                                      </p:tavLst>
-                                    </p:anim>
-                                  </p:childTnLst>
-                                </p:cTn>
-                              </p:par>
-                            </p:childTnLst>
-                          </p:cTn>
-                        </p:par>
-                      </p:childTnLst>
-                    </p:cTn>
-                  </p:par>
-                  <p:par>
-                    <p:cTn id="24" fill="hold">
-                      <p:stCondLst>
-                        <p:cond delay="indefinite"/>
-                      </p:stCondLst>
-                      <p:childTnLst>
-                        <p:par>
-                          <p:cTn id="25" fill="hold">
-                            <p:stCondLst>
-                              <p:cond delay="0"/>
-                            </p:stCondLst>
-                            <p:childTnLst>
-                              <p:par>
-                                <p:cTn id="26" presetID="42" presetClass="entr" presetSubtype="0" fill="hold" grpId="0" nodeType="clickEffect">
-                                  <p:stCondLst>
-                                    <p:cond delay="0"/>
-                                  </p:stCondLst>
-                                  <p:childTnLst>
-                                    <p:set>
-                                      <p:cBhvr>
-                                        <p:cTn id="27" dur="1" fill="hold">
-                                          <p:stCondLst>
-                                            <p:cond delay="0"/>
-                                          </p:stCondLst>
-                                        </p:cTn>
-                                        <p:tgtEl>
-                                          <p:spTgt spid="7">
-                                            <p:txEl>
-                                              <p:pRg st="4" end="4"/>
-                                            </p:txEl>
-                                          </p:spTgt>
-                                        </p:tgtEl>
-                                        <p:attrNameLst>
-                                          <p:attrName>style.visibility</p:attrName>
-                                        </p:attrNameLst>
-                                      </p:cBhvr>
-                                      <p:to>
-                                        <p:strVal val="visible"/>
-                                      </p:to>
-                                    </p:set>
-                                    <p:animEffect transition="in" filter="fade">
-                                      <p:cBhvr>
-                                        <p:cTn id="28" dur="500"/>
-                                        <p:tgtEl>
-                                          <p:spTgt spid="7">
-                                            <p:txEl>
-                                              <p:pRg st="4" end="4"/>
-                                            </p:txEl>
-                                          </p:spTgt>
-                                        </p:tgtEl>
-                                      </p:cBhvr>
-                                    </p:animEffect>
-                                    <p:anim calcmode="lin" valueType="num">
-                                      <p:cBhvr>
-                                        <p:cTn id="29" dur="500" fill="hold"/>
-                                        <p:tgtEl>
-                                          <p:spTgt spid="7">
-                                            <p:txEl>
-                                              <p:pRg st="4" end="4"/>
-                                            </p:txEl>
-                                          </p:spTgt>
-                                        </p:tgtEl>
-                                        <p:attrNameLst>
-                                          <p:attrName>ppt_x</p:attrName>
-                                        </p:attrNameLst>
-                                      </p:cBhvr>
-                                      <p:tavLst>
-                                        <p:tav tm="0">
-                                          <p:val>
-                                            <p:strVal val="#ppt_x"/>
-                                          </p:val>
-                                        </p:tav>
-                                        <p:tav tm="100000">
-                                          <p:val>
-                                            <p:strVal val="#ppt_x"/>
-                                          </p:val>
-                                        </p:tav>
-                                      </p:tavLst>
-                                    </p:anim>
-                                    <p:anim calcmode="lin" valueType="num">
-                                      <p:cBhvr>
-                                        <p:cTn id="30" dur="500" fill="hold"/>
-                                        <p:tgtEl>
-                                          <p:spTgt spid="7">
-                                            <p:txEl>
-                                              <p:pRg st="4" end="4"/>
-                                            </p:txEl>
-                                          </p:spTgt>
-                                        </p:tgtEl>
-                                        <p:attrNameLst>
-                                          <p:attrName>ppt_y</p:attrName>
-                                        </p:attrNameLst>
-                                      </p:cBhvr>
-                                      <p:tavLst>
-                                        <p:tav tm="0">
-                                          <p:val>
-                                            <p:strVal val="#ppt_y+.1"/>
-                                          </p:val>
-                                        </p:tav>
-                                        <p:tav tm="100000">
-                                          <p:val>
-                                            <p:strVal val="#ppt_y"/>
-                                          </p:val>
-                                        </p:tav>
-                                      </p:tavLst>
-                                    </p:anim>
-                                  </p:childTnLst>
-                                </p:cTn>
-                              </p:par>
-                            </p:childTnLst>
-                          </p:cTn>
-                        </p:par>
-                      </p:childTnLst>
-                    </p:cTn>
-                  </p:par>
-                  <p:par>
-                    <p:cTn id="31" fill="hold">
-                      <p:stCondLst>
-                        <p:cond delay="indefinite"/>
-                      </p:stCondLst>
-                      <p:childTnLst>
-                        <p:par>
-                          <p:cTn id="32" fill="hold">
-                            <p:stCondLst>
-                              <p:cond delay="0"/>
-                            </p:stCondLst>
-                            <p:childTnLst>
-                              <p:par>
-                                <p:cTn id="33" presetID="42" presetClass="entr" presetSubtype="0" fill="hold" grpId="0" nodeType="clickEffect">
-                                  <p:stCondLst>
-                                    <p:cond delay="0"/>
-                                  </p:stCondLst>
-                                  <p:childTnLst>
-                                    <p:set>
-                                      <p:cBhvr>
-                                        <p:cTn id="34" dur="1" fill="hold">
-                                          <p:stCondLst>
-                                            <p:cond delay="0"/>
-                                          </p:stCondLst>
-                                        </p:cTn>
-                                        <p:tgtEl>
-                                          <p:spTgt spid="7">
-                                            <p:txEl>
-                                              <p:pRg st="6" end="6"/>
-                                            </p:txEl>
-                                          </p:spTgt>
-                                        </p:tgtEl>
-                                        <p:attrNameLst>
-                                          <p:attrName>style.visibility</p:attrName>
-                                        </p:attrNameLst>
-                                      </p:cBhvr>
-                                      <p:to>
-                                        <p:strVal val="visible"/>
-                                      </p:to>
-                                    </p:set>
-                                    <p:animEffect transition="in" filter="fade">
-                                      <p:cBhvr>
-                                        <p:cTn id="35" dur="500"/>
-                                        <p:tgtEl>
-                                          <p:spTgt spid="7">
-                                            <p:txEl>
-                                              <p:pRg st="6" end="6"/>
-                                            </p:txEl>
-                                          </p:spTgt>
-                                        </p:tgtEl>
-                                      </p:cBhvr>
-                                    </p:animEffect>
-                                    <p:anim calcmode="lin" valueType="num">
-                                      <p:cBhvr>
-                                        <p:cTn id="36" dur="500" fill="hold"/>
-                                        <p:tgtEl>
-                                          <p:spTgt spid="7">
-                                            <p:txEl>
-                                              <p:pRg st="6" end="6"/>
-                                            </p:txEl>
-                                          </p:spTgt>
-                                        </p:tgtEl>
-                                        <p:attrNameLst>
-                                          <p:attrName>ppt_x</p:attrName>
-                                        </p:attrNameLst>
-                                      </p:cBhvr>
-                                      <p:tavLst>
-                                        <p:tav tm="0">
-                                          <p:val>
-                                            <p:strVal val="#ppt_x"/>
-                                          </p:val>
-                                        </p:tav>
-                                        <p:tav tm="100000">
-                                          <p:val>
-                                            <p:strVal val="#ppt_x"/>
-                                          </p:val>
-                                        </p:tav>
-                                      </p:tavLst>
-                                    </p:anim>
-                                    <p:anim calcmode="lin" valueType="num">
-                                      <p:cBhvr>
-                                        <p:cTn id="37" dur="500" fill="hold"/>
-                                        <p:tgtEl>
-                                          <p:spTgt spid="7">
-                                            <p:txEl>
-                                              <p:pRg st="6" end="6"/>
-                                            </p:txEl>
-                                          </p:spTgt>
-                                        </p:tgtEl>
-                                        <p:attrNameLst>
-                                          <p:attrName>ppt_y</p:attrName>
-                                        </p:attrNameLst>
-                                      </p:cBhvr>
-                                      <p:tavLst>
-                                        <p:tav tm="0">
-                                          <p:val>
-                                            <p:strVal val="#ppt_y+.1"/>
-                                          </p:val>
-                                        </p:tav>
-                                        <p:tav tm="100000">
-                                          <p:val>
-                                            <p:strVal val="#ppt_y"/>
-                                          </p:val>
-                                        </p:tav>
-                                      </p:tavLst>
-                                    </p:anim>
-                                  </p:childTnLst>
-                                </p:cTn>
-                              </p:par>
-                            </p:childTnLst>
-                          </p:cTn>
-                        </p:par>
-                      </p:childTnLst>
-                    </p:cTn>
-                  </p:par>
-                  <p:par>
-                    <p:cTn id="38" fill="hold">
-                      <p:stCondLst>
-                        <p:cond delay="indefinite"/>
-                      </p:stCondLst>
-                      <p:childTnLst>
-                        <p:par>
-                          <p:cTn id="39" fill="hold">
-                            <p:stCondLst>
-                              <p:cond delay="0"/>
-                            </p:stCondLst>
-                            <p:childTnLst>
-                              <p:par>
-                                <p:cTn id="40" presetID="42" presetClass="entr" presetSubtype="0" fill="hold" grpId="0" nodeType="clickEffect">
-                                  <p:stCondLst>
-                                    <p:cond delay="0"/>
-                                  </p:stCondLst>
-                                  <p:childTnLst>
-                                    <p:set>
-                                      <p:cBhvr>
-                                        <p:cTn id="41" dur="1" fill="hold">
-                                          <p:stCondLst>
-                                            <p:cond delay="0"/>
-                                          </p:stCondLst>
-                                        </p:cTn>
-                                        <p:tgtEl>
-                                          <p:spTgt spid="7">
-                                            <p:txEl>
-                                              <p:pRg st="7" end="7"/>
-                                            </p:txEl>
-                                          </p:spTgt>
-                                        </p:tgtEl>
-                                        <p:attrNameLst>
-                                          <p:attrName>style.visibility</p:attrName>
-                                        </p:attrNameLst>
-                                      </p:cBhvr>
-                                      <p:to>
-                                        <p:strVal val="visible"/>
-                                      </p:to>
-                                    </p:set>
-                                    <p:animEffect transition="in" filter="fade">
-                                      <p:cBhvr>
-                                        <p:cTn id="42" dur="500"/>
-                                        <p:tgtEl>
-                                          <p:spTgt spid="7">
-                                            <p:txEl>
-                                              <p:pRg st="7" end="7"/>
-                                            </p:txEl>
-                                          </p:spTgt>
-                                        </p:tgtEl>
-                                      </p:cBhvr>
-                                    </p:animEffect>
-                                    <p:anim calcmode="lin" valueType="num">
-                                      <p:cBhvr>
-                                        <p:cTn id="43" dur="500" fill="hold"/>
-                                        <p:tgtEl>
-                                          <p:spTgt spid="7">
-                                            <p:txEl>
-                                              <p:pRg st="7" end="7"/>
-                                            </p:txEl>
-                                          </p:spTgt>
-                                        </p:tgtEl>
-                                        <p:attrNameLst>
-                                          <p:attrName>ppt_x</p:attrName>
-                                        </p:attrNameLst>
-                                      </p:cBhvr>
-                                      <p:tavLst>
-                                        <p:tav tm="0">
-                                          <p:val>
-                                            <p:strVal val="#ppt_x"/>
-                                          </p:val>
-                                        </p:tav>
-                                        <p:tav tm="100000">
-                                          <p:val>
-                                            <p:strVal val="#ppt_x"/>
-                                          </p:val>
-                                        </p:tav>
-                                      </p:tavLst>
-                                    </p:anim>
-                                    <p:anim calcmode="lin" valueType="num">
-                                      <p:cBhvr>
-                                        <p:cTn id="44" dur="500" fill="hold"/>
-                                        <p:tgtEl>
-                                          <p:spTgt spid="7">
-                                            <p:txEl>
-                                              <p:pRg st="7" end="7"/>
-                                            </p:txEl>
-                                          </p:spTgt>
-                                        </p:tgtEl>
-                                        <p:attrNameLst>
-                                          <p:attrName>ppt_y</p:attrName>
-                                        </p:attrNameLst>
-                                      </p:cBhvr>
-                                      <p:tavLst>
-                                        <p:tav tm="0">
-                                          <p:val>
-                                            <p:strVal val="#ppt_y+.1"/>
-                                          </p:val>
-                                        </p:tav>
-                                        <p:tav tm="100000">
-                                          <p:val>
-                                            <p:strVal val="#ppt_y"/>
-                                          </p:val>
-                                        </p:tav>
-                                      </p:tavLst>
-                                    </p:anim>
-                                  </p:childTnLst>
-                                </p:cTn>
-                              </p:par>
-                            </p:childTnLst>
-                          </p:cTn>
-                        </p:par>
-                      </p:childTnLst>
-                    </p:cTn>
-                  </p:par>
-                </p:childTnLst>
-              </p:cTn>
-              <p:prevCondLst>
-                <p:cond evt="onPrev" delay="0">
-                  <p:tgtEl>
-                    <p:sldTgt/>
-                  </p:tgtEl>
-                </p:cond>
-              </p:prevCondLst>
-              <p:nextCondLst>
-                <p:cond evt="onNext" delay="0">
-                  <p:tgtEl>
-                    <p:sldTgt/>
-                  </p:tgtEl>
-                </p:cond>
-              </p:nextCondLst>
-            </p:seq>
-          </p:childTnLst>
-        </p:cTn>
-      </p:par>
-    </p:tnLst>
-    <p:bldLst>
-      <p:bldP spid="7" grpId="0" uiExpand="1" build="p"/>
-    </p:bldLst>
-  </p:timing>
-</p:sld>
-</file>
-
-<file path=ppt/slides/slide2.xml><?xml version="1.0" encoding="utf-8"?>
-<p:sld xmlns:a="http://schemas.openxmlformats.org/drawingml/2006/main" xmlns:r="http://schemas.openxmlformats.org/officeDocument/2006/relationships" xmlns:p="http://schemas.openxmlformats.org/presentationml/2006/main">
-  <p:cSld>
-    <p:spTree>
-      <p:nvGrpSpPr>
-        <p:cNvPr id="1" name=""/>
-        <p:cNvGrpSpPr/>
-        <p:nvPr/>
-      </p:nvGrpSpPr>
-      <p:grpSpPr>
-        <a:xfrm>
-          <a:off x="0" y="0"/>
-          <a:ext cx="0" cy="0"/>
-          <a:chOff x="0" y="0"/>
-          <a:chExt cx="0" cy="0"/>
-        </a:xfrm>
-      </p:grpSpPr>
-      <p:sp>
-        <p:nvSpPr>
-          <p:cNvPr id="6" name="Title 5"/>
-          <p:cNvSpPr>
-            <a:spLocks noGrp="1"/>
-          </p:cNvSpPr>
-          <p:nvPr>
-            <p:ph type="title"/>
-          </p:nvPr>
-        </p:nvSpPr>
-        <p:spPr/>
-        <p:txBody>
-          <a:bodyPr/>
-          <a:lstStyle/>
-          <a:p>
-            <a:r>
-              <a:rPr lang="en-US" dirty="0" smtClean="0"/>
-              <a:t>Agenda</a:t>
-            </a:r>
-            <a:endParaRPr lang="en-US" dirty="0"/>
-          </a:p>
-        </p:txBody>
-      </p:sp>
-      <p:sp>
-        <p:nvSpPr>
-          <p:cNvPr id="7" name="Text Placeholder 6"/>
-          <p:cNvSpPr>
-            <a:spLocks noGrp="1"/>
-          </p:cNvSpPr>
-          <p:nvPr>
-            <p:ph type="body" idx="1"/>
-          </p:nvPr>
-        </p:nvSpPr>
-        <p:spPr/>
-        <p:txBody>
-          <a:bodyPr>
-            <a:normAutofit/>
-          </a:bodyPr>
-          <a:lstStyle/>
-          <a:p>
-            <a:r>
-              <a:rPr lang="en-US" dirty="0" smtClean="0"/>
-              <a:t>Introduction </a:t>
-            </a:r>
-            <a:r>
-              <a:rPr lang="en-US" dirty="0" smtClean="0"/>
-              <a:t>to Python</a:t>
-            </a:r>
-          </a:p>
-          <a:p>
-            <a:r>
-              <a:rPr lang="en-US" dirty="0" smtClean="0"/>
-              <a:t>Kahoot Quiz</a:t>
-            </a:r>
-          </a:p>
-          <a:p>
-            <a:r>
-              <a:rPr lang="en-US" dirty="0" smtClean="0"/>
-              <a:t>Python Activities</a:t>
-            </a:r>
-          </a:p>
-        </p:txBody>
-      </p:sp>
-      <p:sp>
-        <p:nvSpPr>
-          <p:cNvPr id="4" name="Date Placeholder 3"/>
-          <p:cNvSpPr>
-            <a:spLocks noGrp="1"/>
-          </p:cNvSpPr>
-          <p:nvPr>
-            <p:ph type="dt" sz="half" idx="10"/>
-          </p:nvPr>
-        </p:nvSpPr>
-        <p:spPr/>
-        <p:txBody>
-          <a:bodyPr/>
-          <a:lstStyle/>
-          <a:p>
-            <a:fld id="{1C2D31DE-C454-491C-B5C3-F097855E3DF7}" type="datetime4">
-              <a:rPr lang="en-US" smtClean="0"/>
-              <a:pPr/>
-              <a:t>April 6, 2020</a:t>
-            </a:fld>
-            <a:endParaRPr lang="en-US" dirty="0"/>
-          </a:p>
-        </p:txBody>
-      </p:sp>
-    </p:spTree>
-    <p:extLst>
-      <p:ext uri="{BB962C8B-B14F-4D97-AF65-F5344CB8AC3E}">
-        <p14:creationId xmlns:p14="http://schemas.microsoft.com/office/powerpoint/2010/main" val="2629401558"/>
-      </p:ext>
-    </p:extLst>
-  </p:cSld>
-  <p:clrMapOvr>
-    <a:masterClrMapping/>
-  </p:clrMapOvr>
-  <mc:AlternateContent xmlns:mc="http://schemas.openxmlformats.org/markup-compatibility/2006" xmlns:p14="http://schemas.microsoft.com/office/powerpoint/2010/main">
-    <mc:Choice Requires="p14">
-      <p:transition spd="slow" p14:dur="1600">
-        <p:blinds dir="vert"/>
-      </p:transition>
-    </mc:Choice>
-    <mc:Fallback xmlns="">
-      <p:transition spd="slow">
-        <p:blinds dir="vert"/>
-      </p:transition>
-    </mc:Fallback>
-  </mc:AlternateContent>
-  <p:timing>
-    <p:tnLst>
-      <p:par>
-        <p:cTn id="1" dur="indefinite" restart="never" nodeType="tmRoot"/>
-      </p:par>
-    </p:tnLst>
-  </p:timing>
-</p:sld>
-</file>
-
-<file path=ppt/slides/slide20.xml><?xml version="1.0" encoding="utf-8"?>
-<p:sld xmlns:a="http://schemas.openxmlformats.org/drawingml/2006/main" xmlns:r="http://schemas.openxmlformats.org/officeDocument/2006/relationships" xmlns:p="http://schemas.openxmlformats.org/presentationml/2006/main">
-  <p:cSld>
-    <p:spTree>
-      <p:nvGrpSpPr>
-        <p:cNvPr id="1" name=""/>
-        <p:cNvGrpSpPr/>
-        <p:nvPr/>
-      </p:nvGrpSpPr>
-      <p:grpSpPr>
-        <a:xfrm>
-          <a:off x="0" y="0"/>
-          <a:ext cx="0" cy="0"/>
-          <a:chOff x="0" y="0"/>
-          <a:chExt cx="0" cy="0"/>
-        </a:xfrm>
-      </p:grpSpPr>
-      <p:sp>
-        <p:nvSpPr>
-          <p:cNvPr id="2" name="Title 1"/>
-          <p:cNvSpPr>
-            <a:spLocks noGrp="1"/>
-          </p:cNvSpPr>
-          <p:nvPr>
-            <p:ph type="title"/>
-          </p:nvPr>
-        </p:nvSpPr>
-        <p:spPr/>
-        <p:txBody>
-          <a:bodyPr/>
-          <a:lstStyle/>
-          <a:p>
-            <a:r>
-              <a:rPr lang="en-US" dirty="0" smtClean="0"/>
-              <a:t>Setting variables vs. checking values</a:t>
-            </a:r>
-            <a:endParaRPr lang="en-US" dirty="0"/>
-          </a:p>
-        </p:txBody>
-      </p:sp>
-      <p:sp>
-        <p:nvSpPr>
-          <p:cNvPr id="4" name="Text Placeholder 3"/>
-          <p:cNvSpPr>
-            <a:spLocks noGrp="1"/>
-          </p:cNvSpPr>
-          <p:nvPr>
-            <p:ph type="body" idx="1"/>
-          </p:nvPr>
-        </p:nvSpPr>
-        <p:spPr/>
-        <p:txBody>
-          <a:bodyPr/>
-          <a:lstStyle/>
-          <a:p>
-            <a:r>
-              <a:rPr lang="en-US" dirty="0" smtClean="0"/>
-              <a:t>Setting variables (</a:t>
-            </a:r>
-            <a:r>
-              <a:rPr lang="en-US" dirty="0" smtClean="0">
-                <a:solidFill>
-                  <a:schemeClr val="accent1">
-                    <a:lumMod val="20000"/>
-                    <a:lumOff val="80000"/>
-                  </a:schemeClr>
-                </a:solidFill>
-                <a:latin typeface="Consolas" panose="020B0609020204030204" pitchFamily="49" charset="0"/>
-              </a:rPr>
-              <a:t>=</a:t>
-            </a:r>
-            <a:r>
-              <a:rPr lang="en-US" dirty="0" smtClean="0"/>
-              <a:t>)</a:t>
-            </a:r>
-            <a:endParaRPr lang="en-US" dirty="0"/>
-          </a:p>
-        </p:txBody>
-      </p:sp>
-      <p:sp>
-        <p:nvSpPr>
-          <p:cNvPr id="5" name="Content Placeholder 4"/>
-          <p:cNvSpPr>
-            <a:spLocks noGrp="1"/>
-          </p:cNvSpPr>
-          <p:nvPr>
-            <p:ph sz="half" idx="2"/>
-          </p:nvPr>
-        </p:nvSpPr>
-        <p:spPr/>
-        <p:txBody>
-          <a:bodyPr/>
-          <a:lstStyle/>
-          <a:p>
-            <a:r>
-              <a:rPr lang="en-US" sz="2800" i="1" dirty="0" smtClean="0"/>
-              <a:t>Single</a:t>
-            </a:r>
-            <a:r>
-              <a:rPr lang="en-US" sz="2800" dirty="0" smtClean="0"/>
-              <a:t> equals sign</a:t>
-            </a:r>
-          </a:p>
-          <a:p>
-            <a:r>
-              <a:rPr lang="en-US" sz="2800" dirty="0" smtClean="0"/>
-              <a:t>Stores some information in a variable</a:t>
-            </a:r>
-          </a:p>
-          <a:p>
-            <a:r>
-              <a:rPr lang="en-US" sz="2800" dirty="0" smtClean="0"/>
-              <a:t>Used for user </a:t>
-            </a:r>
-            <a:r>
-              <a:rPr lang="en-US" sz="2800" dirty="0" smtClean="0">
-                <a:solidFill>
-                  <a:srgbClr val="000000"/>
-                </a:solidFill>
-                <a:latin typeface="Consolas" panose="020B0609020204030204" pitchFamily="49" charset="0"/>
-              </a:rPr>
-              <a:t>input</a:t>
-            </a:r>
-          </a:p>
-          <a:p>
-            <a:endParaRPr lang="en-US" dirty="0"/>
-          </a:p>
-          <a:p>
-            <a:endParaRPr lang="en-US" dirty="0" smtClean="0"/>
-          </a:p>
-          <a:p>
-            <a:pPr marL="57150" indent="0">
-              <a:buNone/>
-            </a:pPr>
-            <a:r>
-              <a:rPr lang="en-US" sz="3200" dirty="0" smtClean="0">
-                <a:solidFill>
-                  <a:srgbClr val="000000"/>
-                </a:solidFill>
-                <a:latin typeface="Consolas" panose="020B0609020204030204" pitchFamily="49" charset="0"/>
-              </a:rPr>
-              <a:t>movie </a:t>
-            </a:r>
-            <a:r>
-              <a:rPr lang="en-US" sz="3200" dirty="0">
-                <a:solidFill>
-                  <a:srgbClr val="000000"/>
-                </a:solidFill>
-                <a:latin typeface="Consolas" panose="020B0609020204030204" pitchFamily="49" charset="0"/>
-              </a:rPr>
-              <a:t>= </a:t>
-            </a:r>
-            <a:r>
-              <a:rPr lang="en-US" sz="3200" dirty="0">
-                <a:solidFill>
-                  <a:srgbClr val="A31515"/>
-                </a:solidFill>
-                <a:latin typeface="Consolas" panose="020B0609020204030204" pitchFamily="49" charset="0"/>
-              </a:rPr>
-              <a:t>"</a:t>
-            </a:r>
-            <a:r>
-              <a:rPr lang="en-US" sz="3200" dirty="0" smtClean="0">
-                <a:solidFill>
-                  <a:srgbClr val="A31515"/>
-                </a:solidFill>
-                <a:latin typeface="Consolas" panose="020B0609020204030204" pitchFamily="49" charset="0"/>
-              </a:rPr>
-              <a:t>Minions"</a:t>
-            </a:r>
-          </a:p>
-          <a:p>
-            <a:r>
-              <a:rPr lang="en-US" sz="2800" dirty="0" smtClean="0"/>
-              <a:t>Sets the </a:t>
-            </a:r>
-            <a:r>
-              <a:rPr lang="en-US" sz="2800" dirty="0" smtClean="0">
-                <a:solidFill>
-                  <a:srgbClr val="000000"/>
-                </a:solidFill>
-                <a:latin typeface="Consolas" panose="020B0609020204030204" pitchFamily="49" charset="0"/>
-              </a:rPr>
-              <a:t>movie</a:t>
-            </a:r>
-            <a:r>
-              <a:rPr lang="en-US" sz="2800" dirty="0" smtClean="0"/>
-              <a:t> variable to “Minions”</a:t>
-            </a:r>
-            <a:endParaRPr lang="en-US" sz="2800" dirty="0">
-              <a:solidFill>
-                <a:srgbClr val="000000"/>
-              </a:solidFill>
-              <a:latin typeface="Consolas" panose="020B0609020204030204" pitchFamily="49" charset="0"/>
-            </a:endParaRPr>
-          </a:p>
-          <a:p>
-            <a:pPr marL="57150" indent="0">
-              <a:buNone/>
-            </a:pPr>
-            <a:endParaRPr lang="en-US" sz="3200" dirty="0">
-              <a:solidFill>
-                <a:srgbClr val="000000"/>
-              </a:solidFill>
-              <a:latin typeface="Consolas" panose="020B0609020204030204" pitchFamily="49" charset="0"/>
-            </a:endParaRPr>
-          </a:p>
-          <a:p>
-            <a:pPr marL="57150" indent="0">
-              <a:buNone/>
-            </a:pPr>
-            <a:endParaRPr lang="en-US" dirty="0"/>
-          </a:p>
-        </p:txBody>
-      </p:sp>
-      <p:sp>
-        <p:nvSpPr>
-          <p:cNvPr id="6" name="Text Placeholder 5"/>
-          <p:cNvSpPr>
-            <a:spLocks noGrp="1"/>
-          </p:cNvSpPr>
-          <p:nvPr>
-            <p:ph type="body" sz="quarter" idx="3"/>
-          </p:nvPr>
-        </p:nvSpPr>
-        <p:spPr/>
-        <p:txBody>
-          <a:bodyPr/>
-          <a:lstStyle/>
-          <a:p>
-            <a:r>
-              <a:rPr lang="en-US" dirty="0" smtClean="0"/>
-              <a:t>Checking values (</a:t>
-            </a:r>
-            <a:r>
-              <a:rPr lang="en-US" dirty="0" smtClean="0">
-                <a:solidFill>
-                  <a:schemeClr val="accent1">
-                    <a:lumMod val="20000"/>
-                    <a:lumOff val="80000"/>
-                  </a:schemeClr>
-                </a:solidFill>
-                <a:latin typeface="Consolas" panose="020B0609020204030204" pitchFamily="49" charset="0"/>
-              </a:rPr>
-              <a:t>==</a:t>
-            </a:r>
-            <a:r>
-              <a:rPr lang="en-US" dirty="0" smtClean="0"/>
-              <a:t>)</a:t>
-            </a:r>
-            <a:endParaRPr lang="en-US" dirty="0"/>
-          </a:p>
-        </p:txBody>
-      </p:sp>
-      <p:sp>
-        <p:nvSpPr>
-          <p:cNvPr id="7" name="Content Placeholder 6"/>
-          <p:cNvSpPr>
-            <a:spLocks noGrp="1"/>
-          </p:cNvSpPr>
-          <p:nvPr>
-            <p:ph sz="quarter" idx="4"/>
-          </p:nvPr>
-        </p:nvSpPr>
-        <p:spPr/>
-        <p:txBody>
-          <a:bodyPr>
-            <a:normAutofit/>
-          </a:bodyPr>
-          <a:lstStyle/>
-          <a:p>
-            <a:r>
-              <a:rPr lang="en-US" sz="2800" i="1" dirty="0" smtClean="0"/>
-              <a:t>Double</a:t>
-            </a:r>
-            <a:r>
-              <a:rPr lang="en-US" sz="2800" dirty="0" smtClean="0"/>
-              <a:t> equals sign</a:t>
-            </a:r>
-          </a:p>
-          <a:p>
-            <a:r>
-              <a:rPr lang="en-US" sz="2800" dirty="0" smtClean="0"/>
-              <a:t>Compares a variable to another value</a:t>
-            </a:r>
-          </a:p>
-          <a:p>
-            <a:r>
-              <a:rPr lang="en-US" sz="2800" dirty="0" smtClean="0"/>
-              <a:t>Used in </a:t>
-            </a:r>
-            <a:r>
-              <a:rPr lang="en-US" sz="2800" dirty="0" smtClean="0">
-                <a:solidFill>
-                  <a:srgbClr val="000000"/>
-                </a:solidFill>
-                <a:latin typeface="Consolas" panose="020B0609020204030204" pitchFamily="49" charset="0"/>
-              </a:rPr>
-              <a:t>if</a:t>
-            </a:r>
-            <a:r>
-              <a:rPr lang="en-US" sz="2800" dirty="0" smtClean="0"/>
-              <a:t> statements</a:t>
-            </a:r>
-          </a:p>
-          <a:p>
-            <a:pPr marL="57150" indent="0">
-              <a:buNone/>
-            </a:pPr>
-            <a:endParaRPr lang="en-US" dirty="0" smtClean="0"/>
-          </a:p>
-          <a:p>
-            <a:pPr marL="57150" indent="0">
-              <a:buNone/>
-            </a:pPr>
-            <a:endParaRPr lang="en-US" dirty="0"/>
-          </a:p>
-          <a:p>
-            <a:pPr marL="57150" indent="0">
-              <a:buNone/>
-            </a:pPr>
-            <a:r>
-              <a:rPr lang="en-US" sz="3200" dirty="0" smtClean="0">
-                <a:solidFill>
-                  <a:srgbClr val="0000FF"/>
-                </a:solidFill>
-                <a:latin typeface="Consolas" panose="020B0609020204030204" pitchFamily="49" charset="0"/>
-              </a:rPr>
-              <a:t>if</a:t>
-            </a:r>
-            <a:r>
-              <a:rPr lang="en-US" sz="3200" dirty="0" smtClean="0">
-                <a:solidFill>
-                  <a:srgbClr val="000000"/>
-                </a:solidFill>
-                <a:latin typeface="Consolas" panose="020B0609020204030204" pitchFamily="49" charset="0"/>
-              </a:rPr>
-              <a:t> movie </a:t>
-            </a:r>
-            <a:r>
-              <a:rPr lang="en-US" sz="3200" dirty="0">
-                <a:solidFill>
-                  <a:srgbClr val="000000"/>
-                </a:solidFill>
-                <a:latin typeface="Consolas" panose="020B0609020204030204" pitchFamily="49" charset="0"/>
-              </a:rPr>
-              <a:t>== </a:t>
-            </a:r>
-            <a:r>
-              <a:rPr lang="en-US" sz="3200" dirty="0">
-                <a:solidFill>
-                  <a:srgbClr val="A31515"/>
-                </a:solidFill>
-                <a:latin typeface="Consolas" panose="020B0609020204030204" pitchFamily="49" charset="0"/>
-              </a:rPr>
-              <a:t>"Minions"</a:t>
-            </a:r>
-            <a:r>
-              <a:rPr lang="en-US" sz="3200" dirty="0">
-                <a:solidFill>
-                  <a:srgbClr val="000000"/>
-                </a:solidFill>
-                <a:latin typeface="Consolas" panose="020B0609020204030204" pitchFamily="49" charset="0"/>
-              </a:rPr>
-              <a:t>:</a:t>
-            </a:r>
-          </a:p>
-          <a:p>
-            <a:r>
-              <a:rPr lang="en-US" sz="2800" dirty="0" smtClean="0"/>
-              <a:t>Checks if the </a:t>
-            </a:r>
-            <a:r>
-              <a:rPr lang="en-US" sz="2800" dirty="0">
-                <a:solidFill>
-                  <a:srgbClr val="000000"/>
-                </a:solidFill>
-                <a:latin typeface="Consolas" panose="020B0609020204030204" pitchFamily="49" charset="0"/>
-              </a:rPr>
-              <a:t>movie</a:t>
-            </a:r>
-            <a:r>
-              <a:rPr lang="en-US" sz="2800" dirty="0" smtClean="0"/>
-              <a:t> variable contains “Minions”</a:t>
-            </a:r>
-            <a:endParaRPr lang="en-US" sz="2800" dirty="0">
-              <a:solidFill>
-                <a:srgbClr val="000000"/>
-              </a:solidFill>
-              <a:latin typeface="Consolas" panose="020B0609020204030204" pitchFamily="49" charset="0"/>
-            </a:endParaRPr>
-          </a:p>
-        </p:txBody>
-      </p:sp>
-    </p:spTree>
-    <p:extLst>
-      <p:ext uri="{BB962C8B-B14F-4D97-AF65-F5344CB8AC3E}">
-        <p14:creationId xmlns:p14="http://schemas.microsoft.com/office/powerpoint/2010/main" val="2145441813"/>
-      </p:ext>
-    </p:extLst>
-  </p:cSld>
-  <p:clrMapOvr>
-    <a:masterClrMapping/>
-  </p:clrMapOvr>
-  <p:transition spd="med">
-    <p:pull/>
-  </p:transition>
-  <p:timing>
-    <p:tnLst>
-      <p:par>
-        <p:cTn id="1" dur="indefinite" restart="never" nodeType="tmRoot"/>
-      </p:par>
-    </p:tnLst>
-  </p:timing>
-</p:sld>
-</file>
-
-<file path=ppt/slides/slide21.xml><?xml version="1.0" encoding="utf-8"?>
-<p:sld xmlns:a="http://schemas.openxmlformats.org/drawingml/2006/main" xmlns:r="http://schemas.openxmlformats.org/officeDocument/2006/relationships" xmlns:p="http://schemas.openxmlformats.org/presentationml/2006/main">
-  <p:cSld>
-    <p:spTree>
-      <p:nvGrpSpPr>
-        <p:cNvPr id="1" name=""/>
-        <p:cNvGrpSpPr/>
-        <p:nvPr/>
-      </p:nvGrpSpPr>
-      <p:grpSpPr>
-        <a:xfrm>
-          <a:off x="0" y="0"/>
-          <a:ext cx="0" cy="0"/>
-          <a:chOff x="0" y="0"/>
-          <a:chExt cx="0" cy="0"/>
-        </a:xfrm>
-      </p:grpSpPr>
-      <p:sp>
-        <p:nvSpPr>
-          <p:cNvPr id="6" name="Title 5"/>
-          <p:cNvSpPr>
-            <a:spLocks noGrp="1"/>
-          </p:cNvSpPr>
-          <p:nvPr>
-            <p:ph type="title"/>
-          </p:nvPr>
-        </p:nvSpPr>
-        <p:spPr/>
-        <p:txBody>
-          <a:bodyPr/>
-          <a:lstStyle/>
-          <a:p>
-            <a:r>
-              <a:rPr lang="en-US" dirty="0" smtClean="0"/>
-              <a:t>If/else – Python Example</a:t>
-            </a:r>
-            <a:endParaRPr lang="en-US" dirty="0"/>
-          </a:p>
-        </p:txBody>
-      </p:sp>
-      <p:sp>
-        <p:nvSpPr>
-          <p:cNvPr id="7" name="Content Placeholder 6"/>
-          <p:cNvSpPr>
-            <a:spLocks noGrp="1"/>
-          </p:cNvSpPr>
-          <p:nvPr>
-            <p:ph idx="1"/>
-          </p:nvPr>
-        </p:nvSpPr>
-        <p:spPr/>
-        <p:txBody>
-          <a:bodyPr>
-            <a:normAutofit lnSpcReduction="10000"/>
-          </a:bodyPr>
-          <a:lstStyle/>
-          <a:p>
-            <a:pPr marL="57150" indent="0">
-              <a:buNone/>
-            </a:pPr>
-            <a:r>
-              <a:rPr lang="en-US" sz="3600" dirty="0">
-                <a:solidFill>
-                  <a:srgbClr val="000000"/>
-                </a:solidFill>
-                <a:latin typeface="Consolas" panose="020B0609020204030204" pitchFamily="49" charset="0"/>
-              </a:rPr>
-              <a:t>color = input(</a:t>
-            </a:r>
-            <a:r>
-              <a:rPr lang="en-US" sz="3600" dirty="0">
-                <a:solidFill>
-                  <a:srgbClr val="A31515"/>
-                </a:solidFill>
-                <a:latin typeface="Consolas" panose="020B0609020204030204" pitchFamily="49" charset="0"/>
-              </a:rPr>
-              <a:t>"What is your favorite color?"</a:t>
-            </a:r>
-            <a:r>
-              <a:rPr lang="en-US" sz="3600" dirty="0">
-                <a:solidFill>
-                  <a:srgbClr val="000000"/>
-                </a:solidFill>
-                <a:latin typeface="Consolas" panose="020B0609020204030204" pitchFamily="49" charset="0"/>
-              </a:rPr>
-              <a:t>)</a:t>
-            </a:r>
-          </a:p>
-          <a:p>
-            <a:pPr marL="57150" indent="0">
-              <a:buNone/>
-            </a:pPr>
-            <a:endParaRPr lang="en-US" sz="3600" dirty="0" smtClean="0">
-              <a:solidFill>
-                <a:srgbClr val="0000FF"/>
-              </a:solidFill>
-              <a:latin typeface="Consolas" panose="020B0609020204030204" pitchFamily="49" charset="0"/>
-            </a:endParaRPr>
-          </a:p>
-          <a:p>
-            <a:pPr marL="57150" indent="0">
-              <a:buNone/>
-            </a:pPr>
-            <a:r>
-              <a:rPr lang="en-US" sz="3600" dirty="0" smtClean="0">
-                <a:solidFill>
-                  <a:srgbClr val="0000FF"/>
-                </a:solidFill>
-                <a:latin typeface="Consolas" panose="020B0609020204030204" pitchFamily="49" charset="0"/>
-              </a:rPr>
-              <a:t>if</a:t>
-            </a:r>
-            <a:r>
-              <a:rPr lang="en-US" sz="3600" dirty="0" smtClean="0">
-                <a:solidFill>
-                  <a:srgbClr val="000000"/>
-                </a:solidFill>
-                <a:latin typeface="Consolas" panose="020B0609020204030204" pitchFamily="49" charset="0"/>
-              </a:rPr>
-              <a:t> </a:t>
-            </a:r>
-            <a:r>
-              <a:rPr lang="en-US" sz="3600" dirty="0">
-                <a:solidFill>
-                  <a:srgbClr val="000000"/>
-                </a:solidFill>
-                <a:latin typeface="Consolas" panose="020B0609020204030204" pitchFamily="49" charset="0"/>
-              </a:rPr>
-              <a:t>color == </a:t>
-            </a:r>
-            <a:r>
-              <a:rPr lang="en-US" sz="3600" dirty="0">
-                <a:solidFill>
-                  <a:srgbClr val="A31515"/>
-                </a:solidFill>
-                <a:latin typeface="Consolas" panose="020B0609020204030204" pitchFamily="49" charset="0"/>
-              </a:rPr>
-              <a:t>"blue"</a:t>
-            </a:r>
-            <a:r>
-              <a:rPr lang="en-US" sz="3600" dirty="0">
-                <a:solidFill>
-                  <a:srgbClr val="000000"/>
-                </a:solidFill>
-                <a:latin typeface="Consolas" panose="020B0609020204030204" pitchFamily="49" charset="0"/>
-              </a:rPr>
-              <a:t>:</a:t>
-            </a:r>
-          </a:p>
-          <a:p>
-            <a:pPr marL="57150" indent="0">
-              <a:buNone/>
-            </a:pPr>
-            <a:r>
-              <a:rPr lang="en-US" sz="3600" dirty="0" smtClean="0">
-                <a:solidFill>
-                  <a:srgbClr val="000000"/>
-                </a:solidFill>
-                <a:latin typeface="Consolas" panose="020B0609020204030204" pitchFamily="49" charset="0"/>
-              </a:rPr>
-              <a:t>	print</a:t>
-            </a:r>
-            <a:r>
-              <a:rPr lang="en-US" sz="3600" dirty="0">
-                <a:solidFill>
-                  <a:srgbClr val="000000"/>
-                </a:solidFill>
-                <a:latin typeface="Consolas" panose="020B0609020204030204" pitchFamily="49" charset="0"/>
-              </a:rPr>
-              <a:t>(</a:t>
-            </a:r>
-            <a:r>
-              <a:rPr lang="en-US" sz="3600" dirty="0">
-                <a:solidFill>
-                  <a:srgbClr val="A31515"/>
-                </a:solidFill>
-                <a:latin typeface="Consolas" panose="020B0609020204030204" pitchFamily="49" charset="0"/>
-              </a:rPr>
-              <a:t>"That's my favorite too!"</a:t>
-            </a:r>
-            <a:r>
-              <a:rPr lang="en-US" sz="3600" dirty="0">
-                <a:solidFill>
-                  <a:srgbClr val="000000"/>
-                </a:solidFill>
-                <a:latin typeface="Consolas" panose="020B0609020204030204" pitchFamily="49" charset="0"/>
-              </a:rPr>
-              <a:t>)</a:t>
-            </a:r>
-          </a:p>
-          <a:p>
-            <a:pPr marL="57150" indent="0">
-              <a:buNone/>
-            </a:pPr>
-            <a:r>
-              <a:rPr lang="en-US" sz="3600" dirty="0">
-                <a:solidFill>
-                  <a:srgbClr val="0000FF"/>
-                </a:solidFill>
-                <a:latin typeface="Consolas" panose="020B0609020204030204" pitchFamily="49" charset="0"/>
-              </a:rPr>
-              <a:t>else</a:t>
-            </a:r>
-            <a:r>
-              <a:rPr lang="en-US" sz="3600" dirty="0">
-                <a:solidFill>
-                  <a:srgbClr val="000000"/>
-                </a:solidFill>
-                <a:latin typeface="Consolas" panose="020B0609020204030204" pitchFamily="49" charset="0"/>
-              </a:rPr>
-              <a:t>:</a:t>
-            </a:r>
-          </a:p>
-          <a:p>
-            <a:pPr marL="57150" indent="0">
-              <a:buNone/>
-            </a:pPr>
-            <a:r>
-              <a:rPr lang="en-US" sz="3600" dirty="0" smtClean="0">
-                <a:solidFill>
-                  <a:srgbClr val="000000"/>
-                </a:solidFill>
-                <a:latin typeface="Consolas" panose="020B0609020204030204" pitchFamily="49" charset="0"/>
-              </a:rPr>
-              <a:t>	print</a:t>
-            </a:r>
-            <a:r>
-              <a:rPr lang="en-US" sz="3600" dirty="0">
-                <a:solidFill>
-                  <a:srgbClr val="000000"/>
-                </a:solidFill>
-                <a:latin typeface="Consolas" panose="020B0609020204030204" pitchFamily="49" charset="0"/>
-              </a:rPr>
-              <a:t>(</a:t>
-            </a:r>
-            <a:r>
-              <a:rPr lang="en-US" sz="3600" dirty="0">
-                <a:solidFill>
-                  <a:srgbClr val="A31515"/>
-                </a:solidFill>
-                <a:latin typeface="Consolas" panose="020B0609020204030204" pitchFamily="49" charset="0"/>
-              </a:rPr>
-              <a:t>"That's not my favorite"</a:t>
-            </a:r>
-            <a:r>
-              <a:rPr lang="en-US" sz="3600" dirty="0">
-                <a:solidFill>
-                  <a:srgbClr val="000000"/>
-                </a:solidFill>
-                <a:latin typeface="Consolas" panose="020B0609020204030204" pitchFamily="49" charset="0"/>
-              </a:rPr>
-              <a:t>)</a:t>
-            </a:r>
-          </a:p>
-          <a:p>
-            <a:pPr marL="57150" indent="0">
-              <a:buNone/>
-            </a:pPr>
-            <a:endParaRPr lang="en-US" sz="3600" dirty="0"/>
-          </a:p>
-          <a:p>
-            <a:pPr marL="57150" indent="0" algn="ctr">
-              <a:buNone/>
-            </a:pPr>
-            <a:r>
-              <a:rPr lang="en-US" sz="4000" dirty="0" smtClean="0"/>
-              <a:t>What will this code do?</a:t>
-            </a:r>
-          </a:p>
-        </p:txBody>
-      </p:sp>
-    </p:spTree>
-    <p:extLst>
-      <p:ext uri="{BB962C8B-B14F-4D97-AF65-F5344CB8AC3E}">
-        <p14:creationId xmlns:p14="http://schemas.microsoft.com/office/powerpoint/2010/main" val="3837237718"/>
-      </p:ext>
-    </p:extLst>
-  </p:cSld>
-  <p:clrMapOvr>
-    <a:masterClrMapping/>
-  </p:clrMapOvr>
-  <p:transition spd="med">
-    <p:pull/>
-  </p:transition>
-  <p:timing>
-    <p:tnLst>
-      <p:par>
-        <p:cTn id="1" dur="indefinite" restart="never" nodeType="tmRoot"/>
-      </p:par>
-    </p:tnLst>
-  </p:timing>
-</p:sld>
-</file>
-
-<file path=ppt/slides/slide22.xml><?xml version="1.0" encoding="utf-8"?>
-<p:sld xmlns:a="http://schemas.openxmlformats.org/drawingml/2006/main" xmlns:r="http://schemas.openxmlformats.org/officeDocument/2006/relationships" xmlns:p="http://schemas.openxmlformats.org/presentationml/2006/main">
-  <p:cSld>
-    <p:spTree>
-      <p:nvGrpSpPr>
-        <p:cNvPr id="1" name=""/>
-        <p:cNvGrpSpPr/>
-        <p:nvPr/>
-      </p:nvGrpSpPr>
-      <p:grpSpPr>
-        <a:xfrm>
-          <a:off x="0" y="0"/>
-          <a:ext cx="0" cy="0"/>
-          <a:chOff x="0" y="0"/>
-          <a:chExt cx="0" cy="0"/>
-        </a:xfrm>
-      </p:grpSpPr>
-      <p:sp>
-        <p:nvSpPr>
-          <p:cNvPr id="6" name="Title 5"/>
-          <p:cNvSpPr>
-            <a:spLocks noGrp="1"/>
-          </p:cNvSpPr>
-          <p:nvPr>
-            <p:ph type="title"/>
-          </p:nvPr>
-        </p:nvSpPr>
-        <p:spPr/>
-        <p:txBody>
-          <a:bodyPr/>
-          <a:lstStyle/>
-          <a:p>
-            <a:r>
-              <a:rPr lang="en-US" dirty="0" smtClean="0"/>
               <a:t>Repeating code with Loops</a:t>
             </a:r>
             <a:endParaRPr lang="en-US" dirty="0"/>
@@ -43344,7 +39844,7 @@
 </p:sld>
 </file>
 
-<file path=ppt/slides/slide23.xml><?xml version="1.0" encoding="utf-8"?>
+<file path=ppt/slides/slide17.xml><?xml version="1.0" encoding="utf-8"?>
 <p:sld xmlns:a="http://schemas.openxmlformats.org/drawingml/2006/main" xmlns:r="http://schemas.openxmlformats.org/officeDocument/2006/relationships" xmlns:p="http://schemas.openxmlformats.org/presentationml/2006/main">
   <p:cSld>
     <p:spTree>
@@ -43577,7 +40077,7 @@
 </p:sld>
 </file>
 
-<file path=ppt/slides/slide24.xml><?xml version="1.0" encoding="utf-8"?>
+<file path=ppt/slides/slide18.xml><?xml version="1.0" encoding="utf-8"?>
 <p:sld xmlns:a="http://schemas.openxmlformats.org/drawingml/2006/main" xmlns:r="http://schemas.openxmlformats.org/officeDocument/2006/relationships" xmlns:p="http://schemas.openxmlformats.org/presentationml/2006/main">
   <p:cSld>
     <p:spTree>
@@ -43783,7 +40283,7 @@
 </p:sld>
 </file>
 
-<file path=ppt/slides/slide25.xml><?xml version="1.0" encoding="utf-8"?>
+<file path=ppt/slides/slide19.xml><?xml version="1.0" encoding="utf-8"?>
 <p:sld xmlns:a="http://schemas.openxmlformats.org/drawingml/2006/main" xmlns:r="http://schemas.openxmlformats.org/officeDocument/2006/relationships" xmlns:p="http://schemas.openxmlformats.org/presentationml/2006/main">
   <p:cSld>
     <p:spTree>
@@ -44762,7 +41262,139 @@
 </p:sld>
 </file>
 
-<file path=ppt/slides/slide26.xml><?xml version="1.0" encoding="utf-8"?>
+<file path=ppt/slides/slide2.xml><?xml version="1.0" encoding="utf-8"?>
+<p:sld xmlns:a="http://schemas.openxmlformats.org/drawingml/2006/main" xmlns:r="http://schemas.openxmlformats.org/officeDocument/2006/relationships" xmlns:p="http://schemas.openxmlformats.org/presentationml/2006/main">
+  <p:cSld>
+    <p:spTree>
+      <p:nvGrpSpPr>
+        <p:cNvPr id="1" name=""/>
+        <p:cNvGrpSpPr/>
+        <p:nvPr/>
+      </p:nvGrpSpPr>
+      <p:grpSpPr>
+        <a:xfrm>
+          <a:off x="0" y="0"/>
+          <a:ext cx="0" cy="0"/>
+          <a:chOff x="0" y="0"/>
+          <a:chExt cx="0" cy="0"/>
+        </a:xfrm>
+      </p:grpSpPr>
+      <p:sp>
+        <p:nvSpPr>
+          <p:cNvPr id="6" name="Title 5"/>
+          <p:cNvSpPr>
+            <a:spLocks noGrp="1"/>
+          </p:cNvSpPr>
+          <p:nvPr>
+            <p:ph type="title"/>
+          </p:nvPr>
+        </p:nvSpPr>
+        <p:spPr/>
+        <p:txBody>
+          <a:bodyPr/>
+          <a:lstStyle/>
+          <a:p>
+            <a:r>
+              <a:rPr lang="en-US" dirty="0" smtClean="0"/>
+              <a:t>Agenda</a:t>
+            </a:r>
+            <a:endParaRPr lang="en-US" dirty="0"/>
+          </a:p>
+        </p:txBody>
+      </p:sp>
+      <p:sp>
+        <p:nvSpPr>
+          <p:cNvPr id="7" name="Text Placeholder 6"/>
+          <p:cNvSpPr>
+            <a:spLocks noGrp="1"/>
+          </p:cNvSpPr>
+          <p:nvPr>
+            <p:ph type="body" idx="1"/>
+          </p:nvPr>
+        </p:nvSpPr>
+        <p:spPr/>
+        <p:txBody>
+          <a:bodyPr>
+            <a:normAutofit/>
+          </a:bodyPr>
+          <a:lstStyle/>
+          <a:p>
+            <a:r>
+              <a:rPr lang="en-US" dirty="0" smtClean="0"/>
+              <a:t>Introduction to Python</a:t>
+            </a:r>
+          </a:p>
+          <a:p>
+            <a:r>
+              <a:rPr lang="en-US" dirty="0" smtClean="0"/>
+              <a:t>Kahoot Quiz</a:t>
+            </a:r>
+          </a:p>
+          <a:p>
+            <a:r>
+              <a:rPr lang="en-US" dirty="0" smtClean="0"/>
+              <a:t>Python Activities</a:t>
+            </a:r>
+          </a:p>
+        </p:txBody>
+      </p:sp>
+      <p:sp>
+        <p:nvSpPr>
+          <p:cNvPr id="4" name="Date Placeholder 3"/>
+          <p:cNvSpPr>
+            <a:spLocks noGrp="1"/>
+          </p:cNvSpPr>
+          <p:nvPr>
+            <p:ph type="dt" sz="half" idx="10"/>
+          </p:nvPr>
+        </p:nvSpPr>
+        <p:spPr/>
+        <p:txBody>
+          <a:bodyPr/>
+          <a:lstStyle/>
+          <a:p>
+            <a:fld id="{1C2D31DE-C454-491C-B5C3-F097855E3DF7}" type="datetime4">
+              <a:rPr lang="en-US" smtClean="0"/>
+              <a:pPr/>
+              <a:t>April 21, 2020</a:t>
+            </a:fld>
+            <a:endParaRPr lang="en-US" dirty="0"/>
+          </a:p>
+        </p:txBody>
+      </p:sp>
+    </p:spTree>
+    <p:extLst>
+      <p:ext uri="{BB962C8B-B14F-4D97-AF65-F5344CB8AC3E}">
+        <p14:creationId xmlns:p14="http://schemas.microsoft.com/office/powerpoint/2010/main" val="2629401558"/>
+      </p:ext>
+    </p:extLst>
+  </p:cSld>
+  <p:clrMapOvr>
+    <a:masterClrMapping/>
+  </p:clrMapOvr>
+  <mc:AlternateContent xmlns:mc="http://schemas.openxmlformats.org/markup-compatibility/2006" xmlns:p14="http://schemas.microsoft.com/office/powerpoint/2010/main">
+    <mc:Choice Requires="p14">
+      <p:transition spd="slow" p14:dur="1600">
+        <p:blinds dir="vert"/>
+      </p:transition>
+    </mc:Choice>
+    <mc:Fallback xmlns="">
+      <p:transition spd="slow">
+        <p:blinds dir="vert"/>
+      </p:transition>
+    </mc:Fallback>
+  </mc:AlternateContent>
+  <p:timing>
+    <p:tnLst>
+      <p:par>
+        <p:cTn id="1" dur="indefinite" restart="never" nodeType="tmRoot"/>
+      </p:par>
+    </p:tnLst>
+  </p:timing>
+</p:sld>
+</file>
+
+<file path=ppt/slides/slide20.xml><?xml version="1.0" encoding="utf-8"?>
 <p:sld xmlns:a="http://schemas.openxmlformats.org/drawingml/2006/main" xmlns:r="http://schemas.openxmlformats.org/officeDocument/2006/relationships" xmlns:p="http://schemas.openxmlformats.org/presentationml/2006/main">
   <p:cSld>
     <p:spTree>
@@ -45092,7 +41724,7 @@
 </p:sld>
 </file>
 
-<file path=ppt/slides/slide27.xml><?xml version="1.0" encoding="utf-8"?>
+<file path=ppt/slides/slide21.xml><?xml version="1.0" encoding="utf-8"?>
 <p:sld xmlns:a="http://schemas.openxmlformats.org/drawingml/2006/main" xmlns:r="http://schemas.openxmlformats.org/officeDocument/2006/relationships" xmlns:p="http://schemas.openxmlformats.org/presentationml/2006/main">
   <p:cSld>
     <p:spTree>
@@ -45164,207 +41796,6 @@
   </p:clrMapOvr>
   <p:transition spd="slow">
     <p:push dir="u"/>
-  </p:transition>
-  <p:timing>
-    <p:tnLst>
-      <p:par>
-        <p:cTn id="1" dur="indefinite" restart="never" nodeType="tmRoot"/>
-      </p:par>
-    </p:tnLst>
-  </p:timing>
-</p:sld>
-</file>
-
-<file path=ppt/slides/slide28.xml><?xml version="1.0" encoding="utf-8"?>
-<p:sld xmlns:a="http://schemas.openxmlformats.org/drawingml/2006/main" xmlns:r="http://schemas.openxmlformats.org/officeDocument/2006/relationships" xmlns:p="http://schemas.openxmlformats.org/presentationml/2006/main">
-  <p:cSld>
-    <p:spTree>
-      <p:nvGrpSpPr>
-        <p:cNvPr id="1" name=""/>
-        <p:cNvGrpSpPr/>
-        <p:nvPr/>
-      </p:nvGrpSpPr>
-      <p:grpSpPr>
-        <a:xfrm>
-          <a:off x="0" y="0"/>
-          <a:ext cx="0" cy="0"/>
-          <a:chOff x="0" y="0"/>
-          <a:chExt cx="0" cy="0"/>
-        </a:xfrm>
-      </p:grpSpPr>
-      <p:pic>
-        <p:nvPicPr>
-          <p:cNvPr id="1026" name="Picture 2" descr="Image result for python turtle square gif"/>
-          <p:cNvPicPr>
-            <a:picLocks noGrp="1" noChangeAspect="1" noChangeArrowheads="1" noCrop="1"/>
-          </p:cNvPicPr>
-          <p:nvPr>
-            <p:ph type="pic" sz="quarter" idx="13"/>
-          </p:nvPr>
-        </p:nvPicPr>
-        <p:blipFill>
-          <a:blip r:embed="rId2">
-            <a:extLst>
-              <a:ext uri="{28A0092B-C50C-407E-A947-70E740481C1C}">
-                <a14:useLocalDpi xmlns:a14="http://schemas.microsoft.com/office/drawing/2010/main" val="0"/>
-              </a:ext>
-            </a:extLst>
-          </a:blip>
-          <a:srcRect t="12762" b="12762"/>
-          <a:stretch>
-            <a:fillRect/>
-          </a:stretch>
-        </p:blipFill>
-        <p:spPr bwMode="auto">
-          <a:prstGeom prst="rect">
-            <a:avLst/>
-          </a:prstGeom>
-          <a:noFill/>
-          <a:extLst>
-            <a:ext uri="{909E8E84-426E-40DD-AFC4-6F175D3DCCD1}">
-              <a14:hiddenFill xmlns:a14="http://schemas.microsoft.com/office/drawing/2010/main">
-                <a:solidFill>
-                  <a:srgbClr val="FFFFFF"/>
-                </a:solidFill>
-              </a14:hiddenFill>
-            </a:ext>
-          </a:extLst>
-        </p:spPr>
-      </p:pic>
-      <p:sp>
-        <p:nvSpPr>
-          <p:cNvPr id="3" name="Title 2"/>
-          <p:cNvSpPr>
-            <a:spLocks noGrp="1"/>
-          </p:cNvSpPr>
-          <p:nvPr>
-            <p:ph type="title"/>
-          </p:nvPr>
-        </p:nvSpPr>
-        <p:spPr/>
-        <p:txBody>
-          <a:bodyPr/>
-          <a:lstStyle/>
-          <a:p>
-            <a:r>
-              <a:rPr lang="en-US" dirty="0" smtClean="0"/>
-              <a:t>Follow-Along Activity</a:t>
-            </a:r>
-            <a:endParaRPr lang="en-US" dirty="0"/>
-          </a:p>
-        </p:txBody>
-      </p:sp>
-    </p:spTree>
-    <p:extLst>
-      <p:ext uri="{BB962C8B-B14F-4D97-AF65-F5344CB8AC3E}">
-        <p14:creationId xmlns:p14="http://schemas.microsoft.com/office/powerpoint/2010/main" val="4206450011"/>
-      </p:ext>
-    </p:extLst>
-  </p:cSld>
-  <p:clrMapOvr>
-    <a:masterClrMapping/>
-  </p:clrMapOvr>
-  <p:transition>
-    <p:fade/>
-  </p:transition>
-  <p:timing>
-    <p:tnLst>
-      <p:par>
-        <p:cTn id="1" dur="indefinite" restart="never" nodeType="tmRoot"/>
-      </p:par>
-    </p:tnLst>
-  </p:timing>
-</p:sld>
-</file>
-
-<file path=ppt/slides/slide29.xml><?xml version="1.0" encoding="utf-8"?>
-<p:sld xmlns:a="http://schemas.openxmlformats.org/drawingml/2006/main" xmlns:r="http://schemas.openxmlformats.org/officeDocument/2006/relationships" xmlns:p="http://schemas.openxmlformats.org/presentationml/2006/main">
-  <p:cSld>
-    <p:spTree>
-      <p:nvGrpSpPr>
-        <p:cNvPr id="1" name=""/>
-        <p:cNvGrpSpPr/>
-        <p:nvPr/>
-      </p:nvGrpSpPr>
-      <p:grpSpPr>
-        <a:xfrm>
-          <a:off x="0" y="0"/>
-          <a:ext cx="0" cy="0"/>
-          <a:chOff x="0" y="0"/>
-          <a:chExt cx="0" cy="0"/>
-        </a:xfrm>
-      </p:grpSpPr>
-      <p:sp>
-        <p:nvSpPr>
-          <p:cNvPr id="2" name="Title 1"/>
-          <p:cNvSpPr>
-            <a:spLocks noGrp="1"/>
-          </p:cNvSpPr>
-          <p:nvPr>
-            <p:ph type="title"/>
-          </p:nvPr>
-        </p:nvSpPr>
-        <p:spPr/>
-        <p:txBody>
-          <a:bodyPr/>
-          <a:lstStyle/>
-          <a:p>
-            <a:r>
-              <a:rPr lang="en-US" dirty="0" smtClean="0"/>
-              <a:t>Turtle Activities</a:t>
-            </a:r>
-            <a:endParaRPr lang="en-US" dirty="0"/>
-          </a:p>
-        </p:txBody>
-      </p:sp>
-      <p:sp>
-        <p:nvSpPr>
-          <p:cNvPr id="3" name="Content Placeholder 2"/>
-          <p:cNvSpPr>
-            <a:spLocks noGrp="1"/>
-          </p:cNvSpPr>
-          <p:nvPr>
-            <p:ph idx="1"/>
-          </p:nvPr>
-        </p:nvSpPr>
-        <p:spPr/>
-        <p:txBody>
-          <a:bodyPr anchor="ctr">
-            <a:normAutofit/>
-          </a:bodyPr>
-          <a:lstStyle/>
-          <a:p>
-            <a:pPr marL="57150" indent="0" algn="ctr">
-              <a:buNone/>
-            </a:pPr>
-            <a:r>
-              <a:rPr lang="en-US" sz="9600" dirty="0" smtClean="0">
-                <a:hlinkClick r:id="rId3"/>
-              </a:rPr>
-              <a:t>bit.ly/</a:t>
-            </a:r>
-            <a:r>
-              <a:rPr lang="en-US" sz="9600" dirty="0" err="1" smtClean="0">
-                <a:hlinkClick r:id="rId3"/>
-              </a:rPr>
-              <a:t>PyChallenges</a:t>
-            </a:r>
-            <a:endParaRPr lang="en-US" sz="9600" dirty="0"/>
-          </a:p>
-        </p:txBody>
-      </p:sp>
-    </p:spTree>
-    <p:extLst>
-      <p:ext uri="{BB962C8B-B14F-4D97-AF65-F5344CB8AC3E}">
-        <p14:creationId xmlns:p14="http://schemas.microsoft.com/office/powerpoint/2010/main" val="3314393105"/>
-      </p:ext>
-    </p:extLst>
-  </p:cSld>
-  <p:clrMapOvr>
-    <a:masterClrMapping/>
-  </p:clrMapOvr>
-  <p:transition>
-    <p:fade/>
   </p:transition>
   <p:timing>
     <p:tnLst>

</xml_diff>